<commit_message>
Add venn diagrams and table to powerpoint
</commit_message>
<xml_diff>
--- a/eQTL_GWAS_riskSNPs/raggr_results_tables.pptx
+++ b/eQTL_GWAS_riskSNPs/raggr_results_tables.pptx
@@ -9,6 +9,9 @@
     <p:sldId id="346" r:id="rId3"/>
     <p:sldId id="321" r:id="rId4"/>
     <p:sldId id="322" r:id="rId5"/>
+    <p:sldId id="347" r:id="rId6"/>
+    <p:sldId id="349" r:id="rId7"/>
+    <p:sldId id="348" r:id="rId8"/>
   </p:sldIdLst>
   <p:sldSz cx="12192000" cy="6858000"/>
   <p:notesSz cx="6858000" cy="9144000"/>
@@ -8099,7 +8102,7 @@
           <p:nvPr>
             <p:extLst>
               <p:ext uri="{D42A27DB-BD31-4B8C-83A1-F6EECF244321}">
-                <p14:modId xmlns:p14="http://schemas.microsoft.com/office/powerpoint/2010/main" val="575452014"/>
+                <p14:modId xmlns:p14="http://schemas.microsoft.com/office/powerpoint/2010/main" val="3130385695"/>
               </p:ext>
             </p:extLst>
           </p:nvPr>
@@ -8547,7 +8550,6 @@
                         <a:rPr lang="en-US" sz="1600" dirty="0" smtClean="0"/>
                         <a:t>1731</a:t>
                       </a:r>
-                      <a:endParaRPr lang="en-US" sz="1600" dirty="0" smtClean="0"/>
                     </a:p>
                   </a:txBody>
                   <a:tcPr anchor="ctr">
@@ -8738,7 +8740,6 @@
                         <a:rPr lang="en-US" sz="1600" dirty="0" smtClean="0"/>
                         <a:t>123</a:t>
                       </a:r>
-                      <a:endParaRPr lang="en-US" sz="1600" dirty="0" smtClean="0"/>
                     </a:p>
                   </a:txBody>
                   <a:tcPr anchor="ctr">
@@ -8948,7 +8949,6 @@
                         <a:rPr lang="en-US" sz="1600" dirty="0" smtClean="0"/>
                         <a:t>244</a:t>
                       </a:r>
-                      <a:endParaRPr lang="en-US" sz="1600" dirty="0" smtClean="0"/>
                     </a:p>
                   </a:txBody>
                   <a:tcPr anchor="ctr">
@@ -9167,7 +9167,6 @@
                         <a:rPr lang="en-US" sz="1600" dirty="0" smtClean="0"/>
                         <a:t>857</a:t>
                       </a:r>
-                      <a:endParaRPr lang="en-US" sz="1600" dirty="0" smtClean="0"/>
                     </a:p>
                   </a:txBody>
                   <a:tcPr anchor="ctr">
@@ -9384,7 +9383,6 @@
                         <a:rPr lang="en-US" sz="1600" dirty="0" smtClean="0"/>
                         <a:t>507</a:t>
                       </a:r>
-                      <a:endParaRPr lang="en-US" sz="1600" dirty="0" smtClean="0"/>
                     </a:p>
                   </a:txBody>
                   <a:tcPr anchor="ctr">
@@ -9575,7 +9573,11 @@
                       </a:pPr>
                       <a:r>
                         <a:rPr lang="en-US" sz="1600" dirty="0" smtClean="0"/>
-                        <a:t>66,923 (463)</a:t>
+                        <a:t>66,923 </a:t>
+                      </a:r>
+                      <a:r>
+                        <a:rPr lang="en-US" sz="1600" dirty="0" smtClean="0"/>
+                        <a:t>(334)</a:t>
                       </a:r>
                       <a:endParaRPr lang="en-US" sz="1600" dirty="0" smtClean="0"/>
                     </a:p>
@@ -9629,7 +9631,11 @@
                       <a:pPr algn="ctr"/>
                       <a:r>
                         <a:rPr lang="en-US" sz="1600" dirty="0" smtClean="0"/>
-                        <a:t>106,438 (568)</a:t>
+                        <a:t>106,438 </a:t>
+                      </a:r>
+                      <a:r>
+                        <a:rPr lang="en-US" sz="1600" dirty="0" smtClean="0"/>
+                        <a:t>(412)</a:t>
                       </a:r>
                       <a:endParaRPr lang="en-US" sz="1600" dirty="0"/>
                     </a:p>
@@ -9763,7 +9769,6 @@
                         <a:rPr lang="en-US" sz="1600" dirty="0" smtClean="0"/>
                         <a:t>4795 (123)</a:t>
                       </a:r>
-                      <a:endParaRPr lang="en-US" sz="1600" dirty="0" smtClean="0"/>
                     </a:p>
                   </a:txBody>
                   <a:tcPr anchor="ctr">
@@ -9958,7 +9963,6 @@
                         <a:rPr lang="en-US" sz="1600" dirty="0" smtClean="0"/>
                         <a:t>9629 (170)</a:t>
                       </a:r>
-                      <a:endParaRPr lang="en-US" sz="1600" dirty="0" smtClean="0"/>
                     </a:p>
                   </a:txBody>
                   <a:tcPr anchor="ctr">
@@ -10153,7 +10157,6 @@
                         <a:rPr lang="en-US" sz="1600" dirty="0" smtClean="0"/>
                         <a:t>33,122 (216)</a:t>
                       </a:r>
-                      <a:endParaRPr lang="en-US" sz="1600" dirty="0" smtClean="0"/>
                     </a:p>
                   </a:txBody>
                   <a:tcPr anchor="ctr">
@@ -10346,7 +10349,6 @@
                         <a:rPr lang="en-US" sz="1600" dirty="0" smtClean="0"/>
                         <a:t>19,377 (165)</a:t>
                       </a:r>
-                      <a:endParaRPr lang="en-US" sz="1600" dirty="0" smtClean="0"/>
                     </a:p>
                   </a:txBody>
                   <a:tcPr anchor="ctr">
@@ -10458,6 +10460,4842 @@
     <p:extLst>
       <p:ext uri="{BB962C8B-B14F-4D97-AF65-F5344CB8AC3E}">
         <p14:creationId xmlns:p14="http://schemas.microsoft.com/office/powerpoint/2010/main" val="3528260852"/>
+      </p:ext>
+    </p:extLst>
+  </p:cSld>
+  <p:clrMapOvr>
+    <a:masterClrMapping/>
+  </p:clrMapOvr>
+</p:sld>
+</file>
+
+<file path=ppt/slides/slide5.xml><?xml version="1.0" encoding="utf-8"?>
+<p:sld xmlns:a="http://schemas.openxmlformats.org/drawingml/2006/main" xmlns:r="http://schemas.openxmlformats.org/officeDocument/2006/relationships" xmlns:p="http://schemas.openxmlformats.org/presentationml/2006/main">
+  <p:cSld>
+    <p:spTree>
+      <p:nvGrpSpPr>
+        <p:cNvPr id="1" name=""/>
+        <p:cNvGrpSpPr/>
+        <p:nvPr/>
+      </p:nvGrpSpPr>
+      <p:grpSpPr>
+        <a:xfrm>
+          <a:off x="0" y="0"/>
+          <a:ext cx="0" cy="0"/>
+          <a:chOff x="0" y="0"/>
+          <a:chExt cx="0" cy="0"/>
+        </a:xfrm>
+      </p:grpSpPr>
+      <p:sp>
+        <p:nvSpPr>
+          <p:cNvPr id="2" name="Title 1">
+            <a:extLst>
+              <a:ext uri="{FF2B5EF4-FFF2-40B4-BE49-F238E27FC236}">
+                <a16:creationId xmlns:a16="http://schemas.microsoft.com/office/drawing/2014/main" id="{5CFE0278-5FE9-4F97-9C97-2D0BFFE62AE7}"/>
+              </a:ext>
+            </a:extLst>
+          </p:cNvPr>
+          <p:cNvSpPr>
+            <a:spLocks noGrp="1"/>
+          </p:cNvSpPr>
+          <p:nvPr>
+            <p:ph type="title"/>
+          </p:nvPr>
+        </p:nvSpPr>
+        <p:spPr>
+          <a:xfrm>
+            <a:off x="734781" y="407530"/>
+            <a:ext cx="10058400" cy="839291"/>
+          </a:xfrm>
+        </p:spPr>
+        <p:txBody>
+          <a:bodyPr/>
+          <a:lstStyle/>
+          <a:p>
+            <a:r>
+              <a:rPr lang="en-US" dirty="0">
+                <a:latin typeface="+mn-lt"/>
+              </a:rPr>
+              <a:t>Overall </a:t>
+            </a:r>
+            <a:r>
+              <a:rPr lang="en-US" dirty="0" err="1">
+                <a:latin typeface="+mn-lt"/>
+              </a:rPr>
+              <a:t>eQTLs</a:t>
+            </a:r>
+            <a:r>
+              <a:rPr lang="en-US" dirty="0">
+                <a:latin typeface="+mn-lt"/>
+              </a:rPr>
+              <a:t> at </a:t>
+            </a:r>
+            <a:r>
+              <a:rPr lang="en-US" dirty="0" smtClean="0">
+                <a:latin typeface="+mn-lt"/>
+              </a:rPr>
+              <a:t>FDR &lt; 1% </a:t>
+            </a:r>
+            <a:r>
+              <a:rPr lang="en-US" dirty="0"/>
+              <a:t>- </a:t>
+            </a:r>
+            <a:r>
+              <a:rPr lang="en-US" dirty="0" err="1"/>
+              <a:t>rAggr</a:t>
+            </a:r>
+            <a:endParaRPr lang="en-US" dirty="0">
+              <a:latin typeface="+mn-lt"/>
+            </a:endParaRPr>
+          </a:p>
+        </p:txBody>
+      </p:sp>
+      <p:pic>
+        <p:nvPicPr>
+          <p:cNvPr id="4" name="Picture 3"/>
+          <p:cNvPicPr>
+            <a:picLocks noChangeAspect="1"/>
+          </p:cNvPicPr>
+          <p:nvPr/>
+        </p:nvPicPr>
+        <p:blipFill rotWithShape="1">
+          <a:blip r:embed="rId2" cstate="print">
+            <a:extLst>
+              <a:ext uri="{28A0092B-C50C-407E-A947-70E740481C1C}">
+                <a14:useLocalDpi xmlns:a14="http://schemas.microsoft.com/office/drawing/2010/main" val="0"/>
+              </a:ext>
+            </a:extLst>
+          </a:blip>
+          <a:srcRect b="12328"/>
+          <a:stretch/>
+        </p:blipFill>
+        <p:spPr>
+          <a:xfrm>
+            <a:off x="8133672" y="3258139"/>
+            <a:ext cx="3782746" cy="3316397"/>
+          </a:xfrm>
+          <a:prstGeom prst="rect">
+            <a:avLst/>
+          </a:prstGeom>
+        </p:spPr>
+      </p:pic>
+      <p:pic>
+        <p:nvPicPr>
+          <p:cNvPr id="5" name="Picture 4"/>
+          <p:cNvPicPr>
+            <a:picLocks noChangeAspect="1"/>
+          </p:cNvPicPr>
+          <p:nvPr/>
+        </p:nvPicPr>
+        <p:blipFill rotWithShape="1">
+          <a:blip r:embed="rId3" cstate="print">
+            <a:extLst>
+              <a:ext uri="{28A0092B-C50C-407E-A947-70E740481C1C}">
+                <a14:useLocalDpi xmlns:a14="http://schemas.microsoft.com/office/drawing/2010/main" val="0"/>
+              </a:ext>
+            </a:extLst>
+          </a:blip>
+          <a:srcRect b="13295"/>
+          <a:stretch/>
+        </p:blipFill>
+        <p:spPr>
+          <a:xfrm>
+            <a:off x="1669295" y="3294715"/>
+            <a:ext cx="3782746" cy="3279821"/>
+          </a:xfrm>
+          <a:prstGeom prst="rect">
+            <a:avLst/>
+          </a:prstGeom>
+        </p:spPr>
+      </p:pic>
+      <p:graphicFrame>
+        <p:nvGraphicFramePr>
+          <p:cNvPr id="6" name="Table 5"/>
+          <p:cNvGraphicFramePr>
+            <a:graphicFrameLocks noGrp="1"/>
+          </p:cNvGraphicFramePr>
+          <p:nvPr>
+            <p:extLst>
+              <p:ext uri="{D42A27DB-BD31-4B8C-83A1-F6EECF244321}">
+                <p14:modId xmlns:p14="http://schemas.microsoft.com/office/powerpoint/2010/main" val="3269112058"/>
+              </p:ext>
+            </p:extLst>
+          </p:nvPr>
+        </p:nvGraphicFramePr>
+        <p:xfrm>
+          <a:off x="588477" y="1487406"/>
+          <a:ext cx="8632033" cy="876442"/>
+        </p:xfrm>
+        <a:graphic>
+          <a:graphicData uri="http://schemas.openxmlformats.org/drawingml/2006/table">
+            <a:tbl>
+              <a:tblPr firstRow="1" bandRow="1">
+                <a:tableStyleId>{2D5ABB26-0587-4C30-8999-92F81FD0307C}</a:tableStyleId>
+              </a:tblPr>
+              <a:tblGrid>
+                <a:gridCol w="4412955">
+                  <a:extLst>
+                    <a:ext uri="{9D8B030D-6E8A-4147-A177-3AD203B41FA5}">
+                      <a16:colId xmlns:a16="http://schemas.microsoft.com/office/drawing/2014/main" val="1178349782"/>
+                    </a:ext>
+                  </a:extLst>
+                </a:gridCol>
+                <a:gridCol w="2109539">
+                  <a:extLst>
+                    <a:ext uri="{9D8B030D-6E8A-4147-A177-3AD203B41FA5}">
+                      <a16:colId xmlns:a16="http://schemas.microsoft.com/office/drawing/2014/main" val="1816200263"/>
+                    </a:ext>
+                  </a:extLst>
+                </a:gridCol>
+                <a:gridCol w="2109539">
+                  <a:extLst>
+                    <a:ext uri="{9D8B030D-6E8A-4147-A177-3AD203B41FA5}">
+                      <a16:colId xmlns:a16="http://schemas.microsoft.com/office/drawing/2014/main" val="3834981325"/>
+                    </a:ext>
+                  </a:extLst>
+                </a:gridCol>
+              </a:tblGrid>
+              <a:tr h="464962">
+                <a:tc>
+                  <a:txBody>
+                    <a:bodyPr/>
+                    <a:lstStyle/>
+                    <a:p>
+                      <a:pPr algn="ctr"/>
+                      <a:endParaRPr lang="en-US" sz="1800" dirty="0"/>
+                    </a:p>
+                  </a:txBody>
+                  <a:tcPr anchor="ctr">
+                    <a:lnL w="12700" cap="flat" cmpd="sng" algn="ctr">
+                      <a:solidFill>
+                        <a:schemeClr val="tx1"/>
+                      </a:solidFill>
+                      <a:prstDash val="solid"/>
+                      <a:round/>
+                      <a:headEnd type="none" w="med" len="med"/>
+                      <a:tailEnd type="none" w="med" len="med"/>
+                    </a:lnL>
+                    <a:lnR w="12700" cap="flat" cmpd="sng" algn="ctr">
+                      <a:solidFill>
+                        <a:schemeClr val="tx1"/>
+                      </a:solidFill>
+                      <a:prstDash val="solid"/>
+                      <a:round/>
+                      <a:headEnd type="none" w="med" len="med"/>
+                      <a:tailEnd type="none" w="med" len="med"/>
+                    </a:lnR>
+                    <a:lnT w="12700" cap="flat" cmpd="sng" algn="ctr">
+                      <a:solidFill>
+                        <a:schemeClr val="tx1"/>
+                      </a:solidFill>
+                      <a:prstDash val="solid"/>
+                      <a:round/>
+                      <a:headEnd type="none" w="med" len="med"/>
+                      <a:tailEnd type="none" w="med" len="med"/>
+                    </a:lnT>
+                    <a:lnB w="12700" cap="flat" cmpd="sng" algn="ctr">
+                      <a:solidFill>
+                        <a:schemeClr val="tx1"/>
+                      </a:solidFill>
+                      <a:prstDash val="solid"/>
+                      <a:round/>
+                      <a:headEnd type="none" w="med" len="med"/>
+                      <a:tailEnd type="none" w="med" len="med"/>
+                    </a:lnB>
+                  </a:tcPr>
+                </a:tc>
+                <a:tc>
+                  <a:txBody>
+                    <a:bodyPr/>
+                    <a:lstStyle/>
+                    <a:p>
+                      <a:pPr algn="ctr"/>
+                      <a:r>
+                        <a:rPr lang="en-US" sz="1800" dirty="0" smtClean="0"/>
+                        <a:t>Hippocampus</a:t>
+                      </a:r>
+                      <a:endParaRPr lang="en-US" sz="1800" dirty="0"/>
+                    </a:p>
+                  </a:txBody>
+                  <a:tcPr anchor="ctr">
+                    <a:lnL w="12700" cap="flat" cmpd="sng" algn="ctr">
+                      <a:solidFill>
+                        <a:schemeClr val="tx1"/>
+                      </a:solidFill>
+                      <a:prstDash val="solid"/>
+                      <a:round/>
+                      <a:headEnd type="none" w="med" len="med"/>
+                      <a:tailEnd type="none" w="med" len="med"/>
+                    </a:lnL>
+                    <a:lnR w="12700" cap="flat" cmpd="sng" algn="ctr">
+                      <a:solidFill>
+                        <a:schemeClr val="tx1"/>
+                      </a:solidFill>
+                      <a:prstDash val="solid"/>
+                      <a:round/>
+                      <a:headEnd type="none" w="med" len="med"/>
+                      <a:tailEnd type="none" w="med" len="med"/>
+                    </a:lnR>
+                    <a:lnT w="12700" cap="flat" cmpd="sng" algn="ctr">
+                      <a:solidFill>
+                        <a:schemeClr val="tx1"/>
+                      </a:solidFill>
+                      <a:prstDash val="solid"/>
+                      <a:round/>
+                      <a:headEnd type="none" w="med" len="med"/>
+                      <a:tailEnd type="none" w="med" len="med"/>
+                    </a:lnT>
+                    <a:lnB w="12700" cap="flat" cmpd="sng" algn="ctr">
+                      <a:solidFill>
+                        <a:schemeClr val="tx1"/>
+                      </a:solidFill>
+                      <a:prstDash val="solid"/>
+                      <a:round/>
+                      <a:headEnd type="none" w="med" len="med"/>
+                      <a:tailEnd type="none" w="med" len="med"/>
+                    </a:lnB>
+                  </a:tcPr>
+                </a:tc>
+                <a:tc>
+                  <a:txBody>
+                    <a:bodyPr/>
+                    <a:lstStyle/>
+                    <a:p>
+                      <a:pPr algn="ctr"/>
+                      <a:r>
+                        <a:rPr lang="en-US" sz="1800" dirty="0"/>
+                        <a:t>DLPFC</a:t>
+                      </a:r>
+                    </a:p>
+                  </a:txBody>
+                  <a:tcPr anchor="ctr">
+                    <a:lnL w="12700" cap="flat" cmpd="sng" algn="ctr">
+                      <a:solidFill>
+                        <a:schemeClr val="tx1"/>
+                      </a:solidFill>
+                      <a:prstDash val="solid"/>
+                      <a:round/>
+                      <a:headEnd type="none" w="med" len="med"/>
+                      <a:tailEnd type="none" w="med" len="med"/>
+                    </a:lnL>
+                    <a:lnR w="12700" cap="flat" cmpd="sng" algn="ctr">
+                      <a:solidFill>
+                        <a:schemeClr val="tx1"/>
+                      </a:solidFill>
+                      <a:prstDash val="solid"/>
+                      <a:round/>
+                      <a:headEnd type="none" w="med" len="med"/>
+                      <a:tailEnd type="none" w="med" len="med"/>
+                    </a:lnR>
+                    <a:lnT w="12700" cap="flat" cmpd="sng" algn="ctr">
+                      <a:solidFill>
+                        <a:schemeClr val="tx1"/>
+                      </a:solidFill>
+                      <a:prstDash val="solid"/>
+                      <a:round/>
+                      <a:headEnd type="none" w="med" len="med"/>
+                      <a:tailEnd type="none" w="med" len="med"/>
+                    </a:lnT>
+                    <a:lnB w="12700" cap="flat" cmpd="sng" algn="ctr">
+                      <a:solidFill>
+                        <a:schemeClr val="tx1"/>
+                      </a:solidFill>
+                      <a:prstDash val="solid"/>
+                      <a:round/>
+                      <a:headEnd type="none" w="med" len="med"/>
+                      <a:tailEnd type="none" w="med" len="med"/>
+                    </a:lnB>
+                  </a:tcPr>
+                </a:tc>
+                <a:extLst>
+                  <a:ext uri="{0D108BD9-81ED-4DB2-BD59-A6C34878D82A}">
+                    <a16:rowId xmlns:a16="http://schemas.microsoft.com/office/drawing/2014/main" val="2128684183"/>
+                  </a:ext>
+                </a:extLst>
+              </a:tr>
+              <a:tr h="411480">
+                <a:tc>
+                  <a:txBody>
+                    <a:bodyPr/>
+                    <a:lstStyle/>
+                    <a:p>
+                      <a:pPr algn="l"/>
+                      <a:r>
+                        <a:rPr lang="en-US" sz="1800" dirty="0"/>
+                        <a:t># </a:t>
+                      </a:r>
+                      <a:r>
+                        <a:rPr lang="en-US" sz="1800" dirty="0" smtClean="0"/>
+                        <a:t>unique SNPs (unique index SNPs)</a:t>
+                      </a:r>
+                      <a:endParaRPr lang="en-US" sz="1800" dirty="0"/>
+                    </a:p>
+                  </a:txBody>
+                  <a:tcPr anchor="ctr">
+                    <a:lnL w="12700" cap="flat" cmpd="sng" algn="ctr">
+                      <a:solidFill>
+                        <a:schemeClr val="tx1"/>
+                      </a:solidFill>
+                      <a:prstDash val="solid"/>
+                      <a:round/>
+                      <a:headEnd type="none" w="med" len="med"/>
+                      <a:tailEnd type="none" w="med" len="med"/>
+                    </a:lnL>
+                    <a:lnR w="12700" cap="flat" cmpd="sng" algn="ctr">
+                      <a:solidFill>
+                        <a:schemeClr val="tx1"/>
+                      </a:solidFill>
+                      <a:prstDash val="solid"/>
+                      <a:round/>
+                      <a:headEnd type="none" w="med" len="med"/>
+                      <a:tailEnd type="none" w="med" len="med"/>
+                    </a:lnR>
+                    <a:lnT w="12700" cap="flat" cmpd="sng" algn="ctr">
+                      <a:solidFill>
+                        <a:schemeClr val="tx1"/>
+                      </a:solidFill>
+                      <a:prstDash val="solid"/>
+                      <a:round/>
+                      <a:headEnd type="none" w="med" len="med"/>
+                      <a:tailEnd type="none" w="med" len="med"/>
+                    </a:lnT>
+                    <a:lnB w="12700" cap="flat" cmpd="sng" algn="ctr">
+                      <a:solidFill>
+                        <a:schemeClr val="tx1"/>
+                      </a:solidFill>
+                      <a:prstDash val="solid"/>
+                      <a:round/>
+                      <a:headEnd type="none" w="med" len="med"/>
+                      <a:tailEnd type="none" w="med" len="med"/>
+                    </a:lnB>
+                  </a:tcPr>
+                </a:tc>
+                <a:tc>
+                  <a:txBody>
+                    <a:bodyPr/>
+                    <a:lstStyle/>
+                    <a:p>
+                      <a:pPr algn="ctr"/>
+                      <a:r>
+                        <a:rPr lang="en-US" sz="1600" dirty="0" smtClean="0"/>
+                        <a:t>5510 (45)</a:t>
+                      </a:r>
+                      <a:endParaRPr lang="en-US" sz="1600" dirty="0"/>
+                    </a:p>
+                  </a:txBody>
+                  <a:tcPr anchor="ctr">
+                    <a:lnL w="12700" cap="flat" cmpd="sng" algn="ctr">
+                      <a:solidFill>
+                        <a:schemeClr val="tx1"/>
+                      </a:solidFill>
+                      <a:prstDash val="solid"/>
+                      <a:round/>
+                      <a:headEnd type="none" w="med" len="med"/>
+                      <a:tailEnd type="none" w="med" len="med"/>
+                    </a:lnL>
+                    <a:lnR w="12700" cap="flat" cmpd="sng" algn="ctr">
+                      <a:solidFill>
+                        <a:schemeClr val="tx1"/>
+                      </a:solidFill>
+                      <a:prstDash val="solid"/>
+                      <a:round/>
+                      <a:headEnd type="none" w="med" len="med"/>
+                      <a:tailEnd type="none" w="med" len="med"/>
+                    </a:lnR>
+                    <a:lnT w="12700" cap="flat" cmpd="sng" algn="ctr">
+                      <a:solidFill>
+                        <a:schemeClr val="tx1"/>
+                      </a:solidFill>
+                      <a:prstDash val="solid"/>
+                      <a:round/>
+                      <a:headEnd type="none" w="med" len="med"/>
+                      <a:tailEnd type="none" w="med" len="med"/>
+                    </a:lnT>
+                    <a:lnB w="12700" cap="flat" cmpd="sng" algn="ctr">
+                      <a:solidFill>
+                        <a:schemeClr val="tx1"/>
+                      </a:solidFill>
+                      <a:prstDash val="solid"/>
+                      <a:round/>
+                      <a:headEnd type="none" w="med" len="med"/>
+                      <a:tailEnd type="none" w="med" len="med"/>
+                    </a:lnB>
+                  </a:tcPr>
+                </a:tc>
+                <a:tc>
+                  <a:txBody>
+                    <a:bodyPr/>
+                    <a:lstStyle/>
+                    <a:p>
+                      <a:pPr algn="ctr"/>
+                      <a:r>
+                        <a:rPr lang="en-US" sz="1600" dirty="0" smtClean="0"/>
+                        <a:t>6780 (52)</a:t>
+                      </a:r>
+                      <a:endParaRPr lang="en-US" sz="1600" dirty="0"/>
+                    </a:p>
+                  </a:txBody>
+                  <a:tcPr anchor="ctr">
+                    <a:lnL w="12700" cap="flat" cmpd="sng" algn="ctr">
+                      <a:solidFill>
+                        <a:schemeClr val="tx1"/>
+                      </a:solidFill>
+                      <a:prstDash val="solid"/>
+                      <a:round/>
+                      <a:headEnd type="none" w="med" len="med"/>
+                      <a:tailEnd type="none" w="med" len="med"/>
+                    </a:lnL>
+                    <a:lnR w="12700" cap="flat" cmpd="sng" algn="ctr">
+                      <a:solidFill>
+                        <a:schemeClr val="tx1"/>
+                      </a:solidFill>
+                      <a:prstDash val="solid"/>
+                      <a:round/>
+                      <a:headEnd type="none" w="med" len="med"/>
+                      <a:tailEnd type="none" w="med" len="med"/>
+                    </a:lnR>
+                    <a:lnT w="12700" cap="flat" cmpd="sng" algn="ctr">
+                      <a:solidFill>
+                        <a:schemeClr val="tx1"/>
+                      </a:solidFill>
+                      <a:prstDash val="solid"/>
+                      <a:round/>
+                      <a:headEnd type="none" w="med" len="med"/>
+                      <a:tailEnd type="none" w="med" len="med"/>
+                    </a:lnT>
+                    <a:lnB w="12700" cap="flat" cmpd="sng" algn="ctr">
+                      <a:solidFill>
+                        <a:schemeClr val="tx1"/>
+                      </a:solidFill>
+                      <a:prstDash val="solid"/>
+                      <a:round/>
+                      <a:headEnd type="none" w="med" len="med"/>
+                      <a:tailEnd type="none" w="med" len="med"/>
+                    </a:lnB>
+                  </a:tcPr>
+                </a:tc>
+                <a:extLst>
+                  <a:ext uri="{0D108BD9-81ED-4DB2-BD59-A6C34878D82A}">
+                    <a16:rowId xmlns:a16="http://schemas.microsoft.com/office/drawing/2014/main" val="1681956944"/>
+                  </a:ext>
+                </a:extLst>
+              </a:tr>
+            </a:tbl>
+          </a:graphicData>
+        </a:graphic>
+      </p:graphicFrame>
+      <p:sp>
+        <p:nvSpPr>
+          <p:cNvPr id="7" name="Rectangle 6"/>
+          <p:cNvSpPr/>
+          <p:nvPr/>
+        </p:nvSpPr>
+        <p:spPr>
+          <a:xfrm>
+            <a:off x="734781" y="3399782"/>
+            <a:ext cx="1636602" cy="369332"/>
+          </a:xfrm>
+          <a:prstGeom prst="rect">
+            <a:avLst/>
+          </a:prstGeom>
+        </p:spPr>
+        <p:txBody>
+          <a:bodyPr wrap="none">
+            <a:spAutoFit/>
+          </a:bodyPr>
+          <a:lstStyle/>
+          <a:p>
+            <a:r>
+              <a:rPr lang="en-US" dirty="0"/>
+              <a:t># unique </a:t>
+            </a:r>
+            <a:r>
+              <a:rPr lang="en-US" dirty="0" smtClean="0"/>
+              <a:t>SNPs: </a:t>
+            </a:r>
+            <a:endParaRPr lang="en-US" dirty="0"/>
+          </a:p>
+        </p:txBody>
+      </p:sp>
+      <p:sp>
+        <p:nvSpPr>
+          <p:cNvPr id="8" name="Rectangle 7"/>
+          <p:cNvSpPr/>
+          <p:nvPr/>
+        </p:nvSpPr>
+        <p:spPr>
+          <a:xfrm>
+            <a:off x="6553155" y="3399782"/>
+            <a:ext cx="2197396" cy="369332"/>
+          </a:xfrm>
+          <a:prstGeom prst="rect">
+            <a:avLst/>
+          </a:prstGeom>
+        </p:spPr>
+        <p:txBody>
+          <a:bodyPr wrap="none">
+            <a:spAutoFit/>
+          </a:bodyPr>
+          <a:lstStyle/>
+          <a:p>
+            <a:r>
+              <a:rPr lang="en-US" dirty="0"/>
+              <a:t># unique </a:t>
+            </a:r>
+            <a:r>
+              <a:rPr lang="en-US" dirty="0" smtClean="0"/>
+              <a:t>index SNPs: </a:t>
+            </a:r>
+            <a:endParaRPr lang="en-US" dirty="0"/>
+          </a:p>
+        </p:txBody>
+      </p:sp>
+    </p:spTree>
+    <p:extLst>
+      <p:ext uri="{BB962C8B-B14F-4D97-AF65-F5344CB8AC3E}">
+        <p14:creationId xmlns:p14="http://schemas.microsoft.com/office/powerpoint/2010/main" val="750588315"/>
+      </p:ext>
+    </p:extLst>
+  </p:cSld>
+  <p:clrMapOvr>
+    <a:masterClrMapping/>
+  </p:clrMapOvr>
+</p:sld>
+</file>
+
+<file path=ppt/slides/slide6.xml><?xml version="1.0" encoding="utf-8"?>
+<p:sld xmlns:a="http://schemas.openxmlformats.org/drawingml/2006/main" xmlns:r="http://schemas.openxmlformats.org/officeDocument/2006/relationships" xmlns:p="http://schemas.openxmlformats.org/presentationml/2006/main">
+  <p:cSld>
+    <p:spTree>
+      <p:nvGrpSpPr>
+        <p:cNvPr id="1" name=""/>
+        <p:cNvGrpSpPr/>
+        <p:nvPr/>
+      </p:nvGrpSpPr>
+      <p:grpSpPr>
+        <a:xfrm>
+          <a:off x="0" y="0"/>
+          <a:ext cx="0" cy="0"/>
+          <a:chOff x="0" y="0"/>
+          <a:chExt cx="0" cy="0"/>
+        </a:xfrm>
+      </p:grpSpPr>
+      <p:sp>
+        <p:nvSpPr>
+          <p:cNvPr id="2" name="Title 1">
+            <a:extLst>
+              <a:ext uri="{FF2B5EF4-FFF2-40B4-BE49-F238E27FC236}">
+                <a16:creationId xmlns:a16="http://schemas.microsoft.com/office/drawing/2014/main" id="{5CFE0278-5FE9-4F97-9C97-2D0BFFE62AE7}"/>
+              </a:ext>
+            </a:extLst>
+          </p:cNvPr>
+          <p:cNvSpPr>
+            <a:spLocks noGrp="1"/>
+          </p:cNvSpPr>
+          <p:nvPr>
+            <p:ph type="title"/>
+          </p:nvPr>
+        </p:nvSpPr>
+        <p:spPr>
+          <a:xfrm>
+            <a:off x="734781" y="407530"/>
+            <a:ext cx="10058400" cy="839291"/>
+          </a:xfrm>
+        </p:spPr>
+        <p:txBody>
+          <a:bodyPr/>
+          <a:lstStyle/>
+          <a:p>
+            <a:r>
+              <a:rPr lang="en-US" dirty="0">
+                <a:latin typeface="+mn-lt"/>
+              </a:rPr>
+              <a:t>Overall </a:t>
+            </a:r>
+            <a:r>
+              <a:rPr lang="en-US" dirty="0" err="1">
+                <a:latin typeface="+mn-lt"/>
+              </a:rPr>
+              <a:t>eQTLs</a:t>
+            </a:r>
+            <a:r>
+              <a:rPr lang="en-US" dirty="0">
+                <a:latin typeface="+mn-lt"/>
+              </a:rPr>
+              <a:t> at </a:t>
+            </a:r>
+            <a:r>
+              <a:rPr lang="en-US" dirty="0" smtClean="0">
+                <a:latin typeface="+mn-lt"/>
+              </a:rPr>
+              <a:t>FDR &lt; 1% </a:t>
+            </a:r>
+            <a:r>
+              <a:rPr lang="en-US" dirty="0"/>
+              <a:t>- </a:t>
+            </a:r>
+            <a:r>
+              <a:rPr lang="en-US" dirty="0" err="1"/>
+              <a:t>rAggr</a:t>
+            </a:r>
+            <a:endParaRPr lang="en-US" dirty="0">
+              <a:latin typeface="+mn-lt"/>
+            </a:endParaRPr>
+          </a:p>
+        </p:txBody>
+      </p:sp>
+      <p:graphicFrame>
+        <p:nvGraphicFramePr>
+          <p:cNvPr id="3" name="Table 2">
+            <a:extLst>
+              <a:ext uri="{FF2B5EF4-FFF2-40B4-BE49-F238E27FC236}">
+                <a16:creationId xmlns:a16="http://schemas.microsoft.com/office/drawing/2014/main" id="{6EAA19EE-3291-48DC-BC9A-993BC172CA21}"/>
+              </a:ext>
+            </a:extLst>
+          </p:cNvPr>
+          <p:cNvGraphicFramePr>
+            <a:graphicFrameLocks noGrp="1"/>
+          </p:cNvGraphicFramePr>
+          <p:nvPr>
+            <p:extLst>
+              <p:ext uri="{D42A27DB-BD31-4B8C-83A1-F6EECF244321}">
+                <p14:modId xmlns:p14="http://schemas.microsoft.com/office/powerpoint/2010/main" val="2895277277"/>
+              </p:ext>
+            </p:extLst>
+          </p:nvPr>
+        </p:nvGraphicFramePr>
+        <p:xfrm>
+          <a:off x="588578" y="1487828"/>
+          <a:ext cx="8632033" cy="2933842"/>
+        </p:xfrm>
+        <a:graphic>
+          <a:graphicData uri="http://schemas.openxmlformats.org/drawingml/2006/table">
+            <a:tbl>
+              <a:tblPr firstRow="1" bandRow="1">
+                <a:tableStyleId>{2D5ABB26-0587-4C30-8999-92F81FD0307C}</a:tableStyleId>
+              </a:tblPr>
+              <a:tblGrid>
+                <a:gridCol w="4412955">
+                  <a:extLst>
+                    <a:ext uri="{9D8B030D-6E8A-4147-A177-3AD203B41FA5}">
+                      <a16:colId xmlns:a16="http://schemas.microsoft.com/office/drawing/2014/main" val="1143890325"/>
+                    </a:ext>
+                  </a:extLst>
+                </a:gridCol>
+                <a:gridCol w="2109539">
+                  <a:extLst>
+                    <a:ext uri="{9D8B030D-6E8A-4147-A177-3AD203B41FA5}">
+                      <a16:colId xmlns:a16="http://schemas.microsoft.com/office/drawing/2014/main" val="3732076525"/>
+                    </a:ext>
+                  </a:extLst>
+                </a:gridCol>
+                <a:gridCol w="2109539">
+                  <a:extLst>
+                    <a:ext uri="{9D8B030D-6E8A-4147-A177-3AD203B41FA5}">
+                      <a16:colId xmlns:a16="http://schemas.microsoft.com/office/drawing/2014/main" val="953123779"/>
+                    </a:ext>
+                  </a:extLst>
+                </a:gridCol>
+              </a:tblGrid>
+              <a:tr h="464962">
+                <a:tc>
+                  <a:txBody>
+                    <a:bodyPr/>
+                    <a:lstStyle/>
+                    <a:p>
+                      <a:pPr algn="ctr"/>
+                      <a:endParaRPr lang="en-US" sz="1800" dirty="0"/>
+                    </a:p>
+                  </a:txBody>
+                  <a:tcPr anchor="ctr">
+                    <a:lnL w="12700" cap="flat" cmpd="sng" algn="ctr">
+                      <a:solidFill>
+                        <a:schemeClr val="tx1"/>
+                      </a:solidFill>
+                      <a:prstDash val="solid"/>
+                      <a:round/>
+                      <a:headEnd type="none" w="med" len="med"/>
+                      <a:tailEnd type="none" w="med" len="med"/>
+                    </a:lnL>
+                    <a:lnR w="12700" cap="flat" cmpd="sng" algn="ctr">
+                      <a:solidFill>
+                        <a:schemeClr val="tx1"/>
+                      </a:solidFill>
+                      <a:prstDash val="solid"/>
+                      <a:round/>
+                      <a:headEnd type="none" w="med" len="med"/>
+                      <a:tailEnd type="none" w="med" len="med"/>
+                    </a:lnR>
+                    <a:lnT w="12700" cap="flat" cmpd="sng" algn="ctr">
+                      <a:solidFill>
+                        <a:schemeClr val="tx1"/>
+                      </a:solidFill>
+                      <a:prstDash val="solid"/>
+                      <a:round/>
+                      <a:headEnd type="none" w="med" len="med"/>
+                      <a:tailEnd type="none" w="med" len="med"/>
+                    </a:lnT>
+                    <a:lnB w="12700" cap="flat" cmpd="sng" algn="ctr">
+                      <a:solidFill>
+                        <a:schemeClr val="tx1"/>
+                      </a:solidFill>
+                      <a:prstDash val="solid"/>
+                      <a:round/>
+                      <a:headEnd type="none" w="med" len="med"/>
+                      <a:tailEnd type="none" w="med" len="med"/>
+                    </a:lnB>
+                  </a:tcPr>
+                </a:tc>
+                <a:tc>
+                  <a:txBody>
+                    <a:bodyPr/>
+                    <a:lstStyle/>
+                    <a:p>
+                      <a:pPr algn="ctr"/>
+                      <a:r>
+                        <a:rPr lang="en-US" sz="1800" dirty="0" smtClean="0"/>
+                        <a:t>Hippocampus</a:t>
+                      </a:r>
+                      <a:endParaRPr lang="en-US" sz="1800" dirty="0"/>
+                    </a:p>
+                  </a:txBody>
+                  <a:tcPr anchor="ctr">
+                    <a:lnL w="12700" cap="flat" cmpd="sng" algn="ctr">
+                      <a:solidFill>
+                        <a:schemeClr val="tx1"/>
+                      </a:solidFill>
+                      <a:prstDash val="solid"/>
+                      <a:round/>
+                      <a:headEnd type="none" w="med" len="med"/>
+                      <a:tailEnd type="none" w="med" len="med"/>
+                    </a:lnL>
+                    <a:lnR w="12700" cap="flat" cmpd="sng" algn="ctr">
+                      <a:solidFill>
+                        <a:schemeClr val="tx1"/>
+                      </a:solidFill>
+                      <a:prstDash val="solid"/>
+                      <a:round/>
+                      <a:headEnd type="none" w="med" len="med"/>
+                      <a:tailEnd type="none" w="med" len="med"/>
+                    </a:lnR>
+                    <a:lnT w="12700" cap="flat" cmpd="sng" algn="ctr">
+                      <a:solidFill>
+                        <a:schemeClr val="tx1"/>
+                      </a:solidFill>
+                      <a:prstDash val="solid"/>
+                      <a:round/>
+                      <a:headEnd type="none" w="med" len="med"/>
+                      <a:tailEnd type="none" w="med" len="med"/>
+                    </a:lnT>
+                    <a:lnB w="12700" cap="flat" cmpd="sng" algn="ctr">
+                      <a:solidFill>
+                        <a:schemeClr val="tx1"/>
+                      </a:solidFill>
+                      <a:prstDash val="solid"/>
+                      <a:round/>
+                      <a:headEnd type="none" w="med" len="med"/>
+                      <a:tailEnd type="none" w="med" len="med"/>
+                    </a:lnB>
+                  </a:tcPr>
+                </a:tc>
+                <a:tc>
+                  <a:txBody>
+                    <a:bodyPr/>
+                    <a:lstStyle/>
+                    <a:p>
+                      <a:pPr algn="ctr"/>
+                      <a:r>
+                        <a:rPr lang="en-US" sz="1800" dirty="0"/>
+                        <a:t>DLPFC</a:t>
+                      </a:r>
+                    </a:p>
+                  </a:txBody>
+                  <a:tcPr anchor="ctr">
+                    <a:lnL w="12700" cap="flat" cmpd="sng" algn="ctr">
+                      <a:solidFill>
+                        <a:schemeClr val="tx1"/>
+                      </a:solidFill>
+                      <a:prstDash val="solid"/>
+                      <a:round/>
+                      <a:headEnd type="none" w="med" len="med"/>
+                      <a:tailEnd type="none" w="med" len="med"/>
+                    </a:lnL>
+                    <a:lnR w="12700" cap="flat" cmpd="sng" algn="ctr">
+                      <a:solidFill>
+                        <a:schemeClr val="tx1"/>
+                      </a:solidFill>
+                      <a:prstDash val="solid"/>
+                      <a:round/>
+                      <a:headEnd type="none" w="med" len="med"/>
+                      <a:tailEnd type="none" w="med" len="med"/>
+                    </a:lnR>
+                    <a:lnT w="12700" cap="flat" cmpd="sng" algn="ctr">
+                      <a:solidFill>
+                        <a:schemeClr val="tx1"/>
+                      </a:solidFill>
+                      <a:prstDash val="solid"/>
+                      <a:round/>
+                      <a:headEnd type="none" w="med" len="med"/>
+                      <a:tailEnd type="none" w="med" len="med"/>
+                    </a:lnT>
+                    <a:lnB w="12700" cap="flat" cmpd="sng" algn="ctr">
+                      <a:solidFill>
+                        <a:schemeClr val="tx1"/>
+                      </a:solidFill>
+                      <a:prstDash val="solid"/>
+                      <a:round/>
+                      <a:headEnd type="none" w="med" len="med"/>
+                      <a:tailEnd type="none" w="med" len="med"/>
+                    </a:lnB>
+                  </a:tcPr>
+                </a:tc>
+                <a:extLst>
+                  <a:ext uri="{0D108BD9-81ED-4DB2-BD59-A6C34878D82A}">
+                    <a16:rowId xmlns:a16="http://schemas.microsoft.com/office/drawing/2014/main" val="1905010493"/>
+                  </a:ext>
+                </a:extLst>
+              </a:tr>
+              <a:tr h="411480">
+                <a:tc>
+                  <a:txBody>
+                    <a:bodyPr/>
+                    <a:lstStyle/>
+                    <a:p>
+                      <a:pPr algn="l"/>
+                      <a:r>
+                        <a:rPr lang="en-US" sz="1800" dirty="0"/>
+                        <a:t># </a:t>
+                      </a:r>
+                      <a:r>
+                        <a:rPr lang="en-US" sz="1800" dirty="0" smtClean="0"/>
+                        <a:t>unique SNPs (unique index SNPs)</a:t>
+                      </a:r>
+                      <a:endParaRPr lang="en-US" sz="1800" dirty="0"/>
+                    </a:p>
+                  </a:txBody>
+                  <a:tcPr anchor="ctr">
+                    <a:lnL w="12700" cap="flat" cmpd="sng" algn="ctr">
+                      <a:solidFill>
+                        <a:schemeClr val="tx1"/>
+                      </a:solidFill>
+                      <a:prstDash val="solid"/>
+                      <a:round/>
+                      <a:headEnd type="none" w="med" len="med"/>
+                      <a:tailEnd type="none" w="med" len="med"/>
+                    </a:lnL>
+                    <a:lnR w="12700" cap="flat" cmpd="sng" algn="ctr">
+                      <a:solidFill>
+                        <a:schemeClr val="tx1"/>
+                      </a:solidFill>
+                      <a:prstDash val="solid"/>
+                      <a:round/>
+                      <a:headEnd type="none" w="med" len="med"/>
+                      <a:tailEnd type="none" w="med" len="med"/>
+                    </a:lnR>
+                    <a:lnT w="12700" cap="flat" cmpd="sng" algn="ctr">
+                      <a:solidFill>
+                        <a:schemeClr val="tx1"/>
+                      </a:solidFill>
+                      <a:prstDash val="solid"/>
+                      <a:round/>
+                      <a:headEnd type="none" w="med" len="med"/>
+                      <a:tailEnd type="none" w="med" len="med"/>
+                    </a:lnT>
+                    <a:lnB w="12700" cap="flat" cmpd="sng" algn="ctr">
+                      <a:solidFill>
+                        <a:schemeClr val="tx1"/>
+                      </a:solidFill>
+                      <a:prstDash val="solid"/>
+                      <a:round/>
+                      <a:headEnd type="none" w="med" len="med"/>
+                      <a:tailEnd type="none" w="med" len="med"/>
+                    </a:lnB>
+                  </a:tcPr>
+                </a:tc>
+                <a:tc>
+                  <a:txBody>
+                    <a:bodyPr/>
+                    <a:lstStyle/>
+                    <a:p>
+                      <a:pPr algn="ctr"/>
+                      <a:r>
+                        <a:rPr lang="en-US" sz="1600" dirty="0" smtClean="0"/>
+                        <a:t>5510 (45)</a:t>
+                      </a:r>
+                      <a:endParaRPr lang="en-US" sz="1600" dirty="0"/>
+                    </a:p>
+                  </a:txBody>
+                  <a:tcPr anchor="ctr">
+                    <a:lnL w="12700" cap="flat" cmpd="sng" algn="ctr">
+                      <a:solidFill>
+                        <a:schemeClr val="tx1"/>
+                      </a:solidFill>
+                      <a:prstDash val="solid"/>
+                      <a:round/>
+                      <a:headEnd type="none" w="med" len="med"/>
+                      <a:tailEnd type="none" w="med" len="med"/>
+                    </a:lnL>
+                    <a:lnR w="12700" cap="flat" cmpd="sng" algn="ctr">
+                      <a:solidFill>
+                        <a:schemeClr val="tx1"/>
+                      </a:solidFill>
+                      <a:prstDash val="solid"/>
+                      <a:round/>
+                      <a:headEnd type="none" w="med" len="med"/>
+                      <a:tailEnd type="none" w="med" len="med"/>
+                    </a:lnR>
+                    <a:lnT w="12700" cap="flat" cmpd="sng" algn="ctr">
+                      <a:solidFill>
+                        <a:schemeClr val="tx1"/>
+                      </a:solidFill>
+                      <a:prstDash val="solid"/>
+                      <a:round/>
+                      <a:headEnd type="none" w="med" len="med"/>
+                      <a:tailEnd type="none" w="med" len="med"/>
+                    </a:lnT>
+                    <a:lnB w="12700" cap="flat" cmpd="sng" algn="ctr">
+                      <a:solidFill>
+                        <a:schemeClr val="tx1"/>
+                      </a:solidFill>
+                      <a:prstDash val="solid"/>
+                      <a:round/>
+                      <a:headEnd type="none" w="med" len="med"/>
+                      <a:tailEnd type="none" w="med" len="med"/>
+                    </a:lnB>
+                  </a:tcPr>
+                </a:tc>
+                <a:tc>
+                  <a:txBody>
+                    <a:bodyPr/>
+                    <a:lstStyle/>
+                    <a:p>
+                      <a:pPr algn="ctr"/>
+                      <a:r>
+                        <a:rPr lang="en-US" sz="1600" dirty="0" smtClean="0"/>
+                        <a:t>6780 (52)</a:t>
+                      </a:r>
+                      <a:endParaRPr lang="en-US" sz="1600" dirty="0"/>
+                    </a:p>
+                  </a:txBody>
+                  <a:tcPr anchor="ctr">
+                    <a:lnL w="12700" cap="flat" cmpd="sng" algn="ctr">
+                      <a:solidFill>
+                        <a:schemeClr val="tx1"/>
+                      </a:solidFill>
+                      <a:prstDash val="solid"/>
+                      <a:round/>
+                      <a:headEnd type="none" w="med" len="med"/>
+                      <a:tailEnd type="none" w="med" len="med"/>
+                    </a:lnL>
+                    <a:lnR w="12700" cap="flat" cmpd="sng" algn="ctr">
+                      <a:solidFill>
+                        <a:schemeClr val="tx1"/>
+                      </a:solidFill>
+                      <a:prstDash val="solid"/>
+                      <a:round/>
+                      <a:headEnd type="none" w="med" len="med"/>
+                      <a:tailEnd type="none" w="med" len="med"/>
+                    </a:lnR>
+                    <a:lnT w="12700" cap="flat" cmpd="sng" algn="ctr">
+                      <a:solidFill>
+                        <a:schemeClr val="tx1"/>
+                      </a:solidFill>
+                      <a:prstDash val="solid"/>
+                      <a:round/>
+                      <a:headEnd type="none" w="med" len="med"/>
+                      <a:tailEnd type="none" w="med" len="med"/>
+                    </a:lnT>
+                    <a:lnB w="12700" cap="flat" cmpd="sng" algn="ctr">
+                      <a:solidFill>
+                        <a:schemeClr val="tx1"/>
+                      </a:solidFill>
+                      <a:prstDash val="solid"/>
+                      <a:round/>
+                      <a:headEnd type="none" w="med" len="med"/>
+                      <a:tailEnd type="none" w="med" len="med"/>
+                    </a:lnB>
+                  </a:tcPr>
+                </a:tc>
+                <a:extLst>
+                  <a:ext uri="{0D108BD9-81ED-4DB2-BD59-A6C34878D82A}">
+                    <a16:rowId xmlns:a16="http://schemas.microsoft.com/office/drawing/2014/main" val="578274855"/>
+                  </a:ext>
+                </a:extLst>
+              </a:tr>
+              <a:tr h="411480">
+                <a:tc>
+                  <a:txBody>
+                    <a:bodyPr/>
+                    <a:lstStyle/>
+                    <a:p>
+                      <a:pPr algn="l"/>
+                      <a:r>
+                        <a:rPr lang="en-US" sz="1800" dirty="0"/>
+                        <a:t># </a:t>
+                      </a:r>
+                      <a:r>
+                        <a:rPr lang="en-US" sz="1800" dirty="0" smtClean="0"/>
+                        <a:t>unique features</a:t>
+                      </a:r>
+                      <a:endParaRPr lang="en-US" sz="1800" dirty="0"/>
+                    </a:p>
+                  </a:txBody>
+                  <a:tcPr anchor="ctr">
+                    <a:lnL w="12700" cap="flat" cmpd="sng" algn="ctr">
+                      <a:solidFill>
+                        <a:schemeClr val="tx1"/>
+                      </a:solidFill>
+                      <a:prstDash val="solid"/>
+                      <a:round/>
+                      <a:headEnd type="none" w="med" len="med"/>
+                      <a:tailEnd type="none" w="med" len="med"/>
+                    </a:lnL>
+                    <a:lnR w="12700" cap="flat" cmpd="sng" algn="ctr">
+                      <a:solidFill>
+                        <a:schemeClr val="tx1"/>
+                      </a:solidFill>
+                      <a:prstDash val="solid"/>
+                      <a:round/>
+                      <a:headEnd type="none" w="med" len="med"/>
+                      <a:tailEnd type="none" w="med" len="med"/>
+                    </a:lnR>
+                    <a:lnT w="12700" cap="flat" cmpd="sng" algn="ctr">
+                      <a:solidFill>
+                        <a:schemeClr val="tx1"/>
+                      </a:solidFill>
+                      <a:prstDash val="solid"/>
+                      <a:round/>
+                      <a:headEnd type="none" w="med" len="med"/>
+                      <a:tailEnd type="none" w="med" len="med"/>
+                    </a:lnT>
+                    <a:lnB w="12700" cap="flat" cmpd="sng" algn="ctr">
+                      <a:solidFill>
+                        <a:schemeClr val="bg1">
+                          <a:lumMod val="65000"/>
+                        </a:schemeClr>
+                      </a:solidFill>
+                      <a:prstDash val="solid"/>
+                      <a:round/>
+                      <a:headEnd type="none" w="med" len="med"/>
+                      <a:tailEnd type="none" w="med" len="med"/>
+                    </a:lnB>
+                  </a:tcPr>
+                </a:tc>
+                <a:tc>
+                  <a:txBody>
+                    <a:bodyPr/>
+                    <a:lstStyle/>
+                    <a:p>
+                      <a:pPr marL="0" marR="0" lvl="0" indent="0" algn="ctr" defTabSz="914400" rtl="0" eaLnBrk="1" fontAlgn="auto" latinLnBrk="0" hangingPunct="1">
+                        <a:lnSpc>
+                          <a:spcPct val="100000"/>
+                        </a:lnSpc>
+                        <a:spcBef>
+                          <a:spcPts val="0"/>
+                        </a:spcBef>
+                        <a:spcAft>
+                          <a:spcPts val="0"/>
+                        </a:spcAft>
+                        <a:buClrTx/>
+                        <a:buSzTx/>
+                        <a:buFontTx/>
+                        <a:buNone/>
+                        <a:tabLst/>
+                        <a:defRPr/>
+                      </a:pPr>
+                      <a:r>
+                        <a:rPr lang="en-US" sz="1600" dirty="0" smtClean="0"/>
+                        <a:t>1731</a:t>
+                      </a:r>
+                    </a:p>
+                  </a:txBody>
+                  <a:tcPr anchor="ctr">
+                    <a:lnL w="12700" cap="flat" cmpd="sng" algn="ctr">
+                      <a:solidFill>
+                        <a:schemeClr val="tx1"/>
+                      </a:solidFill>
+                      <a:prstDash val="solid"/>
+                      <a:round/>
+                      <a:headEnd type="none" w="med" len="med"/>
+                      <a:tailEnd type="none" w="med" len="med"/>
+                    </a:lnL>
+                    <a:lnR w="12700" cap="flat" cmpd="sng" algn="ctr">
+                      <a:solidFill>
+                        <a:schemeClr val="tx1"/>
+                      </a:solidFill>
+                      <a:prstDash val="solid"/>
+                      <a:round/>
+                      <a:headEnd type="none" w="med" len="med"/>
+                      <a:tailEnd type="none" w="med" len="med"/>
+                    </a:lnR>
+                    <a:lnT w="12700" cap="flat" cmpd="sng" algn="ctr">
+                      <a:solidFill>
+                        <a:schemeClr val="tx1"/>
+                      </a:solidFill>
+                      <a:prstDash val="solid"/>
+                      <a:round/>
+                      <a:headEnd type="none" w="med" len="med"/>
+                      <a:tailEnd type="none" w="med" len="med"/>
+                    </a:lnT>
+                    <a:lnB w="12700" cap="flat" cmpd="sng" algn="ctr">
+                      <a:solidFill>
+                        <a:schemeClr val="bg1">
+                          <a:lumMod val="65000"/>
+                        </a:schemeClr>
+                      </a:solidFill>
+                      <a:prstDash val="solid"/>
+                      <a:round/>
+                      <a:headEnd type="none" w="med" len="med"/>
+                      <a:tailEnd type="none" w="med" len="med"/>
+                    </a:lnB>
+                  </a:tcPr>
+                </a:tc>
+                <a:tc>
+                  <a:txBody>
+                    <a:bodyPr/>
+                    <a:lstStyle/>
+                    <a:p>
+                      <a:pPr algn="ctr"/>
+                      <a:r>
+                        <a:rPr lang="en-US" sz="1600" dirty="0" smtClean="0"/>
+                        <a:t>2525</a:t>
+                      </a:r>
+                      <a:endParaRPr lang="en-US" sz="1600" dirty="0"/>
+                    </a:p>
+                  </a:txBody>
+                  <a:tcPr anchor="ctr">
+                    <a:lnL w="12700" cap="flat" cmpd="sng" algn="ctr">
+                      <a:solidFill>
+                        <a:schemeClr val="tx1"/>
+                      </a:solidFill>
+                      <a:prstDash val="solid"/>
+                      <a:round/>
+                      <a:headEnd type="none" w="med" len="med"/>
+                      <a:tailEnd type="none" w="med" len="med"/>
+                    </a:lnL>
+                    <a:lnR w="12700" cap="flat" cmpd="sng" algn="ctr">
+                      <a:solidFill>
+                        <a:schemeClr val="tx1"/>
+                      </a:solidFill>
+                      <a:prstDash val="solid"/>
+                      <a:round/>
+                      <a:headEnd type="none" w="med" len="med"/>
+                      <a:tailEnd type="none" w="med" len="med"/>
+                    </a:lnR>
+                    <a:lnT w="12700" cap="flat" cmpd="sng" algn="ctr">
+                      <a:solidFill>
+                        <a:schemeClr val="tx1"/>
+                      </a:solidFill>
+                      <a:prstDash val="solid"/>
+                      <a:round/>
+                      <a:headEnd type="none" w="med" len="med"/>
+                      <a:tailEnd type="none" w="med" len="med"/>
+                    </a:lnT>
+                    <a:lnB w="12700" cap="flat" cmpd="sng" algn="ctr">
+                      <a:solidFill>
+                        <a:schemeClr val="bg1">
+                          <a:lumMod val="65000"/>
+                        </a:schemeClr>
+                      </a:solidFill>
+                      <a:prstDash val="solid"/>
+                      <a:round/>
+                      <a:headEnd type="none" w="med" len="med"/>
+                      <a:tailEnd type="none" w="med" len="med"/>
+                    </a:lnB>
+                  </a:tcPr>
+                </a:tc>
+                <a:extLst>
+                  <a:ext uri="{0D108BD9-81ED-4DB2-BD59-A6C34878D82A}">
+                    <a16:rowId xmlns:a16="http://schemas.microsoft.com/office/drawing/2014/main" val="308442309"/>
+                  </a:ext>
+                </a:extLst>
+              </a:tr>
+              <a:tr h="411480">
+                <a:tc>
+                  <a:txBody>
+                    <a:bodyPr/>
+                    <a:lstStyle/>
+                    <a:p>
+                      <a:pPr algn="l"/>
+                      <a:r>
+                        <a:rPr lang="en-US" sz="1800" dirty="0"/>
+                        <a:t># </a:t>
+                      </a:r>
+                      <a:r>
+                        <a:rPr lang="en-US" sz="1800" dirty="0" smtClean="0"/>
+                        <a:t>Unique genes</a:t>
+                      </a:r>
+                      <a:endParaRPr lang="en-US" sz="1800" dirty="0"/>
+                    </a:p>
+                  </a:txBody>
+                  <a:tcPr marL="548640" anchor="ctr">
+                    <a:lnL w="12700" cap="flat" cmpd="sng" algn="ctr">
+                      <a:solidFill>
+                        <a:schemeClr val="tx1"/>
+                      </a:solidFill>
+                      <a:prstDash val="solid"/>
+                      <a:round/>
+                      <a:headEnd type="none" w="med" len="med"/>
+                      <a:tailEnd type="none" w="med" len="med"/>
+                    </a:lnL>
+                    <a:lnR w="12700" cap="flat" cmpd="sng" algn="ctr">
+                      <a:solidFill>
+                        <a:schemeClr val="tx1"/>
+                      </a:solidFill>
+                      <a:prstDash val="solid"/>
+                      <a:round/>
+                      <a:headEnd type="none" w="med" len="med"/>
+                      <a:tailEnd type="none" w="med" len="med"/>
+                    </a:lnR>
+                    <a:lnT w="12700" cap="flat" cmpd="sng" algn="ctr">
+                      <a:solidFill>
+                        <a:schemeClr val="bg1">
+                          <a:lumMod val="65000"/>
+                        </a:schemeClr>
+                      </a:solidFill>
+                      <a:prstDash val="solid"/>
+                      <a:round/>
+                      <a:headEnd type="none" w="med" len="med"/>
+                      <a:tailEnd type="none" w="med" len="med"/>
+                    </a:lnT>
+                    <a:lnB w="12700" cap="flat" cmpd="sng" algn="ctr">
+                      <a:solidFill>
+                        <a:schemeClr val="bg1">
+                          <a:lumMod val="65000"/>
+                        </a:schemeClr>
+                      </a:solidFill>
+                      <a:prstDash val="solid"/>
+                      <a:round/>
+                      <a:headEnd type="none" w="med" len="med"/>
+                      <a:tailEnd type="none" w="med" len="med"/>
+                    </a:lnB>
+                  </a:tcPr>
+                </a:tc>
+                <a:tc>
+                  <a:txBody>
+                    <a:bodyPr/>
+                    <a:lstStyle/>
+                    <a:p>
+                      <a:pPr marL="0" marR="0" lvl="0" indent="0" algn="ctr" defTabSz="914400" rtl="0" eaLnBrk="1" fontAlgn="auto" latinLnBrk="0" hangingPunct="1">
+                        <a:lnSpc>
+                          <a:spcPct val="100000"/>
+                        </a:lnSpc>
+                        <a:spcBef>
+                          <a:spcPts val="0"/>
+                        </a:spcBef>
+                        <a:spcAft>
+                          <a:spcPts val="0"/>
+                        </a:spcAft>
+                        <a:buClrTx/>
+                        <a:buSzTx/>
+                        <a:buFontTx/>
+                        <a:buNone/>
+                        <a:tabLst/>
+                        <a:defRPr/>
+                      </a:pPr>
+                      <a:r>
+                        <a:rPr lang="en-US" sz="1600" dirty="0" smtClean="0"/>
+                        <a:t>123</a:t>
+                      </a:r>
+                    </a:p>
+                  </a:txBody>
+                  <a:tcPr anchor="ctr">
+                    <a:lnL w="12700" cap="flat" cmpd="sng" algn="ctr">
+                      <a:solidFill>
+                        <a:schemeClr val="tx1"/>
+                      </a:solidFill>
+                      <a:prstDash val="solid"/>
+                      <a:round/>
+                      <a:headEnd type="none" w="med" len="med"/>
+                      <a:tailEnd type="none" w="med" len="med"/>
+                    </a:lnL>
+                    <a:lnR w="12700" cap="flat" cmpd="sng" algn="ctr">
+                      <a:solidFill>
+                        <a:schemeClr val="tx1"/>
+                      </a:solidFill>
+                      <a:prstDash val="solid"/>
+                      <a:round/>
+                      <a:headEnd type="none" w="med" len="med"/>
+                      <a:tailEnd type="none" w="med" len="med"/>
+                    </a:lnR>
+                    <a:lnT w="12700" cap="flat" cmpd="sng" algn="ctr">
+                      <a:solidFill>
+                        <a:schemeClr val="bg1">
+                          <a:lumMod val="65000"/>
+                        </a:schemeClr>
+                      </a:solidFill>
+                      <a:prstDash val="solid"/>
+                      <a:round/>
+                      <a:headEnd type="none" w="med" len="med"/>
+                      <a:tailEnd type="none" w="med" len="med"/>
+                    </a:lnT>
+                    <a:lnB w="12700" cap="flat" cmpd="sng" algn="ctr">
+                      <a:solidFill>
+                        <a:schemeClr val="bg1">
+                          <a:lumMod val="65000"/>
+                        </a:schemeClr>
+                      </a:solidFill>
+                      <a:prstDash val="solid"/>
+                      <a:round/>
+                      <a:headEnd type="none" w="med" len="med"/>
+                      <a:tailEnd type="none" w="med" len="med"/>
+                    </a:lnB>
+                  </a:tcPr>
+                </a:tc>
+                <a:tc>
+                  <a:txBody>
+                    <a:bodyPr/>
+                    <a:lstStyle/>
+                    <a:p>
+                      <a:pPr algn="ctr"/>
+                      <a:r>
+                        <a:rPr lang="en-US" sz="1600" dirty="0" smtClean="0"/>
+                        <a:t>171</a:t>
+                      </a:r>
+                      <a:endParaRPr lang="en-US" sz="1600" dirty="0"/>
+                    </a:p>
+                  </a:txBody>
+                  <a:tcPr anchor="ctr">
+                    <a:lnL w="12700" cap="flat" cmpd="sng" algn="ctr">
+                      <a:solidFill>
+                        <a:schemeClr val="tx1"/>
+                      </a:solidFill>
+                      <a:prstDash val="solid"/>
+                      <a:round/>
+                      <a:headEnd type="none" w="med" len="med"/>
+                      <a:tailEnd type="none" w="med" len="med"/>
+                    </a:lnL>
+                    <a:lnR w="12700" cap="flat" cmpd="sng" algn="ctr">
+                      <a:solidFill>
+                        <a:schemeClr val="tx1"/>
+                      </a:solidFill>
+                      <a:prstDash val="solid"/>
+                      <a:round/>
+                      <a:headEnd type="none" w="med" len="med"/>
+                      <a:tailEnd type="none" w="med" len="med"/>
+                    </a:lnR>
+                    <a:lnT w="12700" cap="flat" cmpd="sng" algn="ctr">
+                      <a:solidFill>
+                        <a:schemeClr val="bg1">
+                          <a:lumMod val="65000"/>
+                        </a:schemeClr>
+                      </a:solidFill>
+                      <a:prstDash val="solid"/>
+                      <a:round/>
+                      <a:headEnd type="none" w="med" len="med"/>
+                      <a:tailEnd type="none" w="med" len="med"/>
+                    </a:lnT>
+                    <a:lnB w="12700" cap="flat" cmpd="sng" algn="ctr">
+                      <a:solidFill>
+                        <a:schemeClr val="bg1">
+                          <a:lumMod val="65000"/>
+                        </a:schemeClr>
+                      </a:solidFill>
+                      <a:prstDash val="solid"/>
+                      <a:round/>
+                      <a:headEnd type="none" w="med" len="med"/>
+                      <a:tailEnd type="none" w="med" len="med"/>
+                    </a:lnB>
+                  </a:tcPr>
+                </a:tc>
+                <a:extLst>
+                  <a:ext uri="{0D108BD9-81ED-4DB2-BD59-A6C34878D82A}">
+                    <a16:rowId xmlns:a16="http://schemas.microsoft.com/office/drawing/2014/main" val="2278071081"/>
+                  </a:ext>
+                </a:extLst>
+              </a:tr>
+              <a:tr h="411480">
+                <a:tc>
+                  <a:txBody>
+                    <a:bodyPr/>
+                    <a:lstStyle/>
+                    <a:p>
+                      <a:pPr marL="0" marR="0" lvl="0" indent="0" algn="l" defTabSz="914400" rtl="0" eaLnBrk="1" fontAlgn="auto" latinLnBrk="0" hangingPunct="1">
+                        <a:lnSpc>
+                          <a:spcPct val="100000"/>
+                        </a:lnSpc>
+                        <a:spcBef>
+                          <a:spcPts val="0"/>
+                        </a:spcBef>
+                        <a:spcAft>
+                          <a:spcPts val="0"/>
+                        </a:spcAft>
+                        <a:buClrTx/>
+                        <a:buSzTx/>
+                        <a:buFontTx/>
+                        <a:buNone/>
+                        <a:tabLst/>
+                        <a:defRPr/>
+                      </a:pPr>
+                      <a:r>
+                        <a:rPr lang="en-US" sz="1800" dirty="0"/>
+                        <a:t># </a:t>
+                      </a:r>
+                      <a:r>
+                        <a:rPr lang="en-US" sz="1800" dirty="0" smtClean="0"/>
+                        <a:t>Unique transcripts</a:t>
+                      </a:r>
+                    </a:p>
+                  </a:txBody>
+                  <a:tcPr marL="548640" anchor="ctr">
+                    <a:lnL w="12700" cap="flat" cmpd="sng" algn="ctr">
+                      <a:solidFill>
+                        <a:schemeClr val="tx1"/>
+                      </a:solidFill>
+                      <a:prstDash val="solid"/>
+                      <a:round/>
+                      <a:headEnd type="none" w="med" len="med"/>
+                      <a:tailEnd type="none" w="med" len="med"/>
+                    </a:lnL>
+                    <a:lnR w="12700" cap="flat" cmpd="sng" algn="ctr">
+                      <a:solidFill>
+                        <a:schemeClr val="tx1"/>
+                      </a:solidFill>
+                      <a:prstDash val="solid"/>
+                      <a:round/>
+                      <a:headEnd type="none" w="med" len="med"/>
+                      <a:tailEnd type="none" w="med" len="med"/>
+                    </a:lnR>
+                    <a:lnT w="12700" cap="flat" cmpd="sng" algn="ctr">
+                      <a:solidFill>
+                        <a:schemeClr val="bg1">
+                          <a:lumMod val="65000"/>
+                        </a:schemeClr>
+                      </a:solidFill>
+                      <a:prstDash val="solid"/>
+                      <a:round/>
+                      <a:headEnd type="none" w="med" len="med"/>
+                      <a:tailEnd type="none" w="med" len="med"/>
+                    </a:lnT>
+                    <a:lnB w="12700" cap="flat" cmpd="sng" algn="ctr">
+                      <a:solidFill>
+                        <a:schemeClr val="bg1">
+                          <a:lumMod val="65000"/>
+                        </a:schemeClr>
+                      </a:solidFill>
+                      <a:prstDash val="solid"/>
+                      <a:round/>
+                      <a:headEnd type="none" w="med" len="med"/>
+                      <a:tailEnd type="none" w="med" len="med"/>
+                    </a:lnB>
+                  </a:tcPr>
+                </a:tc>
+                <a:tc>
+                  <a:txBody>
+                    <a:bodyPr/>
+                    <a:lstStyle/>
+                    <a:p>
+                      <a:pPr marL="0" marR="0" lvl="0" indent="0" algn="ctr" defTabSz="914400" rtl="0" eaLnBrk="1" fontAlgn="auto" latinLnBrk="0" hangingPunct="1">
+                        <a:lnSpc>
+                          <a:spcPct val="100000"/>
+                        </a:lnSpc>
+                        <a:spcBef>
+                          <a:spcPts val="0"/>
+                        </a:spcBef>
+                        <a:spcAft>
+                          <a:spcPts val="0"/>
+                        </a:spcAft>
+                        <a:buClrTx/>
+                        <a:buSzTx/>
+                        <a:buFontTx/>
+                        <a:buNone/>
+                        <a:tabLst/>
+                        <a:defRPr/>
+                      </a:pPr>
+                      <a:r>
+                        <a:rPr lang="en-US" sz="1600" dirty="0" smtClean="0"/>
+                        <a:t>244</a:t>
+                      </a:r>
+                    </a:p>
+                  </a:txBody>
+                  <a:tcPr anchor="ctr">
+                    <a:lnL w="12700" cap="flat" cmpd="sng" algn="ctr">
+                      <a:solidFill>
+                        <a:schemeClr val="tx1"/>
+                      </a:solidFill>
+                      <a:prstDash val="solid"/>
+                      <a:round/>
+                      <a:headEnd type="none" w="med" len="med"/>
+                      <a:tailEnd type="none" w="med" len="med"/>
+                    </a:lnL>
+                    <a:lnR w="12700" cap="flat" cmpd="sng" algn="ctr">
+                      <a:solidFill>
+                        <a:schemeClr val="tx1"/>
+                      </a:solidFill>
+                      <a:prstDash val="solid"/>
+                      <a:round/>
+                      <a:headEnd type="none" w="med" len="med"/>
+                      <a:tailEnd type="none" w="med" len="med"/>
+                    </a:lnR>
+                    <a:lnT w="12700" cap="flat" cmpd="sng" algn="ctr">
+                      <a:solidFill>
+                        <a:schemeClr val="bg1">
+                          <a:lumMod val="65000"/>
+                        </a:schemeClr>
+                      </a:solidFill>
+                      <a:prstDash val="solid"/>
+                      <a:round/>
+                      <a:headEnd type="none" w="med" len="med"/>
+                      <a:tailEnd type="none" w="med" len="med"/>
+                    </a:lnT>
+                    <a:lnB w="12700" cap="flat" cmpd="sng" algn="ctr">
+                      <a:solidFill>
+                        <a:schemeClr val="bg1">
+                          <a:lumMod val="65000"/>
+                        </a:schemeClr>
+                      </a:solidFill>
+                      <a:prstDash val="solid"/>
+                      <a:round/>
+                      <a:headEnd type="none" w="med" len="med"/>
+                      <a:tailEnd type="none" w="med" len="med"/>
+                    </a:lnB>
+                  </a:tcPr>
+                </a:tc>
+                <a:tc>
+                  <a:txBody>
+                    <a:bodyPr/>
+                    <a:lstStyle/>
+                    <a:p>
+                      <a:pPr algn="ctr"/>
+                      <a:r>
+                        <a:rPr lang="en-US" sz="1600" dirty="0" smtClean="0"/>
+                        <a:t>332</a:t>
+                      </a:r>
+                      <a:endParaRPr lang="en-US" sz="1600" dirty="0"/>
+                    </a:p>
+                  </a:txBody>
+                  <a:tcPr anchor="ctr">
+                    <a:lnL w="12700" cap="flat" cmpd="sng" algn="ctr">
+                      <a:solidFill>
+                        <a:schemeClr val="tx1"/>
+                      </a:solidFill>
+                      <a:prstDash val="solid"/>
+                      <a:round/>
+                      <a:headEnd type="none" w="med" len="med"/>
+                      <a:tailEnd type="none" w="med" len="med"/>
+                    </a:lnL>
+                    <a:lnR w="12700" cap="flat" cmpd="sng" algn="ctr">
+                      <a:solidFill>
+                        <a:schemeClr val="tx1"/>
+                      </a:solidFill>
+                      <a:prstDash val="solid"/>
+                      <a:round/>
+                      <a:headEnd type="none" w="med" len="med"/>
+                      <a:tailEnd type="none" w="med" len="med"/>
+                    </a:lnR>
+                    <a:lnT w="12700" cap="flat" cmpd="sng" algn="ctr">
+                      <a:solidFill>
+                        <a:schemeClr val="bg1">
+                          <a:lumMod val="65000"/>
+                        </a:schemeClr>
+                      </a:solidFill>
+                      <a:prstDash val="solid"/>
+                      <a:round/>
+                      <a:headEnd type="none" w="med" len="med"/>
+                      <a:tailEnd type="none" w="med" len="med"/>
+                    </a:lnT>
+                    <a:lnB w="12700" cap="flat" cmpd="sng" algn="ctr">
+                      <a:solidFill>
+                        <a:schemeClr val="bg1">
+                          <a:lumMod val="65000"/>
+                        </a:schemeClr>
+                      </a:solidFill>
+                      <a:prstDash val="solid"/>
+                      <a:round/>
+                      <a:headEnd type="none" w="med" len="med"/>
+                      <a:tailEnd type="none" w="med" len="med"/>
+                    </a:lnB>
+                  </a:tcPr>
+                </a:tc>
+                <a:extLst>
+                  <a:ext uri="{0D108BD9-81ED-4DB2-BD59-A6C34878D82A}">
+                    <a16:rowId xmlns:a16="http://schemas.microsoft.com/office/drawing/2014/main" val="1676669772"/>
+                  </a:ext>
+                </a:extLst>
+              </a:tr>
+              <a:tr h="411480">
+                <a:tc>
+                  <a:txBody>
+                    <a:bodyPr/>
+                    <a:lstStyle/>
+                    <a:p>
+                      <a:pPr marL="0" marR="0" lvl="0" indent="0" algn="l" defTabSz="914400" rtl="0" eaLnBrk="1" fontAlgn="auto" latinLnBrk="0" hangingPunct="1">
+                        <a:lnSpc>
+                          <a:spcPct val="100000"/>
+                        </a:lnSpc>
+                        <a:spcBef>
+                          <a:spcPts val="0"/>
+                        </a:spcBef>
+                        <a:spcAft>
+                          <a:spcPts val="0"/>
+                        </a:spcAft>
+                        <a:buClrTx/>
+                        <a:buSzTx/>
+                        <a:buFontTx/>
+                        <a:buNone/>
+                        <a:tabLst/>
+                        <a:defRPr/>
+                      </a:pPr>
+                      <a:r>
+                        <a:rPr kumimoji="0" lang="en-US" sz="1800" b="0" i="0" u="none" strike="noStrike" kern="1200" cap="none" spc="0" normalizeH="0" baseline="0" noProof="0" dirty="0" smtClean="0">
+                          <a:ln>
+                            <a:noFill/>
+                          </a:ln>
+                          <a:solidFill>
+                            <a:prstClr val="black"/>
+                          </a:solidFill>
+                          <a:effectLst/>
+                          <a:uLnTx/>
+                          <a:uFillTx/>
+                          <a:latin typeface="Calibri" panose="020F0502020204030204"/>
+                          <a:ea typeface="+mn-ea"/>
+                          <a:cs typeface="+mn-cs"/>
+                        </a:rPr>
+                        <a:t># Unique exons</a:t>
+                      </a:r>
+                    </a:p>
+                  </a:txBody>
+                  <a:tcPr marL="548640" anchor="ctr">
+                    <a:lnL w="12700" cap="flat" cmpd="sng" algn="ctr">
+                      <a:solidFill>
+                        <a:schemeClr val="tx1"/>
+                      </a:solidFill>
+                      <a:prstDash val="solid"/>
+                      <a:round/>
+                      <a:headEnd type="none" w="med" len="med"/>
+                      <a:tailEnd type="none" w="med" len="med"/>
+                    </a:lnL>
+                    <a:lnR w="12700" cap="flat" cmpd="sng" algn="ctr">
+                      <a:solidFill>
+                        <a:schemeClr val="tx1"/>
+                      </a:solidFill>
+                      <a:prstDash val="solid"/>
+                      <a:round/>
+                      <a:headEnd type="none" w="med" len="med"/>
+                      <a:tailEnd type="none" w="med" len="med"/>
+                    </a:lnR>
+                    <a:lnT w="12700" cap="flat" cmpd="sng" algn="ctr">
+                      <a:solidFill>
+                        <a:schemeClr val="bg1">
+                          <a:lumMod val="65000"/>
+                        </a:schemeClr>
+                      </a:solidFill>
+                      <a:prstDash val="solid"/>
+                      <a:round/>
+                      <a:headEnd type="none" w="med" len="med"/>
+                      <a:tailEnd type="none" w="med" len="med"/>
+                    </a:lnT>
+                    <a:lnB w="12700" cap="flat" cmpd="sng" algn="ctr">
+                      <a:solidFill>
+                        <a:schemeClr val="bg1">
+                          <a:lumMod val="65000"/>
+                        </a:schemeClr>
+                      </a:solidFill>
+                      <a:prstDash val="solid"/>
+                      <a:round/>
+                      <a:headEnd type="none" w="med" len="med"/>
+                      <a:tailEnd type="none" w="med" len="med"/>
+                    </a:lnB>
+                  </a:tcPr>
+                </a:tc>
+                <a:tc>
+                  <a:txBody>
+                    <a:bodyPr/>
+                    <a:lstStyle/>
+                    <a:p>
+                      <a:pPr marL="0" marR="0" lvl="0" indent="0" algn="ctr" defTabSz="914400" rtl="0" eaLnBrk="1" fontAlgn="auto" latinLnBrk="0" hangingPunct="1">
+                        <a:lnSpc>
+                          <a:spcPct val="100000"/>
+                        </a:lnSpc>
+                        <a:spcBef>
+                          <a:spcPts val="0"/>
+                        </a:spcBef>
+                        <a:spcAft>
+                          <a:spcPts val="0"/>
+                        </a:spcAft>
+                        <a:buClrTx/>
+                        <a:buSzTx/>
+                        <a:buFontTx/>
+                        <a:buNone/>
+                        <a:tabLst/>
+                        <a:defRPr/>
+                      </a:pPr>
+                      <a:r>
+                        <a:rPr lang="en-US" sz="1600" dirty="0" smtClean="0"/>
+                        <a:t>857</a:t>
+                      </a:r>
+                    </a:p>
+                  </a:txBody>
+                  <a:tcPr anchor="ctr">
+                    <a:lnL w="12700" cap="flat" cmpd="sng" algn="ctr">
+                      <a:solidFill>
+                        <a:schemeClr val="tx1"/>
+                      </a:solidFill>
+                      <a:prstDash val="solid"/>
+                      <a:round/>
+                      <a:headEnd type="none" w="med" len="med"/>
+                      <a:tailEnd type="none" w="med" len="med"/>
+                    </a:lnL>
+                    <a:lnR w="12700" cap="flat" cmpd="sng" algn="ctr">
+                      <a:solidFill>
+                        <a:schemeClr val="tx1"/>
+                      </a:solidFill>
+                      <a:prstDash val="solid"/>
+                      <a:round/>
+                      <a:headEnd type="none" w="med" len="med"/>
+                      <a:tailEnd type="none" w="med" len="med"/>
+                    </a:lnR>
+                    <a:lnT w="12700" cap="flat" cmpd="sng" algn="ctr">
+                      <a:solidFill>
+                        <a:schemeClr val="bg1">
+                          <a:lumMod val="65000"/>
+                        </a:schemeClr>
+                      </a:solidFill>
+                      <a:prstDash val="solid"/>
+                      <a:round/>
+                      <a:headEnd type="none" w="med" len="med"/>
+                      <a:tailEnd type="none" w="med" len="med"/>
+                    </a:lnT>
+                    <a:lnB w="12700" cap="flat" cmpd="sng" algn="ctr">
+                      <a:solidFill>
+                        <a:schemeClr val="bg1">
+                          <a:lumMod val="65000"/>
+                        </a:schemeClr>
+                      </a:solidFill>
+                      <a:prstDash val="solid"/>
+                      <a:round/>
+                      <a:headEnd type="none" w="med" len="med"/>
+                      <a:tailEnd type="none" w="med" len="med"/>
+                    </a:lnB>
+                  </a:tcPr>
+                </a:tc>
+                <a:tc>
+                  <a:txBody>
+                    <a:bodyPr/>
+                    <a:lstStyle/>
+                    <a:p>
+                      <a:pPr algn="ctr"/>
+                      <a:r>
+                        <a:rPr lang="en-US" sz="1600" dirty="0" smtClean="0"/>
+                        <a:t>1363</a:t>
+                      </a:r>
+                      <a:endParaRPr lang="en-US" sz="1600" dirty="0"/>
+                    </a:p>
+                  </a:txBody>
+                  <a:tcPr anchor="ctr">
+                    <a:lnL w="12700" cap="flat" cmpd="sng" algn="ctr">
+                      <a:solidFill>
+                        <a:schemeClr val="tx1"/>
+                      </a:solidFill>
+                      <a:prstDash val="solid"/>
+                      <a:round/>
+                      <a:headEnd type="none" w="med" len="med"/>
+                      <a:tailEnd type="none" w="med" len="med"/>
+                    </a:lnL>
+                    <a:lnR w="12700" cap="flat" cmpd="sng" algn="ctr">
+                      <a:solidFill>
+                        <a:schemeClr val="tx1"/>
+                      </a:solidFill>
+                      <a:prstDash val="solid"/>
+                      <a:round/>
+                      <a:headEnd type="none" w="med" len="med"/>
+                      <a:tailEnd type="none" w="med" len="med"/>
+                    </a:lnR>
+                    <a:lnT w="12700" cap="flat" cmpd="sng" algn="ctr">
+                      <a:solidFill>
+                        <a:schemeClr val="bg1">
+                          <a:lumMod val="65000"/>
+                        </a:schemeClr>
+                      </a:solidFill>
+                      <a:prstDash val="solid"/>
+                      <a:round/>
+                      <a:headEnd type="none" w="med" len="med"/>
+                      <a:tailEnd type="none" w="med" len="med"/>
+                    </a:lnT>
+                    <a:lnB w="12700" cap="flat" cmpd="sng" algn="ctr">
+                      <a:solidFill>
+                        <a:schemeClr val="bg1">
+                          <a:lumMod val="65000"/>
+                        </a:schemeClr>
+                      </a:solidFill>
+                      <a:prstDash val="solid"/>
+                      <a:round/>
+                      <a:headEnd type="none" w="med" len="med"/>
+                      <a:tailEnd type="none" w="med" len="med"/>
+                    </a:lnB>
+                  </a:tcPr>
+                </a:tc>
+                <a:extLst>
+                  <a:ext uri="{0D108BD9-81ED-4DB2-BD59-A6C34878D82A}">
+                    <a16:rowId xmlns:a16="http://schemas.microsoft.com/office/drawing/2014/main" val="3297591499"/>
+                  </a:ext>
+                </a:extLst>
+              </a:tr>
+              <a:tr h="411480">
+                <a:tc>
+                  <a:txBody>
+                    <a:bodyPr/>
+                    <a:lstStyle/>
+                    <a:p>
+                      <a:pPr marL="0" marR="0" lvl="0" indent="0" algn="l" defTabSz="914400" rtl="0" eaLnBrk="1" fontAlgn="auto" latinLnBrk="0" hangingPunct="1">
+                        <a:lnSpc>
+                          <a:spcPct val="100000"/>
+                        </a:lnSpc>
+                        <a:spcBef>
+                          <a:spcPts val="0"/>
+                        </a:spcBef>
+                        <a:spcAft>
+                          <a:spcPts val="0"/>
+                        </a:spcAft>
+                        <a:buClrTx/>
+                        <a:buSzTx/>
+                        <a:buFontTx/>
+                        <a:buNone/>
+                        <a:tabLst/>
+                        <a:defRPr/>
+                      </a:pPr>
+                      <a:r>
+                        <a:rPr kumimoji="0" lang="en-US" sz="1800" b="0" i="0" u="none" strike="noStrike" kern="1200" cap="none" spc="0" normalizeH="0" baseline="0" noProof="0" dirty="0" smtClean="0">
+                          <a:ln>
+                            <a:noFill/>
+                          </a:ln>
+                          <a:solidFill>
+                            <a:prstClr val="black"/>
+                          </a:solidFill>
+                          <a:effectLst/>
+                          <a:uLnTx/>
+                          <a:uFillTx/>
+                          <a:latin typeface="Calibri" panose="020F0502020204030204"/>
+                          <a:ea typeface="+mn-ea"/>
+                          <a:cs typeface="+mn-cs"/>
+                        </a:rPr>
+                        <a:t># Unique junctions</a:t>
+                      </a:r>
+                    </a:p>
+                  </a:txBody>
+                  <a:tcPr marL="548640" anchor="ctr">
+                    <a:lnL w="12700" cap="flat" cmpd="sng" algn="ctr">
+                      <a:solidFill>
+                        <a:schemeClr val="tx1"/>
+                      </a:solidFill>
+                      <a:prstDash val="solid"/>
+                      <a:round/>
+                      <a:headEnd type="none" w="med" len="med"/>
+                      <a:tailEnd type="none" w="med" len="med"/>
+                    </a:lnL>
+                    <a:lnR w="12700" cap="flat" cmpd="sng" algn="ctr">
+                      <a:solidFill>
+                        <a:schemeClr val="tx1"/>
+                      </a:solidFill>
+                      <a:prstDash val="solid"/>
+                      <a:round/>
+                      <a:headEnd type="none" w="med" len="med"/>
+                      <a:tailEnd type="none" w="med" len="med"/>
+                    </a:lnR>
+                    <a:lnT w="12700" cap="flat" cmpd="sng" algn="ctr">
+                      <a:solidFill>
+                        <a:schemeClr val="bg1">
+                          <a:lumMod val="65000"/>
+                        </a:schemeClr>
+                      </a:solidFill>
+                      <a:prstDash val="solid"/>
+                      <a:round/>
+                      <a:headEnd type="none" w="med" len="med"/>
+                      <a:tailEnd type="none" w="med" len="med"/>
+                    </a:lnT>
+                    <a:lnB w="12700" cap="flat" cmpd="sng" algn="ctr">
+                      <a:solidFill>
+                        <a:schemeClr val="tx1"/>
+                      </a:solidFill>
+                      <a:prstDash val="solid"/>
+                      <a:round/>
+                      <a:headEnd type="none" w="med" len="med"/>
+                      <a:tailEnd type="none" w="med" len="med"/>
+                    </a:lnB>
+                  </a:tcPr>
+                </a:tc>
+                <a:tc>
+                  <a:txBody>
+                    <a:bodyPr/>
+                    <a:lstStyle/>
+                    <a:p>
+                      <a:pPr marL="0" marR="0" lvl="0" indent="0" algn="ctr" defTabSz="914400" rtl="0" eaLnBrk="1" fontAlgn="auto" latinLnBrk="0" hangingPunct="1">
+                        <a:lnSpc>
+                          <a:spcPct val="100000"/>
+                        </a:lnSpc>
+                        <a:spcBef>
+                          <a:spcPts val="0"/>
+                        </a:spcBef>
+                        <a:spcAft>
+                          <a:spcPts val="0"/>
+                        </a:spcAft>
+                        <a:buClrTx/>
+                        <a:buSzTx/>
+                        <a:buFontTx/>
+                        <a:buNone/>
+                        <a:tabLst/>
+                        <a:defRPr/>
+                      </a:pPr>
+                      <a:r>
+                        <a:rPr lang="en-US" sz="1600" dirty="0" smtClean="0"/>
+                        <a:t>507</a:t>
+                      </a:r>
+                    </a:p>
+                  </a:txBody>
+                  <a:tcPr anchor="ctr">
+                    <a:lnL w="12700" cap="flat" cmpd="sng" algn="ctr">
+                      <a:solidFill>
+                        <a:schemeClr val="tx1"/>
+                      </a:solidFill>
+                      <a:prstDash val="solid"/>
+                      <a:round/>
+                      <a:headEnd type="none" w="med" len="med"/>
+                      <a:tailEnd type="none" w="med" len="med"/>
+                    </a:lnL>
+                    <a:lnR w="12700" cap="flat" cmpd="sng" algn="ctr">
+                      <a:solidFill>
+                        <a:schemeClr val="tx1"/>
+                      </a:solidFill>
+                      <a:prstDash val="solid"/>
+                      <a:round/>
+                      <a:headEnd type="none" w="med" len="med"/>
+                      <a:tailEnd type="none" w="med" len="med"/>
+                    </a:lnR>
+                    <a:lnT w="12700" cap="flat" cmpd="sng" algn="ctr">
+                      <a:solidFill>
+                        <a:schemeClr val="bg1">
+                          <a:lumMod val="65000"/>
+                        </a:schemeClr>
+                      </a:solidFill>
+                      <a:prstDash val="solid"/>
+                      <a:round/>
+                      <a:headEnd type="none" w="med" len="med"/>
+                      <a:tailEnd type="none" w="med" len="med"/>
+                    </a:lnT>
+                    <a:lnB w="12700" cap="flat" cmpd="sng" algn="ctr">
+                      <a:solidFill>
+                        <a:schemeClr val="tx1"/>
+                      </a:solidFill>
+                      <a:prstDash val="solid"/>
+                      <a:round/>
+                      <a:headEnd type="none" w="med" len="med"/>
+                      <a:tailEnd type="none" w="med" len="med"/>
+                    </a:lnB>
+                  </a:tcPr>
+                </a:tc>
+                <a:tc>
+                  <a:txBody>
+                    <a:bodyPr/>
+                    <a:lstStyle/>
+                    <a:p>
+                      <a:pPr algn="ctr"/>
+                      <a:r>
+                        <a:rPr lang="en-US" sz="1600" dirty="0" smtClean="0"/>
+                        <a:t>659</a:t>
+                      </a:r>
+                      <a:endParaRPr lang="en-US" sz="1600" dirty="0"/>
+                    </a:p>
+                  </a:txBody>
+                  <a:tcPr anchor="ctr">
+                    <a:lnL w="12700" cap="flat" cmpd="sng" algn="ctr">
+                      <a:solidFill>
+                        <a:schemeClr val="tx1"/>
+                      </a:solidFill>
+                      <a:prstDash val="solid"/>
+                      <a:round/>
+                      <a:headEnd type="none" w="med" len="med"/>
+                      <a:tailEnd type="none" w="med" len="med"/>
+                    </a:lnL>
+                    <a:lnR w="12700" cap="flat" cmpd="sng" algn="ctr">
+                      <a:solidFill>
+                        <a:schemeClr val="tx1"/>
+                      </a:solidFill>
+                      <a:prstDash val="solid"/>
+                      <a:round/>
+                      <a:headEnd type="none" w="med" len="med"/>
+                      <a:tailEnd type="none" w="med" len="med"/>
+                    </a:lnR>
+                    <a:lnT w="12700" cap="flat" cmpd="sng" algn="ctr">
+                      <a:solidFill>
+                        <a:schemeClr val="bg1">
+                          <a:lumMod val="65000"/>
+                        </a:schemeClr>
+                      </a:solidFill>
+                      <a:prstDash val="solid"/>
+                      <a:round/>
+                      <a:headEnd type="none" w="med" len="med"/>
+                      <a:tailEnd type="none" w="med" len="med"/>
+                    </a:lnT>
+                    <a:lnB w="12700" cap="flat" cmpd="sng" algn="ctr">
+                      <a:solidFill>
+                        <a:schemeClr val="tx1"/>
+                      </a:solidFill>
+                      <a:prstDash val="solid"/>
+                      <a:round/>
+                      <a:headEnd type="none" w="med" len="med"/>
+                      <a:tailEnd type="none" w="med" len="med"/>
+                    </a:lnB>
+                  </a:tcPr>
+                </a:tc>
+                <a:extLst>
+                  <a:ext uri="{0D108BD9-81ED-4DB2-BD59-A6C34878D82A}">
+                    <a16:rowId xmlns:a16="http://schemas.microsoft.com/office/drawing/2014/main" val="186654310"/>
+                  </a:ext>
+                </a:extLst>
+              </a:tr>
+            </a:tbl>
+          </a:graphicData>
+        </a:graphic>
+      </p:graphicFrame>
+      <p:pic>
+        <p:nvPicPr>
+          <p:cNvPr id="4" name="Picture 3"/>
+          <p:cNvPicPr>
+            <a:picLocks noChangeAspect="1"/>
+          </p:cNvPicPr>
+          <p:nvPr/>
+        </p:nvPicPr>
+        <p:blipFill>
+          <a:blip r:embed="rId2" cstate="print">
+            <a:extLst>
+              <a:ext uri="{28A0092B-C50C-407E-A947-70E740481C1C}">
+                <a14:useLocalDpi xmlns:a14="http://schemas.microsoft.com/office/drawing/2010/main" val="0"/>
+              </a:ext>
+            </a:extLst>
+          </a:blip>
+          <a:stretch>
+            <a:fillRect/>
+          </a:stretch>
+        </p:blipFill>
+        <p:spPr>
+          <a:xfrm>
+            <a:off x="3225338" y="4633041"/>
+            <a:ext cx="2224957" cy="2224957"/>
+          </a:xfrm>
+          <a:prstGeom prst="rect">
+            <a:avLst/>
+          </a:prstGeom>
+        </p:spPr>
+      </p:pic>
+      <p:pic>
+        <p:nvPicPr>
+          <p:cNvPr id="5" name="Picture 4"/>
+          <p:cNvPicPr>
+            <a:picLocks noChangeAspect="1"/>
+          </p:cNvPicPr>
+          <p:nvPr/>
+        </p:nvPicPr>
+        <p:blipFill>
+          <a:blip r:embed="rId3" cstate="print">
+            <a:extLst>
+              <a:ext uri="{28A0092B-C50C-407E-A947-70E740481C1C}">
+                <a14:useLocalDpi xmlns:a14="http://schemas.microsoft.com/office/drawing/2010/main" val="0"/>
+              </a:ext>
+            </a:extLst>
+          </a:blip>
+          <a:stretch>
+            <a:fillRect/>
+          </a:stretch>
+        </p:blipFill>
+        <p:spPr>
+          <a:xfrm>
+            <a:off x="9680702" y="4574919"/>
+            <a:ext cx="2224957" cy="2224957"/>
+          </a:xfrm>
+          <a:prstGeom prst="rect">
+            <a:avLst/>
+          </a:prstGeom>
+        </p:spPr>
+      </p:pic>
+      <p:pic>
+        <p:nvPicPr>
+          <p:cNvPr id="6" name="Picture 5"/>
+          <p:cNvPicPr>
+            <a:picLocks noChangeAspect="1"/>
+          </p:cNvPicPr>
+          <p:nvPr/>
+        </p:nvPicPr>
+        <p:blipFill>
+          <a:blip r:embed="rId4" cstate="print">
+            <a:extLst>
+              <a:ext uri="{28A0092B-C50C-407E-A947-70E740481C1C}">
+                <a14:useLocalDpi xmlns:a14="http://schemas.microsoft.com/office/drawing/2010/main" val="0"/>
+              </a:ext>
+            </a:extLst>
+          </a:blip>
+          <a:stretch>
+            <a:fillRect/>
+          </a:stretch>
+        </p:blipFill>
+        <p:spPr>
+          <a:xfrm>
+            <a:off x="6453020" y="4613886"/>
+            <a:ext cx="2224957" cy="2224957"/>
+          </a:xfrm>
+          <a:prstGeom prst="rect">
+            <a:avLst/>
+          </a:prstGeom>
+        </p:spPr>
+      </p:pic>
+      <p:pic>
+        <p:nvPicPr>
+          <p:cNvPr id="7" name="Picture 6"/>
+          <p:cNvPicPr>
+            <a:picLocks noChangeAspect="1"/>
+          </p:cNvPicPr>
+          <p:nvPr/>
+        </p:nvPicPr>
+        <p:blipFill>
+          <a:blip r:embed="rId5" cstate="print">
+            <a:extLst>
+              <a:ext uri="{28A0092B-C50C-407E-A947-70E740481C1C}">
+                <a14:useLocalDpi xmlns:a14="http://schemas.microsoft.com/office/drawing/2010/main" val="0"/>
+              </a:ext>
+            </a:extLst>
+          </a:blip>
+          <a:stretch>
+            <a:fillRect/>
+          </a:stretch>
+        </p:blipFill>
+        <p:spPr>
+          <a:xfrm>
+            <a:off x="373974" y="4633040"/>
+            <a:ext cx="2224957" cy="2224957"/>
+          </a:xfrm>
+          <a:prstGeom prst="rect">
+            <a:avLst/>
+          </a:prstGeom>
+        </p:spPr>
+      </p:pic>
+      <p:sp>
+        <p:nvSpPr>
+          <p:cNvPr id="8" name="Rectangle 7"/>
+          <p:cNvSpPr/>
+          <p:nvPr/>
+        </p:nvSpPr>
+        <p:spPr>
+          <a:xfrm>
+            <a:off x="911809" y="6488665"/>
+            <a:ext cx="772969" cy="369332"/>
+          </a:xfrm>
+          <a:prstGeom prst="rect">
+            <a:avLst/>
+          </a:prstGeom>
+        </p:spPr>
+        <p:txBody>
+          <a:bodyPr wrap="none">
+            <a:spAutoFit/>
+          </a:bodyPr>
+          <a:lstStyle/>
+          <a:p>
+            <a:r>
+              <a:rPr lang="en-US" dirty="0" smtClean="0"/>
+              <a:t>Genes</a:t>
+            </a:r>
+            <a:endParaRPr lang="en-US" dirty="0"/>
+          </a:p>
+        </p:txBody>
+      </p:sp>
+      <p:sp>
+        <p:nvSpPr>
+          <p:cNvPr id="9" name="Rectangle 8"/>
+          <p:cNvSpPr/>
+          <p:nvPr/>
+        </p:nvSpPr>
+        <p:spPr>
+          <a:xfrm>
+            <a:off x="3951331" y="6483291"/>
+            <a:ext cx="1198533" cy="369332"/>
+          </a:xfrm>
+          <a:prstGeom prst="rect">
+            <a:avLst/>
+          </a:prstGeom>
+        </p:spPr>
+        <p:txBody>
+          <a:bodyPr wrap="none">
+            <a:spAutoFit/>
+          </a:bodyPr>
+          <a:lstStyle/>
+          <a:p>
+            <a:r>
+              <a:rPr lang="en-US" dirty="0" smtClean="0"/>
+              <a:t>Transcripts</a:t>
+            </a:r>
+            <a:endParaRPr lang="en-US" dirty="0"/>
+          </a:p>
+        </p:txBody>
+      </p:sp>
+      <p:sp>
+        <p:nvSpPr>
+          <p:cNvPr id="10" name="Rectangle 9"/>
+          <p:cNvSpPr/>
+          <p:nvPr/>
+        </p:nvSpPr>
+        <p:spPr>
+          <a:xfrm>
+            <a:off x="7179013" y="6469511"/>
+            <a:ext cx="723468" cy="369332"/>
+          </a:xfrm>
+          <a:prstGeom prst="rect">
+            <a:avLst/>
+          </a:prstGeom>
+        </p:spPr>
+        <p:txBody>
+          <a:bodyPr wrap="none">
+            <a:spAutoFit/>
+          </a:bodyPr>
+          <a:lstStyle/>
+          <a:p>
+            <a:r>
+              <a:rPr lang="en-US" dirty="0" smtClean="0"/>
+              <a:t>Exons</a:t>
+            </a:r>
+            <a:endParaRPr lang="en-US" dirty="0"/>
+          </a:p>
+        </p:txBody>
+      </p:sp>
+      <p:sp>
+        <p:nvSpPr>
+          <p:cNvPr id="11" name="Rectangle 10"/>
+          <p:cNvSpPr/>
+          <p:nvPr/>
+        </p:nvSpPr>
+        <p:spPr>
+          <a:xfrm>
+            <a:off x="10406695" y="6469511"/>
+            <a:ext cx="1063112" cy="369332"/>
+          </a:xfrm>
+          <a:prstGeom prst="rect">
+            <a:avLst/>
+          </a:prstGeom>
+        </p:spPr>
+        <p:txBody>
+          <a:bodyPr wrap="none">
+            <a:spAutoFit/>
+          </a:bodyPr>
+          <a:lstStyle/>
+          <a:p>
+            <a:r>
+              <a:rPr lang="en-US" dirty="0" smtClean="0"/>
+              <a:t>Junctions</a:t>
+            </a:r>
+            <a:endParaRPr lang="en-US" dirty="0"/>
+          </a:p>
+        </p:txBody>
+      </p:sp>
+    </p:spTree>
+    <p:extLst>
+      <p:ext uri="{BB962C8B-B14F-4D97-AF65-F5344CB8AC3E}">
+        <p14:creationId xmlns:p14="http://schemas.microsoft.com/office/powerpoint/2010/main" val="2440231781"/>
+      </p:ext>
+    </p:extLst>
+  </p:cSld>
+  <p:clrMapOvr>
+    <a:masterClrMapping/>
+  </p:clrMapOvr>
+</p:sld>
+</file>
+
+<file path=ppt/slides/slide7.xml><?xml version="1.0" encoding="utf-8"?>
+<p:sld xmlns:a="http://schemas.openxmlformats.org/drawingml/2006/main" xmlns:r="http://schemas.openxmlformats.org/officeDocument/2006/relationships" xmlns:p="http://schemas.openxmlformats.org/presentationml/2006/main">
+  <p:cSld>
+    <p:spTree>
+      <p:nvGrpSpPr>
+        <p:cNvPr id="1" name=""/>
+        <p:cNvGrpSpPr/>
+        <p:nvPr/>
+      </p:nvGrpSpPr>
+      <p:grpSpPr>
+        <a:xfrm>
+          <a:off x="0" y="0"/>
+          <a:ext cx="0" cy="0"/>
+          <a:chOff x="0" y="0"/>
+          <a:chExt cx="0" cy="0"/>
+        </a:xfrm>
+      </p:grpSpPr>
+      <p:sp>
+        <p:nvSpPr>
+          <p:cNvPr id="2" name="Title 1">
+            <a:extLst>
+              <a:ext uri="{FF2B5EF4-FFF2-40B4-BE49-F238E27FC236}">
+                <a16:creationId xmlns:a16="http://schemas.microsoft.com/office/drawing/2014/main" id="{5CFE0278-5FE9-4F97-9C97-2D0BFFE62AE7}"/>
+              </a:ext>
+            </a:extLst>
+          </p:cNvPr>
+          <p:cNvSpPr>
+            <a:spLocks noGrp="1"/>
+          </p:cNvSpPr>
+          <p:nvPr>
+            <p:ph type="title"/>
+          </p:nvPr>
+        </p:nvSpPr>
+        <p:spPr>
+          <a:xfrm>
+            <a:off x="734781" y="407530"/>
+            <a:ext cx="10058400" cy="839291"/>
+          </a:xfrm>
+        </p:spPr>
+        <p:txBody>
+          <a:bodyPr/>
+          <a:lstStyle/>
+          <a:p>
+            <a:r>
+              <a:rPr lang="en-US" dirty="0">
+                <a:latin typeface="+mn-lt"/>
+              </a:rPr>
+              <a:t>Overall </a:t>
+            </a:r>
+            <a:r>
+              <a:rPr lang="en-US" dirty="0" err="1">
+                <a:latin typeface="+mn-lt"/>
+              </a:rPr>
+              <a:t>eQTLs</a:t>
+            </a:r>
+            <a:r>
+              <a:rPr lang="en-US" dirty="0">
+                <a:latin typeface="+mn-lt"/>
+              </a:rPr>
+              <a:t> at </a:t>
+            </a:r>
+            <a:r>
+              <a:rPr lang="en-US" dirty="0" smtClean="0">
+                <a:latin typeface="+mn-lt"/>
+              </a:rPr>
+              <a:t>FDR &lt; 1% </a:t>
+            </a:r>
+            <a:r>
+              <a:rPr lang="en-US" dirty="0"/>
+              <a:t>- </a:t>
+            </a:r>
+            <a:r>
+              <a:rPr lang="en-US" dirty="0" err="1"/>
+              <a:t>rAggr</a:t>
+            </a:r>
+            <a:endParaRPr lang="en-US" dirty="0">
+              <a:latin typeface="+mn-lt"/>
+            </a:endParaRPr>
+          </a:p>
+        </p:txBody>
+      </p:sp>
+      <p:graphicFrame>
+        <p:nvGraphicFramePr>
+          <p:cNvPr id="3" name="Table 2"/>
+          <p:cNvGraphicFramePr>
+            <a:graphicFrameLocks noGrp="1"/>
+          </p:cNvGraphicFramePr>
+          <p:nvPr>
+            <p:extLst>
+              <p:ext uri="{D42A27DB-BD31-4B8C-83A1-F6EECF244321}">
+                <p14:modId xmlns:p14="http://schemas.microsoft.com/office/powerpoint/2010/main" val="2117384729"/>
+              </p:ext>
+            </p:extLst>
+          </p:nvPr>
+        </p:nvGraphicFramePr>
+        <p:xfrm>
+          <a:off x="182878" y="3673178"/>
+          <a:ext cx="11777481" cy="1959528"/>
+        </p:xfrm>
+        <a:graphic>
+          <a:graphicData uri="http://schemas.openxmlformats.org/drawingml/2006/table">
+            <a:tbl>
+              <a:tblPr firstCol="1" bandRow="1">
+                <a:tableStyleId>{073A0DAA-6AF3-43AB-8588-CEC1D06C72B9}</a:tableStyleId>
+              </a:tblPr>
+              <a:tblGrid>
+                <a:gridCol w="1006604">
+                  <a:extLst>
+                    <a:ext uri="{9D8B030D-6E8A-4147-A177-3AD203B41FA5}">
+                      <a16:colId xmlns:a16="http://schemas.microsoft.com/office/drawing/2014/main" val="321783189"/>
+                    </a:ext>
+                  </a:extLst>
+                </a:gridCol>
+                <a:gridCol w="633581">
+                  <a:extLst>
+                    <a:ext uri="{9D8B030D-6E8A-4147-A177-3AD203B41FA5}">
+                      <a16:colId xmlns:a16="http://schemas.microsoft.com/office/drawing/2014/main" val="983072481"/>
+                    </a:ext>
+                  </a:extLst>
+                </a:gridCol>
+                <a:gridCol w="633581">
+                  <a:extLst>
+                    <a:ext uri="{9D8B030D-6E8A-4147-A177-3AD203B41FA5}">
+                      <a16:colId xmlns:a16="http://schemas.microsoft.com/office/drawing/2014/main" val="1542481117"/>
+                    </a:ext>
+                  </a:extLst>
+                </a:gridCol>
+                <a:gridCol w="633581">
+                  <a:extLst>
+                    <a:ext uri="{9D8B030D-6E8A-4147-A177-3AD203B41FA5}">
+                      <a16:colId xmlns:a16="http://schemas.microsoft.com/office/drawing/2014/main" val="47893457"/>
+                    </a:ext>
+                  </a:extLst>
+                </a:gridCol>
+                <a:gridCol w="633581">
+                  <a:extLst>
+                    <a:ext uri="{9D8B030D-6E8A-4147-A177-3AD203B41FA5}">
+                      <a16:colId xmlns:a16="http://schemas.microsoft.com/office/drawing/2014/main" val="2212632435"/>
+                    </a:ext>
+                  </a:extLst>
+                </a:gridCol>
+                <a:gridCol w="633581">
+                  <a:extLst>
+                    <a:ext uri="{9D8B030D-6E8A-4147-A177-3AD203B41FA5}">
+                      <a16:colId xmlns:a16="http://schemas.microsoft.com/office/drawing/2014/main" val="3242244007"/>
+                    </a:ext>
+                  </a:extLst>
+                </a:gridCol>
+                <a:gridCol w="633581">
+                  <a:extLst>
+                    <a:ext uri="{9D8B030D-6E8A-4147-A177-3AD203B41FA5}">
+                      <a16:colId xmlns:a16="http://schemas.microsoft.com/office/drawing/2014/main" val="373322989"/>
+                    </a:ext>
+                  </a:extLst>
+                </a:gridCol>
+                <a:gridCol w="633581">
+                  <a:extLst>
+                    <a:ext uri="{9D8B030D-6E8A-4147-A177-3AD203B41FA5}">
+                      <a16:colId xmlns:a16="http://schemas.microsoft.com/office/drawing/2014/main" val="2004755825"/>
+                    </a:ext>
+                  </a:extLst>
+                </a:gridCol>
+                <a:gridCol w="633581">
+                  <a:extLst>
+                    <a:ext uri="{9D8B030D-6E8A-4147-A177-3AD203B41FA5}">
+                      <a16:colId xmlns:a16="http://schemas.microsoft.com/office/drawing/2014/main" val="3632885095"/>
+                    </a:ext>
+                  </a:extLst>
+                </a:gridCol>
+                <a:gridCol w="633581">
+                  <a:extLst>
+                    <a:ext uri="{9D8B030D-6E8A-4147-A177-3AD203B41FA5}">
+                      <a16:colId xmlns:a16="http://schemas.microsoft.com/office/drawing/2014/main" val="3440648747"/>
+                    </a:ext>
+                  </a:extLst>
+                </a:gridCol>
+                <a:gridCol w="633581">
+                  <a:extLst>
+                    <a:ext uri="{9D8B030D-6E8A-4147-A177-3AD203B41FA5}">
+                      <a16:colId xmlns:a16="http://schemas.microsoft.com/office/drawing/2014/main" val="194009094"/>
+                    </a:ext>
+                  </a:extLst>
+                </a:gridCol>
+                <a:gridCol w="633581">
+                  <a:extLst>
+                    <a:ext uri="{9D8B030D-6E8A-4147-A177-3AD203B41FA5}">
+                      <a16:colId xmlns:a16="http://schemas.microsoft.com/office/drawing/2014/main" val="1813486093"/>
+                    </a:ext>
+                  </a:extLst>
+                </a:gridCol>
+                <a:gridCol w="633581">
+                  <a:extLst>
+                    <a:ext uri="{9D8B030D-6E8A-4147-A177-3AD203B41FA5}">
+                      <a16:colId xmlns:a16="http://schemas.microsoft.com/office/drawing/2014/main" val="81180624"/>
+                    </a:ext>
+                  </a:extLst>
+                </a:gridCol>
+                <a:gridCol w="633581">
+                  <a:extLst>
+                    <a:ext uri="{9D8B030D-6E8A-4147-A177-3AD203B41FA5}">
+                      <a16:colId xmlns:a16="http://schemas.microsoft.com/office/drawing/2014/main" val="674025747"/>
+                    </a:ext>
+                  </a:extLst>
+                </a:gridCol>
+                <a:gridCol w="633581">
+                  <a:extLst>
+                    <a:ext uri="{9D8B030D-6E8A-4147-A177-3AD203B41FA5}">
+                      <a16:colId xmlns:a16="http://schemas.microsoft.com/office/drawing/2014/main" val="983902903"/>
+                    </a:ext>
+                  </a:extLst>
+                </a:gridCol>
+                <a:gridCol w="633581">
+                  <a:extLst>
+                    <a:ext uri="{9D8B030D-6E8A-4147-A177-3AD203B41FA5}">
+                      <a16:colId xmlns:a16="http://schemas.microsoft.com/office/drawing/2014/main" val="2464655292"/>
+                    </a:ext>
+                  </a:extLst>
+                </a:gridCol>
+                <a:gridCol w="633581">
+                  <a:extLst>
+                    <a:ext uri="{9D8B030D-6E8A-4147-A177-3AD203B41FA5}">
+                      <a16:colId xmlns:a16="http://schemas.microsoft.com/office/drawing/2014/main" val="3388589090"/>
+                    </a:ext>
+                  </a:extLst>
+                </a:gridCol>
+                <a:gridCol w="633581">
+                  <a:extLst>
+                    <a:ext uri="{9D8B030D-6E8A-4147-A177-3AD203B41FA5}">
+                      <a16:colId xmlns:a16="http://schemas.microsoft.com/office/drawing/2014/main" val="3310805336"/>
+                    </a:ext>
+                  </a:extLst>
+                </a:gridCol>
+              </a:tblGrid>
+              <a:tr h="489882">
+                <a:tc rowSpan="2">
+                  <a:txBody>
+                    <a:bodyPr/>
+                    <a:lstStyle/>
+                    <a:p>
+                      <a:pPr algn="ctr"/>
+                      <a:r>
+                        <a:rPr lang="en-US" dirty="0" smtClean="0"/>
+                        <a:t>Hippo</a:t>
+                      </a:r>
+                      <a:endParaRPr lang="en-US" dirty="0"/>
+                    </a:p>
+                  </a:txBody>
+                  <a:tcPr anchor="ctr">
+                    <a:lnL w="12700" cap="flat" cmpd="sng" algn="ctr">
+                      <a:solidFill>
+                        <a:schemeClr val="tx1"/>
+                      </a:solidFill>
+                      <a:prstDash val="solid"/>
+                      <a:round/>
+                      <a:headEnd type="none" w="med" len="med"/>
+                      <a:tailEnd type="none" w="med" len="med"/>
+                    </a:lnL>
+                    <a:lnT w="12700" cap="flat" cmpd="sng" algn="ctr">
+                      <a:solidFill>
+                        <a:schemeClr val="tx1"/>
+                      </a:solidFill>
+                      <a:prstDash val="solid"/>
+                      <a:round/>
+                      <a:headEnd type="none" w="med" len="med"/>
+                      <a:tailEnd type="none" w="med" len="med"/>
+                    </a:lnT>
+                    <a:lnB w="12700" cap="flat" cmpd="sng" algn="ctr">
+                      <a:solidFill>
+                        <a:schemeClr val="tx1"/>
+                      </a:solidFill>
+                      <a:prstDash val="solid"/>
+                      <a:round/>
+                      <a:headEnd type="none" w="med" len="med"/>
+                      <a:tailEnd type="none" w="med" len="med"/>
+                    </a:lnB>
+                  </a:tcPr>
+                </a:tc>
+                <a:tc>
+                  <a:txBody>
+                    <a:bodyPr/>
+                    <a:lstStyle/>
+                    <a:p>
+                      <a:pPr algn="ctr"/>
+                      <a:r>
+                        <a:rPr lang="en-US" sz="1600" dirty="0" smtClean="0"/>
+                        <a:t>1</a:t>
+                      </a:r>
+                      <a:endParaRPr lang="en-US" sz="1600" dirty="0"/>
+                    </a:p>
+                  </a:txBody>
+                  <a:tcPr anchor="ctr">
+                    <a:lnT w="12700" cap="flat" cmpd="sng" algn="ctr">
+                      <a:solidFill>
+                        <a:schemeClr val="tx1"/>
+                      </a:solidFill>
+                      <a:prstDash val="solid"/>
+                      <a:round/>
+                      <a:headEnd type="none" w="med" len="med"/>
+                      <a:tailEnd type="none" w="med" len="med"/>
+                    </a:lnT>
+                  </a:tcPr>
+                </a:tc>
+                <a:tc>
+                  <a:txBody>
+                    <a:bodyPr/>
+                    <a:lstStyle/>
+                    <a:p>
+                      <a:pPr algn="ctr"/>
+                      <a:r>
+                        <a:rPr lang="en-US" sz="1600" dirty="0" smtClean="0"/>
+                        <a:t>2</a:t>
+                      </a:r>
+                      <a:endParaRPr lang="en-US" sz="1600" dirty="0"/>
+                    </a:p>
+                  </a:txBody>
+                  <a:tcPr anchor="ctr">
+                    <a:lnT w="12700" cap="flat" cmpd="sng" algn="ctr">
+                      <a:solidFill>
+                        <a:schemeClr val="tx1"/>
+                      </a:solidFill>
+                      <a:prstDash val="solid"/>
+                      <a:round/>
+                      <a:headEnd type="none" w="med" len="med"/>
+                      <a:tailEnd type="none" w="med" len="med"/>
+                    </a:lnT>
+                  </a:tcPr>
+                </a:tc>
+                <a:tc>
+                  <a:txBody>
+                    <a:bodyPr/>
+                    <a:lstStyle/>
+                    <a:p>
+                      <a:pPr algn="ctr"/>
+                      <a:r>
+                        <a:rPr lang="en-US" sz="1600" dirty="0" smtClean="0"/>
+                        <a:t>3</a:t>
+                      </a:r>
+                      <a:endParaRPr lang="en-US" sz="1600" dirty="0"/>
+                    </a:p>
+                  </a:txBody>
+                  <a:tcPr anchor="ctr">
+                    <a:lnT w="12700" cap="flat" cmpd="sng" algn="ctr">
+                      <a:solidFill>
+                        <a:schemeClr val="tx1"/>
+                      </a:solidFill>
+                      <a:prstDash val="solid"/>
+                      <a:round/>
+                      <a:headEnd type="none" w="med" len="med"/>
+                      <a:tailEnd type="none" w="med" len="med"/>
+                    </a:lnT>
+                  </a:tcPr>
+                </a:tc>
+                <a:tc>
+                  <a:txBody>
+                    <a:bodyPr/>
+                    <a:lstStyle/>
+                    <a:p>
+                      <a:pPr algn="ctr"/>
+                      <a:r>
+                        <a:rPr lang="en-US" sz="1600" dirty="0" smtClean="0"/>
+                        <a:t>4</a:t>
+                      </a:r>
+                      <a:endParaRPr lang="en-US" sz="1600" dirty="0"/>
+                    </a:p>
+                  </a:txBody>
+                  <a:tcPr anchor="ctr">
+                    <a:lnT w="12700" cap="flat" cmpd="sng" algn="ctr">
+                      <a:solidFill>
+                        <a:schemeClr val="tx1"/>
+                      </a:solidFill>
+                      <a:prstDash val="solid"/>
+                      <a:round/>
+                      <a:headEnd type="none" w="med" len="med"/>
+                      <a:tailEnd type="none" w="med" len="med"/>
+                    </a:lnT>
+                  </a:tcPr>
+                </a:tc>
+                <a:tc>
+                  <a:txBody>
+                    <a:bodyPr/>
+                    <a:lstStyle/>
+                    <a:p>
+                      <a:pPr algn="ctr"/>
+                      <a:r>
+                        <a:rPr lang="en-US" sz="1600" dirty="0" smtClean="0"/>
+                        <a:t>5</a:t>
+                      </a:r>
+                      <a:endParaRPr lang="en-US" sz="1600" dirty="0"/>
+                    </a:p>
+                  </a:txBody>
+                  <a:tcPr anchor="ctr">
+                    <a:lnT w="12700" cap="flat" cmpd="sng" algn="ctr">
+                      <a:solidFill>
+                        <a:schemeClr val="tx1"/>
+                      </a:solidFill>
+                      <a:prstDash val="solid"/>
+                      <a:round/>
+                      <a:headEnd type="none" w="med" len="med"/>
+                      <a:tailEnd type="none" w="med" len="med"/>
+                    </a:lnT>
+                  </a:tcPr>
+                </a:tc>
+                <a:tc>
+                  <a:txBody>
+                    <a:bodyPr/>
+                    <a:lstStyle/>
+                    <a:p>
+                      <a:pPr algn="ctr"/>
+                      <a:r>
+                        <a:rPr lang="en-US" sz="1600" dirty="0" smtClean="0"/>
+                        <a:t>6</a:t>
+                      </a:r>
+                      <a:endParaRPr lang="en-US" sz="1600" dirty="0"/>
+                    </a:p>
+                  </a:txBody>
+                  <a:tcPr anchor="ctr">
+                    <a:lnT w="12700" cap="flat" cmpd="sng" algn="ctr">
+                      <a:solidFill>
+                        <a:schemeClr val="tx1"/>
+                      </a:solidFill>
+                      <a:prstDash val="solid"/>
+                      <a:round/>
+                      <a:headEnd type="none" w="med" len="med"/>
+                      <a:tailEnd type="none" w="med" len="med"/>
+                    </a:lnT>
+                  </a:tcPr>
+                </a:tc>
+                <a:tc>
+                  <a:txBody>
+                    <a:bodyPr/>
+                    <a:lstStyle/>
+                    <a:p>
+                      <a:pPr algn="ctr"/>
+                      <a:r>
+                        <a:rPr lang="en-US" sz="1600" dirty="0" smtClean="0"/>
+                        <a:t>7</a:t>
+                      </a:r>
+                      <a:endParaRPr lang="en-US" sz="1600" dirty="0"/>
+                    </a:p>
+                  </a:txBody>
+                  <a:tcPr anchor="ctr">
+                    <a:lnT w="12700" cap="flat" cmpd="sng" algn="ctr">
+                      <a:solidFill>
+                        <a:schemeClr val="tx1"/>
+                      </a:solidFill>
+                      <a:prstDash val="solid"/>
+                      <a:round/>
+                      <a:headEnd type="none" w="med" len="med"/>
+                      <a:tailEnd type="none" w="med" len="med"/>
+                    </a:lnT>
+                  </a:tcPr>
+                </a:tc>
+                <a:tc>
+                  <a:txBody>
+                    <a:bodyPr/>
+                    <a:lstStyle/>
+                    <a:p>
+                      <a:pPr algn="ctr"/>
+                      <a:r>
+                        <a:rPr lang="en-US" sz="1600" dirty="0" smtClean="0"/>
+                        <a:t>8</a:t>
+                      </a:r>
+                      <a:endParaRPr lang="en-US" sz="1600" dirty="0"/>
+                    </a:p>
+                  </a:txBody>
+                  <a:tcPr anchor="ctr">
+                    <a:lnT w="12700" cap="flat" cmpd="sng" algn="ctr">
+                      <a:solidFill>
+                        <a:schemeClr val="tx1"/>
+                      </a:solidFill>
+                      <a:prstDash val="solid"/>
+                      <a:round/>
+                      <a:headEnd type="none" w="med" len="med"/>
+                      <a:tailEnd type="none" w="med" len="med"/>
+                    </a:lnT>
+                  </a:tcPr>
+                </a:tc>
+                <a:tc>
+                  <a:txBody>
+                    <a:bodyPr/>
+                    <a:lstStyle/>
+                    <a:p>
+                      <a:pPr algn="ctr"/>
+                      <a:r>
+                        <a:rPr lang="en-US" sz="1600" dirty="0" smtClean="0"/>
+                        <a:t>9</a:t>
+                      </a:r>
+                      <a:endParaRPr lang="en-US" sz="1600" dirty="0"/>
+                    </a:p>
+                  </a:txBody>
+                  <a:tcPr anchor="ctr">
+                    <a:lnT w="12700" cap="flat" cmpd="sng" algn="ctr">
+                      <a:solidFill>
+                        <a:schemeClr val="tx1"/>
+                      </a:solidFill>
+                      <a:prstDash val="solid"/>
+                      <a:round/>
+                      <a:headEnd type="none" w="med" len="med"/>
+                      <a:tailEnd type="none" w="med" len="med"/>
+                    </a:lnT>
+                  </a:tcPr>
+                </a:tc>
+                <a:tc>
+                  <a:txBody>
+                    <a:bodyPr/>
+                    <a:lstStyle/>
+                    <a:p>
+                      <a:pPr algn="ctr"/>
+                      <a:r>
+                        <a:rPr lang="en-US" sz="1600" dirty="0" smtClean="0"/>
+                        <a:t>10</a:t>
+                      </a:r>
+                      <a:endParaRPr lang="en-US" sz="1600" dirty="0"/>
+                    </a:p>
+                  </a:txBody>
+                  <a:tcPr anchor="ctr">
+                    <a:lnT w="12700" cap="flat" cmpd="sng" algn="ctr">
+                      <a:solidFill>
+                        <a:schemeClr val="tx1"/>
+                      </a:solidFill>
+                      <a:prstDash val="solid"/>
+                      <a:round/>
+                      <a:headEnd type="none" w="med" len="med"/>
+                      <a:tailEnd type="none" w="med" len="med"/>
+                    </a:lnT>
+                  </a:tcPr>
+                </a:tc>
+                <a:tc>
+                  <a:txBody>
+                    <a:bodyPr/>
+                    <a:lstStyle/>
+                    <a:p>
+                      <a:pPr algn="ctr"/>
+                      <a:r>
+                        <a:rPr lang="en-US" sz="1600" dirty="0" smtClean="0"/>
+                        <a:t>11</a:t>
+                      </a:r>
+                      <a:endParaRPr lang="en-US" sz="1600" dirty="0"/>
+                    </a:p>
+                  </a:txBody>
+                  <a:tcPr anchor="ctr">
+                    <a:lnT w="12700" cap="flat" cmpd="sng" algn="ctr">
+                      <a:solidFill>
+                        <a:schemeClr val="tx1"/>
+                      </a:solidFill>
+                      <a:prstDash val="solid"/>
+                      <a:round/>
+                      <a:headEnd type="none" w="med" len="med"/>
+                      <a:tailEnd type="none" w="med" len="med"/>
+                    </a:lnT>
+                  </a:tcPr>
+                </a:tc>
+                <a:tc>
+                  <a:txBody>
+                    <a:bodyPr/>
+                    <a:lstStyle/>
+                    <a:p>
+                      <a:pPr algn="ctr"/>
+                      <a:r>
+                        <a:rPr lang="en-US" sz="1600" dirty="0" smtClean="0"/>
+                        <a:t>12</a:t>
+                      </a:r>
+                      <a:endParaRPr lang="en-US" sz="1600" dirty="0"/>
+                    </a:p>
+                  </a:txBody>
+                  <a:tcPr anchor="ctr">
+                    <a:lnT w="12700" cap="flat" cmpd="sng" algn="ctr">
+                      <a:solidFill>
+                        <a:schemeClr val="tx1"/>
+                      </a:solidFill>
+                      <a:prstDash val="solid"/>
+                      <a:round/>
+                      <a:headEnd type="none" w="med" len="med"/>
+                      <a:tailEnd type="none" w="med" len="med"/>
+                    </a:lnT>
+                  </a:tcPr>
+                </a:tc>
+                <a:tc>
+                  <a:txBody>
+                    <a:bodyPr/>
+                    <a:lstStyle/>
+                    <a:p>
+                      <a:pPr algn="ctr"/>
+                      <a:r>
+                        <a:rPr lang="en-US" sz="1600" dirty="0" smtClean="0"/>
+                        <a:t>13</a:t>
+                      </a:r>
+                      <a:endParaRPr lang="en-US" sz="1600" dirty="0"/>
+                    </a:p>
+                  </a:txBody>
+                  <a:tcPr anchor="ctr">
+                    <a:lnT w="12700" cap="flat" cmpd="sng" algn="ctr">
+                      <a:solidFill>
+                        <a:schemeClr val="tx1"/>
+                      </a:solidFill>
+                      <a:prstDash val="solid"/>
+                      <a:round/>
+                      <a:headEnd type="none" w="med" len="med"/>
+                      <a:tailEnd type="none" w="med" len="med"/>
+                    </a:lnT>
+                  </a:tcPr>
+                </a:tc>
+                <a:tc>
+                  <a:txBody>
+                    <a:bodyPr/>
+                    <a:lstStyle/>
+                    <a:p>
+                      <a:pPr algn="ctr"/>
+                      <a:endParaRPr lang="en-US" sz="1600" dirty="0"/>
+                    </a:p>
+                  </a:txBody>
+                  <a:tcPr anchor="ctr">
+                    <a:lnT w="12700" cap="flat" cmpd="sng" algn="ctr">
+                      <a:solidFill>
+                        <a:schemeClr val="tx1"/>
+                      </a:solidFill>
+                      <a:prstDash val="solid"/>
+                      <a:round/>
+                      <a:headEnd type="none" w="med" len="med"/>
+                      <a:tailEnd type="none" w="med" len="med"/>
+                    </a:lnT>
+                  </a:tcPr>
+                </a:tc>
+                <a:tc>
+                  <a:txBody>
+                    <a:bodyPr/>
+                    <a:lstStyle/>
+                    <a:p>
+                      <a:pPr algn="ctr"/>
+                      <a:endParaRPr lang="en-US" sz="1600" dirty="0"/>
+                    </a:p>
+                  </a:txBody>
+                  <a:tcPr anchor="ctr">
+                    <a:lnT w="12700" cap="flat" cmpd="sng" algn="ctr">
+                      <a:solidFill>
+                        <a:schemeClr val="tx1"/>
+                      </a:solidFill>
+                      <a:prstDash val="solid"/>
+                      <a:round/>
+                      <a:headEnd type="none" w="med" len="med"/>
+                      <a:tailEnd type="none" w="med" len="med"/>
+                    </a:lnT>
+                  </a:tcPr>
+                </a:tc>
+                <a:tc>
+                  <a:txBody>
+                    <a:bodyPr/>
+                    <a:lstStyle/>
+                    <a:p>
+                      <a:pPr algn="ctr"/>
+                      <a:endParaRPr lang="en-US" sz="1600" dirty="0"/>
+                    </a:p>
+                  </a:txBody>
+                  <a:tcPr anchor="ctr">
+                    <a:lnT w="12700" cap="flat" cmpd="sng" algn="ctr">
+                      <a:solidFill>
+                        <a:schemeClr val="tx1"/>
+                      </a:solidFill>
+                      <a:prstDash val="solid"/>
+                      <a:round/>
+                      <a:headEnd type="none" w="med" len="med"/>
+                      <a:tailEnd type="none" w="med" len="med"/>
+                    </a:lnT>
+                  </a:tcPr>
+                </a:tc>
+                <a:tc>
+                  <a:txBody>
+                    <a:bodyPr/>
+                    <a:lstStyle/>
+                    <a:p>
+                      <a:pPr algn="ctr"/>
+                      <a:r>
+                        <a:rPr lang="en-US" sz="1600" b="1" dirty="0" smtClean="0"/>
+                        <a:t>Total</a:t>
+                      </a:r>
+                      <a:endParaRPr lang="en-US" sz="1600" b="1" dirty="0"/>
+                    </a:p>
+                  </a:txBody>
+                  <a:tcPr anchor="ctr">
+                    <a:lnR w="12700" cap="flat" cmpd="sng" algn="ctr">
+                      <a:solidFill>
+                        <a:schemeClr val="tx1"/>
+                      </a:solidFill>
+                      <a:prstDash val="solid"/>
+                      <a:round/>
+                      <a:headEnd type="none" w="med" len="med"/>
+                      <a:tailEnd type="none" w="med" len="med"/>
+                    </a:lnR>
+                    <a:lnT w="12700" cap="flat" cmpd="sng" algn="ctr">
+                      <a:solidFill>
+                        <a:schemeClr val="tx1"/>
+                      </a:solidFill>
+                      <a:prstDash val="solid"/>
+                      <a:round/>
+                      <a:headEnd type="none" w="med" len="med"/>
+                      <a:tailEnd type="none" w="med" len="med"/>
+                    </a:lnT>
+                  </a:tcPr>
+                </a:tc>
+                <a:extLst>
+                  <a:ext uri="{0D108BD9-81ED-4DB2-BD59-A6C34878D82A}">
+                    <a16:rowId xmlns:a16="http://schemas.microsoft.com/office/drawing/2014/main" val="3415911684"/>
+                  </a:ext>
+                </a:extLst>
+              </a:tr>
+              <a:tr h="489882">
+                <a:tc vMerge="1">
+                  <a:txBody>
+                    <a:bodyPr/>
+                    <a:lstStyle/>
+                    <a:p>
+                      <a:endParaRPr lang="en-US" dirty="0"/>
+                    </a:p>
+                  </a:txBody>
+                  <a:tcPr/>
+                </a:tc>
+                <a:tc>
+                  <a:txBody>
+                    <a:bodyPr/>
+                    <a:lstStyle/>
+                    <a:p>
+                      <a:pPr algn="ctr"/>
+                      <a:r>
+                        <a:rPr lang="en-US" sz="1600" dirty="0" smtClean="0"/>
+                        <a:t>1982</a:t>
+                      </a:r>
+                      <a:endParaRPr lang="en-US" sz="1600" dirty="0"/>
+                    </a:p>
+                  </a:txBody>
+                  <a:tcPr anchor="ctr">
+                    <a:lnB w="12700" cap="flat" cmpd="sng" algn="ctr">
+                      <a:solidFill>
+                        <a:schemeClr val="tx1"/>
+                      </a:solidFill>
+                      <a:prstDash val="solid"/>
+                      <a:round/>
+                      <a:headEnd type="none" w="med" len="med"/>
+                      <a:tailEnd type="none" w="med" len="med"/>
+                    </a:lnB>
+                  </a:tcPr>
+                </a:tc>
+                <a:tc>
+                  <a:txBody>
+                    <a:bodyPr/>
+                    <a:lstStyle/>
+                    <a:p>
+                      <a:pPr algn="ctr"/>
+                      <a:r>
+                        <a:rPr lang="en-US" sz="1600" dirty="0" smtClean="0"/>
+                        <a:t>1353</a:t>
+                      </a:r>
+                      <a:endParaRPr lang="en-US" sz="1600" dirty="0"/>
+                    </a:p>
+                  </a:txBody>
+                  <a:tcPr anchor="ctr">
+                    <a:lnB w="12700" cap="flat" cmpd="sng" algn="ctr">
+                      <a:solidFill>
+                        <a:schemeClr val="tx1"/>
+                      </a:solidFill>
+                      <a:prstDash val="solid"/>
+                      <a:round/>
+                      <a:headEnd type="none" w="med" len="med"/>
+                      <a:tailEnd type="none" w="med" len="med"/>
+                    </a:lnB>
+                  </a:tcPr>
+                </a:tc>
+                <a:tc>
+                  <a:txBody>
+                    <a:bodyPr/>
+                    <a:lstStyle/>
+                    <a:p>
+                      <a:pPr algn="ctr"/>
+                      <a:r>
+                        <a:rPr lang="en-US" sz="1600" dirty="0" smtClean="0"/>
+                        <a:t>653</a:t>
+                      </a:r>
+                      <a:endParaRPr lang="en-US" sz="1600" dirty="0"/>
+                    </a:p>
+                  </a:txBody>
+                  <a:tcPr anchor="ctr">
+                    <a:lnB w="12700" cap="flat" cmpd="sng" algn="ctr">
+                      <a:solidFill>
+                        <a:schemeClr val="tx1"/>
+                      </a:solidFill>
+                      <a:prstDash val="solid"/>
+                      <a:round/>
+                      <a:headEnd type="none" w="med" len="med"/>
+                      <a:tailEnd type="none" w="med" len="med"/>
+                    </a:lnB>
+                  </a:tcPr>
+                </a:tc>
+                <a:tc>
+                  <a:txBody>
+                    <a:bodyPr/>
+                    <a:lstStyle/>
+                    <a:p>
+                      <a:pPr algn="ctr"/>
+                      <a:r>
+                        <a:rPr lang="en-US" sz="1600" dirty="0" smtClean="0"/>
+                        <a:t>580</a:t>
+                      </a:r>
+                      <a:endParaRPr lang="en-US" sz="1600" dirty="0"/>
+                    </a:p>
+                  </a:txBody>
+                  <a:tcPr anchor="ctr">
+                    <a:lnB w="12700" cap="flat" cmpd="sng" algn="ctr">
+                      <a:solidFill>
+                        <a:schemeClr val="tx1"/>
+                      </a:solidFill>
+                      <a:prstDash val="solid"/>
+                      <a:round/>
+                      <a:headEnd type="none" w="med" len="med"/>
+                      <a:tailEnd type="none" w="med" len="med"/>
+                    </a:lnB>
+                  </a:tcPr>
+                </a:tc>
+                <a:tc>
+                  <a:txBody>
+                    <a:bodyPr/>
+                    <a:lstStyle/>
+                    <a:p>
+                      <a:pPr algn="ctr"/>
+                      <a:r>
+                        <a:rPr lang="en-US" sz="1600" dirty="0" smtClean="0"/>
+                        <a:t>317</a:t>
+                      </a:r>
+                      <a:endParaRPr lang="en-US" sz="1600" dirty="0"/>
+                    </a:p>
+                  </a:txBody>
+                  <a:tcPr anchor="ctr">
+                    <a:lnB w="12700" cap="flat" cmpd="sng" algn="ctr">
+                      <a:solidFill>
+                        <a:schemeClr val="tx1"/>
+                      </a:solidFill>
+                      <a:prstDash val="solid"/>
+                      <a:round/>
+                      <a:headEnd type="none" w="med" len="med"/>
+                      <a:tailEnd type="none" w="med" len="med"/>
+                    </a:lnB>
+                  </a:tcPr>
+                </a:tc>
+                <a:tc>
+                  <a:txBody>
+                    <a:bodyPr/>
+                    <a:lstStyle/>
+                    <a:p>
+                      <a:pPr algn="ctr"/>
+                      <a:r>
+                        <a:rPr lang="en-US" sz="1600" dirty="0" smtClean="0"/>
+                        <a:t>91</a:t>
+                      </a:r>
+                      <a:endParaRPr lang="en-US" sz="1600" dirty="0"/>
+                    </a:p>
+                  </a:txBody>
+                  <a:tcPr anchor="ctr">
+                    <a:lnB w="12700" cap="flat" cmpd="sng" algn="ctr">
+                      <a:solidFill>
+                        <a:schemeClr val="tx1"/>
+                      </a:solidFill>
+                      <a:prstDash val="solid"/>
+                      <a:round/>
+                      <a:headEnd type="none" w="med" len="med"/>
+                      <a:tailEnd type="none" w="med" len="med"/>
+                    </a:lnB>
+                  </a:tcPr>
+                </a:tc>
+                <a:tc>
+                  <a:txBody>
+                    <a:bodyPr/>
+                    <a:lstStyle/>
+                    <a:p>
+                      <a:pPr algn="ctr"/>
+                      <a:r>
+                        <a:rPr lang="en-US" sz="1600" dirty="0" smtClean="0"/>
+                        <a:t>229</a:t>
+                      </a:r>
+                      <a:endParaRPr lang="en-US" sz="1600" dirty="0"/>
+                    </a:p>
+                  </a:txBody>
+                  <a:tcPr anchor="ctr">
+                    <a:lnB w="12700" cap="flat" cmpd="sng" algn="ctr">
+                      <a:solidFill>
+                        <a:schemeClr val="tx1"/>
+                      </a:solidFill>
+                      <a:prstDash val="solid"/>
+                      <a:round/>
+                      <a:headEnd type="none" w="med" len="med"/>
+                      <a:tailEnd type="none" w="med" len="med"/>
+                    </a:lnB>
+                  </a:tcPr>
+                </a:tc>
+                <a:tc>
+                  <a:txBody>
+                    <a:bodyPr/>
+                    <a:lstStyle/>
+                    <a:p>
+                      <a:pPr algn="ctr"/>
+                      <a:r>
+                        <a:rPr lang="en-US" sz="1600" dirty="0" smtClean="0"/>
+                        <a:t>28</a:t>
+                      </a:r>
+                      <a:endParaRPr lang="en-US" sz="1600" dirty="0"/>
+                    </a:p>
+                  </a:txBody>
+                  <a:tcPr anchor="ctr">
+                    <a:lnB w="12700" cap="flat" cmpd="sng" algn="ctr">
+                      <a:solidFill>
+                        <a:schemeClr val="tx1"/>
+                      </a:solidFill>
+                      <a:prstDash val="solid"/>
+                      <a:round/>
+                      <a:headEnd type="none" w="med" len="med"/>
+                      <a:tailEnd type="none" w="med" len="med"/>
+                    </a:lnB>
+                  </a:tcPr>
+                </a:tc>
+                <a:tc>
+                  <a:txBody>
+                    <a:bodyPr/>
+                    <a:lstStyle/>
+                    <a:p>
+                      <a:pPr algn="ctr"/>
+                      <a:r>
+                        <a:rPr lang="en-US" sz="1600" dirty="0" smtClean="0"/>
+                        <a:t>106</a:t>
+                      </a:r>
+                      <a:endParaRPr lang="en-US" sz="1600" dirty="0"/>
+                    </a:p>
+                  </a:txBody>
+                  <a:tcPr anchor="ctr">
+                    <a:lnB w="12700" cap="flat" cmpd="sng" algn="ctr">
+                      <a:solidFill>
+                        <a:schemeClr val="tx1"/>
+                      </a:solidFill>
+                      <a:prstDash val="solid"/>
+                      <a:round/>
+                      <a:headEnd type="none" w="med" len="med"/>
+                      <a:tailEnd type="none" w="med" len="med"/>
+                    </a:lnB>
+                  </a:tcPr>
+                </a:tc>
+                <a:tc>
+                  <a:txBody>
+                    <a:bodyPr/>
+                    <a:lstStyle/>
+                    <a:p>
+                      <a:pPr algn="ctr"/>
+                      <a:r>
+                        <a:rPr lang="en-US" sz="1600" dirty="0" smtClean="0"/>
+                        <a:t>47</a:t>
+                      </a:r>
+                      <a:endParaRPr lang="en-US" sz="1600" dirty="0"/>
+                    </a:p>
+                  </a:txBody>
+                  <a:tcPr anchor="ctr">
+                    <a:lnB w="12700" cap="flat" cmpd="sng" algn="ctr">
+                      <a:solidFill>
+                        <a:schemeClr val="tx1"/>
+                      </a:solidFill>
+                      <a:prstDash val="solid"/>
+                      <a:round/>
+                      <a:headEnd type="none" w="med" len="med"/>
+                      <a:tailEnd type="none" w="med" len="med"/>
+                    </a:lnB>
+                  </a:tcPr>
+                </a:tc>
+                <a:tc>
+                  <a:txBody>
+                    <a:bodyPr/>
+                    <a:lstStyle/>
+                    <a:p>
+                      <a:pPr algn="ctr"/>
+                      <a:r>
+                        <a:rPr lang="en-US" sz="1600" dirty="0" smtClean="0"/>
+                        <a:t>58</a:t>
+                      </a:r>
+                      <a:endParaRPr lang="en-US" sz="1600" dirty="0"/>
+                    </a:p>
+                  </a:txBody>
+                  <a:tcPr anchor="ctr">
+                    <a:lnB w="12700" cap="flat" cmpd="sng" algn="ctr">
+                      <a:solidFill>
+                        <a:schemeClr val="tx1"/>
+                      </a:solidFill>
+                      <a:prstDash val="solid"/>
+                      <a:round/>
+                      <a:headEnd type="none" w="med" len="med"/>
+                      <a:tailEnd type="none" w="med" len="med"/>
+                    </a:lnB>
+                  </a:tcPr>
+                </a:tc>
+                <a:tc>
+                  <a:txBody>
+                    <a:bodyPr/>
+                    <a:lstStyle/>
+                    <a:p>
+                      <a:pPr algn="ctr"/>
+                      <a:r>
+                        <a:rPr lang="en-US" sz="1600" dirty="0" smtClean="0"/>
+                        <a:t>59</a:t>
+                      </a:r>
+                      <a:endParaRPr lang="en-US" sz="1600" dirty="0"/>
+                    </a:p>
+                  </a:txBody>
+                  <a:tcPr anchor="ctr">
+                    <a:lnB w="12700" cap="flat" cmpd="sng" algn="ctr">
+                      <a:solidFill>
+                        <a:schemeClr val="tx1"/>
+                      </a:solidFill>
+                      <a:prstDash val="solid"/>
+                      <a:round/>
+                      <a:headEnd type="none" w="med" len="med"/>
+                      <a:tailEnd type="none" w="med" len="med"/>
+                    </a:lnB>
+                  </a:tcPr>
+                </a:tc>
+                <a:tc>
+                  <a:txBody>
+                    <a:bodyPr/>
+                    <a:lstStyle/>
+                    <a:p>
+                      <a:pPr algn="ctr"/>
+                      <a:r>
+                        <a:rPr lang="en-US" sz="1600" dirty="0" smtClean="0"/>
+                        <a:t>7</a:t>
+                      </a:r>
+                      <a:endParaRPr lang="en-US" sz="1600" dirty="0"/>
+                    </a:p>
+                  </a:txBody>
+                  <a:tcPr anchor="ctr">
+                    <a:lnB w="12700" cap="flat" cmpd="sng" algn="ctr">
+                      <a:solidFill>
+                        <a:schemeClr val="tx1"/>
+                      </a:solidFill>
+                      <a:prstDash val="solid"/>
+                      <a:round/>
+                      <a:headEnd type="none" w="med" len="med"/>
+                      <a:tailEnd type="none" w="med" len="med"/>
+                    </a:lnB>
+                  </a:tcPr>
+                </a:tc>
+                <a:tc>
+                  <a:txBody>
+                    <a:bodyPr/>
+                    <a:lstStyle/>
+                    <a:p>
+                      <a:pPr algn="ctr"/>
+                      <a:r>
+                        <a:rPr lang="en-US" sz="1600" dirty="0" smtClean="0"/>
+                        <a:t>-</a:t>
+                      </a:r>
+                      <a:endParaRPr lang="en-US" sz="1600" dirty="0"/>
+                    </a:p>
+                  </a:txBody>
+                  <a:tcPr anchor="ctr">
+                    <a:lnB w="12700" cap="flat" cmpd="sng" algn="ctr">
+                      <a:solidFill>
+                        <a:schemeClr val="tx1"/>
+                      </a:solidFill>
+                      <a:prstDash val="solid"/>
+                      <a:round/>
+                      <a:headEnd type="none" w="med" len="med"/>
+                      <a:tailEnd type="none" w="med" len="med"/>
+                    </a:lnB>
+                  </a:tcPr>
+                </a:tc>
+                <a:tc>
+                  <a:txBody>
+                    <a:bodyPr/>
+                    <a:lstStyle/>
+                    <a:p>
+                      <a:pPr algn="ctr"/>
+                      <a:r>
+                        <a:rPr lang="en-US" sz="1600" dirty="0" smtClean="0"/>
+                        <a:t>-</a:t>
+                      </a:r>
+                      <a:endParaRPr lang="en-US" sz="1600" dirty="0"/>
+                    </a:p>
+                  </a:txBody>
+                  <a:tcPr anchor="ctr">
+                    <a:lnB w="12700" cap="flat" cmpd="sng" algn="ctr">
+                      <a:solidFill>
+                        <a:schemeClr val="tx1"/>
+                      </a:solidFill>
+                      <a:prstDash val="solid"/>
+                      <a:round/>
+                      <a:headEnd type="none" w="med" len="med"/>
+                      <a:tailEnd type="none" w="med" len="med"/>
+                    </a:lnB>
+                  </a:tcPr>
+                </a:tc>
+                <a:tc>
+                  <a:txBody>
+                    <a:bodyPr/>
+                    <a:lstStyle/>
+                    <a:p>
+                      <a:pPr algn="ctr"/>
+                      <a:r>
+                        <a:rPr lang="en-US" sz="1600" dirty="0" smtClean="0"/>
+                        <a:t>-</a:t>
+                      </a:r>
+                      <a:endParaRPr lang="en-US" sz="1600" dirty="0"/>
+                    </a:p>
+                  </a:txBody>
+                  <a:tcPr anchor="ctr">
+                    <a:lnB w="12700" cap="flat" cmpd="sng" algn="ctr">
+                      <a:solidFill>
+                        <a:schemeClr val="tx1"/>
+                      </a:solidFill>
+                      <a:prstDash val="solid"/>
+                      <a:round/>
+                      <a:headEnd type="none" w="med" len="med"/>
+                      <a:tailEnd type="none" w="med" len="med"/>
+                    </a:lnB>
+                  </a:tcPr>
+                </a:tc>
+                <a:tc>
+                  <a:txBody>
+                    <a:bodyPr/>
+                    <a:lstStyle/>
+                    <a:p>
+                      <a:pPr algn="ctr"/>
+                      <a:r>
+                        <a:rPr lang="en-US" sz="1600" dirty="0" smtClean="0"/>
+                        <a:t>5510</a:t>
+                      </a:r>
+                      <a:endParaRPr lang="en-US" sz="1600" dirty="0"/>
+                    </a:p>
+                  </a:txBody>
+                  <a:tcPr anchor="ctr">
+                    <a:lnR w="12700" cap="flat" cmpd="sng" algn="ctr">
+                      <a:solidFill>
+                        <a:schemeClr val="tx1"/>
+                      </a:solidFill>
+                      <a:prstDash val="solid"/>
+                      <a:round/>
+                      <a:headEnd type="none" w="med" len="med"/>
+                      <a:tailEnd type="none" w="med" len="med"/>
+                    </a:lnR>
+                    <a:lnB w="12700" cap="flat" cmpd="sng" algn="ctr">
+                      <a:solidFill>
+                        <a:schemeClr val="tx1"/>
+                      </a:solidFill>
+                      <a:prstDash val="solid"/>
+                      <a:round/>
+                      <a:headEnd type="none" w="med" len="med"/>
+                      <a:tailEnd type="none" w="med" len="med"/>
+                    </a:lnB>
+                  </a:tcPr>
+                </a:tc>
+                <a:extLst>
+                  <a:ext uri="{0D108BD9-81ED-4DB2-BD59-A6C34878D82A}">
+                    <a16:rowId xmlns:a16="http://schemas.microsoft.com/office/drawing/2014/main" val="2128326411"/>
+                  </a:ext>
+                </a:extLst>
+              </a:tr>
+              <a:tr h="489882">
+                <a:tc rowSpan="2">
+                  <a:txBody>
+                    <a:bodyPr/>
+                    <a:lstStyle/>
+                    <a:p>
+                      <a:pPr algn="ctr"/>
+                      <a:r>
+                        <a:rPr lang="en-US" dirty="0" smtClean="0"/>
+                        <a:t>DLPFC</a:t>
+                      </a:r>
+                      <a:endParaRPr lang="en-US" dirty="0"/>
+                    </a:p>
+                  </a:txBody>
+                  <a:tcPr anchor="ctr">
+                    <a:lnL w="12700" cap="flat" cmpd="sng" algn="ctr">
+                      <a:solidFill>
+                        <a:schemeClr val="tx1"/>
+                      </a:solidFill>
+                      <a:prstDash val="solid"/>
+                      <a:round/>
+                      <a:headEnd type="none" w="med" len="med"/>
+                      <a:tailEnd type="none" w="med" len="med"/>
+                    </a:lnL>
+                    <a:lnT w="12700" cap="flat" cmpd="sng" algn="ctr">
+                      <a:solidFill>
+                        <a:schemeClr val="tx1"/>
+                      </a:solidFill>
+                      <a:prstDash val="solid"/>
+                      <a:round/>
+                      <a:headEnd type="none" w="med" len="med"/>
+                      <a:tailEnd type="none" w="med" len="med"/>
+                    </a:lnT>
+                    <a:lnB w="12700" cap="flat" cmpd="sng" algn="ctr">
+                      <a:solidFill>
+                        <a:schemeClr val="tx1"/>
+                      </a:solidFill>
+                      <a:prstDash val="solid"/>
+                      <a:round/>
+                      <a:headEnd type="none" w="med" len="med"/>
+                      <a:tailEnd type="none" w="med" len="med"/>
+                    </a:lnB>
+                  </a:tcPr>
+                </a:tc>
+                <a:tc>
+                  <a:txBody>
+                    <a:bodyPr/>
+                    <a:lstStyle/>
+                    <a:p>
+                      <a:pPr algn="ctr"/>
+                      <a:r>
+                        <a:rPr lang="en-US" sz="1600" dirty="0" smtClean="0"/>
+                        <a:t>1</a:t>
+                      </a:r>
+                      <a:endParaRPr lang="en-US" sz="1600" dirty="0"/>
+                    </a:p>
+                  </a:txBody>
+                  <a:tcPr anchor="ctr">
+                    <a:lnT w="12700" cap="flat" cmpd="sng" algn="ctr">
+                      <a:solidFill>
+                        <a:schemeClr val="tx1"/>
+                      </a:solidFill>
+                      <a:prstDash val="solid"/>
+                      <a:round/>
+                      <a:headEnd type="none" w="med" len="med"/>
+                      <a:tailEnd type="none" w="med" len="med"/>
+                    </a:lnT>
+                  </a:tcPr>
+                </a:tc>
+                <a:tc>
+                  <a:txBody>
+                    <a:bodyPr/>
+                    <a:lstStyle/>
+                    <a:p>
+                      <a:pPr algn="ctr"/>
+                      <a:r>
+                        <a:rPr lang="en-US" sz="1600" dirty="0" smtClean="0"/>
+                        <a:t>2</a:t>
+                      </a:r>
+                      <a:endParaRPr lang="en-US" sz="1600" dirty="0"/>
+                    </a:p>
+                  </a:txBody>
+                  <a:tcPr anchor="ctr">
+                    <a:lnT w="12700" cap="flat" cmpd="sng" algn="ctr">
+                      <a:solidFill>
+                        <a:schemeClr val="tx1"/>
+                      </a:solidFill>
+                      <a:prstDash val="solid"/>
+                      <a:round/>
+                      <a:headEnd type="none" w="med" len="med"/>
+                      <a:tailEnd type="none" w="med" len="med"/>
+                    </a:lnT>
+                  </a:tcPr>
+                </a:tc>
+                <a:tc>
+                  <a:txBody>
+                    <a:bodyPr/>
+                    <a:lstStyle/>
+                    <a:p>
+                      <a:pPr algn="ctr"/>
+                      <a:r>
+                        <a:rPr lang="en-US" sz="1600" dirty="0" smtClean="0"/>
+                        <a:t>3</a:t>
+                      </a:r>
+                      <a:endParaRPr lang="en-US" sz="1600" dirty="0"/>
+                    </a:p>
+                  </a:txBody>
+                  <a:tcPr anchor="ctr">
+                    <a:lnT w="12700" cap="flat" cmpd="sng" algn="ctr">
+                      <a:solidFill>
+                        <a:schemeClr val="tx1"/>
+                      </a:solidFill>
+                      <a:prstDash val="solid"/>
+                      <a:round/>
+                      <a:headEnd type="none" w="med" len="med"/>
+                      <a:tailEnd type="none" w="med" len="med"/>
+                    </a:lnT>
+                  </a:tcPr>
+                </a:tc>
+                <a:tc>
+                  <a:txBody>
+                    <a:bodyPr/>
+                    <a:lstStyle/>
+                    <a:p>
+                      <a:pPr algn="ctr"/>
+                      <a:r>
+                        <a:rPr lang="en-US" sz="1600" dirty="0" smtClean="0"/>
+                        <a:t>4</a:t>
+                      </a:r>
+                      <a:endParaRPr lang="en-US" sz="1600" dirty="0"/>
+                    </a:p>
+                  </a:txBody>
+                  <a:tcPr anchor="ctr">
+                    <a:lnT w="12700" cap="flat" cmpd="sng" algn="ctr">
+                      <a:solidFill>
+                        <a:schemeClr val="tx1"/>
+                      </a:solidFill>
+                      <a:prstDash val="solid"/>
+                      <a:round/>
+                      <a:headEnd type="none" w="med" len="med"/>
+                      <a:tailEnd type="none" w="med" len="med"/>
+                    </a:lnT>
+                  </a:tcPr>
+                </a:tc>
+                <a:tc>
+                  <a:txBody>
+                    <a:bodyPr/>
+                    <a:lstStyle/>
+                    <a:p>
+                      <a:pPr algn="ctr"/>
+                      <a:r>
+                        <a:rPr lang="en-US" sz="1600" dirty="0" smtClean="0"/>
+                        <a:t>5</a:t>
+                      </a:r>
+                      <a:endParaRPr lang="en-US" sz="1600" dirty="0"/>
+                    </a:p>
+                  </a:txBody>
+                  <a:tcPr anchor="ctr">
+                    <a:lnT w="12700" cap="flat" cmpd="sng" algn="ctr">
+                      <a:solidFill>
+                        <a:schemeClr val="tx1"/>
+                      </a:solidFill>
+                      <a:prstDash val="solid"/>
+                      <a:round/>
+                      <a:headEnd type="none" w="med" len="med"/>
+                      <a:tailEnd type="none" w="med" len="med"/>
+                    </a:lnT>
+                  </a:tcPr>
+                </a:tc>
+                <a:tc>
+                  <a:txBody>
+                    <a:bodyPr/>
+                    <a:lstStyle/>
+                    <a:p>
+                      <a:pPr algn="ctr"/>
+                      <a:r>
+                        <a:rPr lang="en-US" sz="1600" dirty="0" smtClean="0"/>
+                        <a:t>6</a:t>
+                      </a:r>
+                      <a:endParaRPr lang="en-US" sz="1600" dirty="0"/>
+                    </a:p>
+                  </a:txBody>
+                  <a:tcPr anchor="ctr">
+                    <a:lnT w="12700" cap="flat" cmpd="sng" algn="ctr">
+                      <a:solidFill>
+                        <a:schemeClr val="tx1"/>
+                      </a:solidFill>
+                      <a:prstDash val="solid"/>
+                      <a:round/>
+                      <a:headEnd type="none" w="med" len="med"/>
+                      <a:tailEnd type="none" w="med" len="med"/>
+                    </a:lnT>
+                  </a:tcPr>
+                </a:tc>
+                <a:tc>
+                  <a:txBody>
+                    <a:bodyPr/>
+                    <a:lstStyle/>
+                    <a:p>
+                      <a:pPr algn="ctr"/>
+                      <a:r>
+                        <a:rPr lang="en-US" sz="1600" dirty="0" smtClean="0"/>
+                        <a:t>7</a:t>
+                      </a:r>
+                      <a:endParaRPr lang="en-US" sz="1600" dirty="0"/>
+                    </a:p>
+                  </a:txBody>
+                  <a:tcPr anchor="ctr">
+                    <a:lnT w="12700" cap="flat" cmpd="sng" algn="ctr">
+                      <a:solidFill>
+                        <a:schemeClr val="tx1"/>
+                      </a:solidFill>
+                      <a:prstDash val="solid"/>
+                      <a:round/>
+                      <a:headEnd type="none" w="med" len="med"/>
+                      <a:tailEnd type="none" w="med" len="med"/>
+                    </a:lnT>
+                  </a:tcPr>
+                </a:tc>
+                <a:tc>
+                  <a:txBody>
+                    <a:bodyPr/>
+                    <a:lstStyle/>
+                    <a:p>
+                      <a:pPr algn="ctr"/>
+                      <a:r>
+                        <a:rPr lang="en-US" sz="1600" dirty="0" smtClean="0"/>
+                        <a:t>8</a:t>
+                      </a:r>
+                      <a:endParaRPr lang="en-US" sz="1600" dirty="0"/>
+                    </a:p>
+                  </a:txBody>
+                  <a:tcPr anchor="ctr">
+                    <a:lnT w="12700" cap="flat" cmpd="sng" algn="ctr">
+                      <a:solidFill>
+                        <a:schemeClr val="tx1"/>
+                      </a:solidFill>
+                      <a:prstDash val="solid"/>
+                      <a:round/>
+                      <a:headEnd type="none" w="med" len="med"/>
+                      <a:tailEnd type="none" w="med" len="med"/>
+                    </a:lnT>
+                  </a:tcPr>
+                </a:tc>
+                <a:tc>
+                  <a:txBody>
+                    <a:bodyPr/>
+                    <a:lstStyle/>
+                    <a:p>
+                      <a:pPr algn="ctr"/>
+                      <a:r>
+                        <a:rPr lang="en-US" sz="1600" dirty="0" smtClean="0"/>
+                        <a:t>9</a:t>
+                      </a:r>
+                      <a:endParaRPr lang="en-US" sz="1600" dirty="0"/>
+                    </a:p>
+                  </a:txBody>
+                  <a:tcPr anchor="ctr">
+                    <a:lnT w="12700" cap="flat" cmpd="sng" algn="ctr">
+                      <a:solidFill>
+                        <a:schemeClr val="tx1"/>
+                      </a:solidFill>
+                      <a:prstDash val="solid"/>
+                      <a:round/>
+                      <a:headEnd type="none" w="med" len="med"/>
+                      <a:tailEnd type="none" w="med" len="med"/>
+                    </a:lnT>
+                  </a:tcPr>
+                </a:tc>
+                <a:tc>
+                  <a:txBody>
+                    <a:bodyPr/>
+                    <a:lstStyle/>
+                    <a:p>
+                      <a:pPr algn="ctr"/>
+                      <a:r>
+                        <a:rPr lang="en-US" sz="1600" dirty="0" smtClean="0"/>
+                        <a:t>10</a:t>
+                      </a:r>
+                      <a:endParaRPr lang="en-US" sz="1600" dirty="0"/>
+                    </a:p>
+                  </a:txBody>
+                  <a:tcPr anchor="ctr">
+                    <a:lnT w="12700" cap="flat" cmpd="sng" algn="ctr">
+                      <a:solidFill>
+                        <a:schemeClr val="tx1"/>
+                      </a:solidFill>
+                      <a:prstDash val="solid"/>
+                      <a:round/>
+                      <a:headEnd type="none" w="med" len="med"/>
+                      <a:tailEnd type="none" w="med" len="med"/>
+                    </a:lnT>
+                  </a:tcPr>
+                </a:tc>
+                <a:tc>
+                  <a:txBody>
+                    <a:bodyPr/>
+                    <a:lstStyle/>
+                    <a:p>
+                      <a:pPr algn="ctr"/>
+                      <a:r>
+                        <a:rPr lang="en-US" sz="1600" dirty="0" smtClean="0"/>
+                        <a:t>11</a:t>
+                      </a:r>
+                      <a:endParaRPr lang="en-US" sz="1600" dirty="0"/>
+                    </a:p>
+                  </a:txBody>
+                  <a:tcPr anchor="ctr">
+                    <a:lnT w="12700" cap="flat" cmpd="sng" algn="ctr">
+                      <a:solidFill>
+                        <a:schemeClr val="tx1"/>
+                      </a:solidFill>
+                      <a:prstDash val="solid"/>
+                      <a:round/>
+                      <a:headEnd type="none" w="med" len="med"/>
+                      <a:tailEnd type="none" w="med" len="med"/>
+                    </a:lnT>
+                  </a:tcPr>
+                </a:tc>
+                <a:tc>
+                  <a:txBody>
+                    <a:bodyPr/>
+                    <a:lstStyle/>
+                    <a:p>
+                      <a:pPr algn="ctr"/>
+                      <a:r>
+                        <a:rPr lang="en-US" sz="1600" dirty="0" smtClean="0"/>
+                        <a:t>12</a:t>
+                      </a:r>
+                      <a:endParaRPr lang="en-US" sz="1600" dirty="0"/>
+                    </a:p>
+                  </a:txBody>
+                  <a:tcPr anchor="ctr">
+                    <a:lnT w="12700" cap="flat" cmpd="sng" algn="ctr">
+                      <a:solidFill>
+                        <a:schemeClr val="tx1"/>
+                      </a:solidFill>
+                      <a:prstDash val="solid"/>
+                      <a:round/>
+                      <a:headEnd type="none" w="med" len="med"/>
+                      <a:tailEnd type="none" w="med" len="med"/>
+                    </a:lnT>
+                  </a:tcPr>
+                </a:tc>
+                <a:tc>
+                  <a:txBody>
+                    <a:bodyPr/>
+                    <a:lstStyle/>
+                    <a:p>
+                      <a:pPr algn="ctr"/>
+                      <a:r>
+                        <a:rPr lang="en-US" sz="1600" dirty="0" smtClean="0"/>
+                        <a:t>13</a:t>
+                      </a:r>
+                      <a:endParaRPr lang="en-US" sz="1600" dirty="0"/>
+                    </a:p>
+                  </a:txBody>
+                  <a:tcPr anchor="ctr">
+                    <a:lnT w="12700" cap="flat" cmpd="sng" algn="ctr">
+                      <a:solidFill>
+                        <a:schemeClr val="tx1"/>
+                      </a:solidFill>
+                      <a:prstDash val="solid"/>
+                      <a:round/>
+                      <a:headEnd type="none" w="med" len="med"/>
+                      <a:tailEnd type="none" w="med" len="med"/>
+                    </a:lnT>
+                  </a:tcPr>
+                </a:tc>
+                <a:tc>
+                  <a:txBody>
+                    <a:bodyPr/>
+                    <a:lstStyle/>
+                    <a:p>
+                      <a:pPr algn="ctr"/>
+                      <a:r>
+                        <a:rPr lang="en-US" sz="1600" dirty="0" smtClean="0"/>
+                        <a:t>14</a:t>
+                      </a:r>
+                      <a:endParaRPr lang="en-US" sz="1600" dirty="0"/>
+                    </a:p>
+                  </a:txBody>
+                  <a:tcPr anchor="ctr">
+                    <a:lnT w="12700" cap="flat" cmpd="sng" algn="ctr">
+                      <a:solidFill>
+                        <a:schemeClr val="tx1"/>
+                      </a:solidFill>
+                      <a:prstDash val="solid"/>
+                      <a:round/>
+                      <a:headEnd type="none" w="med" len="med"/>
+                      <a:tailEnd type="none" w="med" len="med"/>
+                    </a:lnT>
+                  </a:tcPr>
+                </a:tc>
+                <a:tc>
+                  <a:txBody>
+                    <a:bodyPr/>
+                    <a:lstStyle/>
+                    <a:p>
+                      <a:pPr algn="ctr"/>
+                      <a:r>
+                        <a:rPr lang="en-US" sz="1600" dirty="0" smtClean="0"/>
+                        <a:t>15</a:t>
+                      </a:r>
+                      <a:endParaRPr lang="en-US" sz="1600" dirty="0"/>
+                    </a:p>
+                  </a:txBody>
+                  <a:tcPr anchor="ctr">
+                    <a:lnT w="12700" cap="flat" cmpd="sng" algn="ctr">
+                      <a:solidFill>
+                        <a:schemeClr val="tx1"/>
+                      </a:solidFill>
+                      <a:prstDash val="solid"/>
+                      <a:round/>
+                      <a:headEnd type="none" w="med" len="med"/>
+                      <a:tailEnd type="none" w="med" len="med"/>
+                    </a:lnT>
+                  </a:tcPr>
+                </a:tc>
+                <a:tc>
+                  <a:txBody>
+                    <a:bodyPr/>
+                    <a:lstStyle/>
+                    <a:p>
+                      <a:pPr algn="ctr"/>
+                      <a:r>
+                        <a:rPr lang="en-US" sz="1600" dirty="0" smtClean="0"/>
+                        <a:t>16</a:t>
+                      </a:r>
+                      <a:endParaRPr lang="en-US" sz="1600" dirty="0"/>
+                    </a:p>
+                  </a:txBody>
+                  <a:tcPr anchor="ctr">
+                    <a:lnT w="12700" cap="flat" cmpd="sng" algn="ctr">
+                      <a:solidFill>
+                        <a:schemeClr val="tx1"/>
+                      </a:solidFill>
+                      <a:prstDash val="solid"/>
+                      <a:round/>
+                      <a:headEnd type="none" w="med" len="med"/>
+                      <a:tailEnd type="none" w="med" len="med"/>
+                    </a:lnT>
+                  </a:tcPr>
+                </a:tc>
+                <a:tc>
+                  <a:txBody>
+                    <a:bodyPr/>
+                    <a:lstStyle/>
+                    <a:p>
+                      <a:pPr algn="ctr"/>
+                      <a:endParaRPr lang="en-US" sz="1600" dirty="0"/>
+                    </a:p>
+                  </a:txBody>
+                  <a:tcPr anchor="ctr">
+                    <a:lnR w="12700" cap="flat" cmpd="sng" algn="ctr">
+                      <a:solidFill>
+                        <a:schemeClr val="tx1"/>
+                      </a:solidFill>
+                      <a:prstDash val="solid"/>
+                      <a:round/>
+                      <a:headEnd type="none" w="med" len="med"/>
+                      <a:tailEnd type="none" w="med" len="med"/>
+                    </a:lnR>
+                    <a:lnT w="12700" cap="flat" cmpd="sng" algn="ctr">
+                      <a:solidFill>
+                        <a:schemeClr val="tx1"/>
+                      </a:solidFill>
+                      <a:prstDash val="solid"/>
+                      <a:round/>
+                      <a:headEnd type="none" w="med" len="med"/>
+                      <a:tailEnd type="none" w="med" len="med"/>
+                    </a:lnT>
+                  </a:tcPr>
+                </a:tc>
+                <a:extLst>
+                  <a:ext uri="{0D108BD9-81ED-4DB2-BD59-A6C34878D82A}">
+                    <a16:rowId xmlns:a16="http://schemas.microsoft.com/office/drawing/2014/main" val="2810899241"/>
+                  </a:ext>
+                </a:extLst>
+              </a:tr>
+              <a:tr h="489882">
+                <a:tc vMerge="1">
+                  <a:txBody>
+                    <a:bodyPr/>
+                    <a:lstStyle/>
+                    <a:p>
+                      <a:endParaRPr lang="en-US" dirty="0"/>
+                    </a:p>
+                  </a:txBody>
+                  <a:tcPr/>
+                </a:tc>
+                <a:tc>
+                  <a:txBody>
+                    <a:bodyPr/>
+                    <a:lstStyle/>
+                    <a:p>
+                      <a:pPr algn="ctr"/>
+                      <a:r>
+                        <a:rPr lang="en-US" sz="1600" dirty="0" smtClean="0"/>
+                        <a:t>2447</a:t>
+                      </a:r>
+                      <a:endParaRPr lang="en-US" sz="1600" dirty="0"/>
+                    </a:p>
+                  </a:txBody>
+                  <a:tcPr anchor="ctr">
+                    <a:lnB w="12700" cap="flat" cmpd="sng" algn="ctr">
+                      <a:solidFill>
+                        <a:schemeClr val="tx1"/>
+                      </a:solidFill>
+                      <a:prstDash val="solid"/>
+                      <a:round/>
+                      <a:headEnd type="none" w="med" len="med"/>
+                      <a:tailEnd type="none" w="med" len="med"/>
+                    </a:lnB>
+                  </a:tcPr>
+                </a:tc>
+                <a:tc>
+                  <a:txBody>
+                    <a:bodyPr/>
+                    <a:lstStyle/>
+                    <a:p>
+                      <a:pPr algn="ctr"/>
+                      <a:r>
+                        <a:rPr lang="en-US" sz="1600" dirty="0" smtClean="0"/>
+                        <a:t>1790</a:t>
+                      </a:r>
+                      <a:endParaRPr lang="en-US" sz="1600" dirty="0"/>
+                    </a:p>
+                  </a:txBody>
+                  <a:tcPr anchor="ctr">
+                    <a:lnB w="12700" cap="flat" cmpd="sng" algn="ctr">
+                      <a:solidFill>
+                        <a:schemeClr val="tx1"/>
+                      </a:solidFill>
+                      <a:prstDash val="solid"/>
+                      <a:round/>
+                      <a:headEnd type="none" w="med" len="med"/>
+                      <a:tailEnd type="none" w="med" len="med"/>
+                    </a:lnB>
+                  </a:tcPr>
+                </a:tc>
+                <a:tc>
+                  <a:txBody>
+                    <a:bodyPr/>
+                    <a:lstStyle/>
+                    <a:p>
+                      <a:pPr algn="ctr"/>
+                      <a:r>
+                        <a:rPr lang="en-US" sz="1600" dirty="0" smtClean="0"/>
+                        <a:t>679</a:t>
+                      </a:r>
+                      <a:endParaRPr lang="en-US" sz="1600" dirty="0"/>
+                    </a:p>
+                  </a:txBody>
+                  <a:tcPr anchor="ctr">
+                    <a:lnB w="12700" cap="flat" cmpd="sng" algn="ctr">
+                      <a:solidFill>
+                        <a:schemeClr val="tx1"/>
+                      </a:solidFill>
+                      <a:prstDash val="solid"/>
+                      <a:round/>
+                      <a:headEnd type="none" w="med" len="med"/>
+                      <a:tailEnd type="none" w="med" len="med"/>
+                    </a:lnB>
+                  </a:tcPr>
+                </a:tc>
+                <a:tc>
+                  <a:txBody>
+                    <a:bodyPr/>
+                    <a:lstStyle/>
+                    <a:p>
+                      <a:pPr algn="ctr"/>
+                      <a:r>
+                        <a:rPr lang="en-US" sz="1600" dirty="0" smtClean="0"/>
+                        <a:t>686</a:t>
+                      </a:r>
+                      <a:endParaRPr lang="en-US" sz="1600" dirty="0"/>
+                    </a:p>
+                  </a:txBody>
+                  <a:tcPr anchor="ctr">
+                    <a:lnB w="12700" cap="flat" cmpd="sng" algn="ctr">
+                      <a:solidFill>
+                        <a:schemeClr val="tx1"/>
+                      </a:solidFill>
+                      <a:prstDash val="solid"/>
+                      <a:round/>
+                      <a:headEnd type="none" w="med" len="med"/>
+                      <a:tailEnd type="none" w="med" len="med"/>
+                    </a:lnB>
+                  </a:tcPr>
+                </a:tc>
+                <a:tc>
+                  <a:txBody>
+                    <a:bodyPr/>
+                    <a:lstStyle/>
+                    <a:p>
+                      <a:pPr algn="ctr"/>
+                      <a:r>
+                        <a:rPr lang="en-US" sz="1600" dirty="0" smtClean="0"/>
+                        <a:t>329</a:t>
+                      </a:r>
+                      <a:endParaRPr lang="en-US" sz="1600" dirty="0"/>
+                    </a:p>
+                  </a:txBody>
+                  <a:tcPr anchor="ctr">
+                    <a:lnB w="12700" cap="flat" cmpd="sng" algn="ctr">
+                      <a:solidFill>
+                        <a:schemeClr val="tx1"/>
+                      </a:solidFill>
+                      <a:prstDash val="solid"/>
+                      <a:round/>
+                      <a:headEnd type="none" w="med" len="med"/>
+                      <a:tailEnd type="none" w="med" len="med"/>
+                    </a:lnB>
+                  </a:tcPr>
+                </a:tc>
+                <a:tc>
+                  <a:txBody>
+                    <a:bodyPr/>
+                    <a:lstStyle/>
+                    <a:p>
+                      <a:pPr algn="ctr"/>
+                      <a:r>
+                        <a:rPr lang="en-US" sz="1600" dirty="0" smtClean="0"/>
+                        <a:t>292</a:t>
+                      </a:r>
+                      <a:endParaRPr lang="en-US" sz="1600" dirty="0"/>
+                    </a:p>
+                  </a:txBody>
+                  <a:tcPr anchor="ctr">
+                    <a:lnB w="12700" cap="flat" cmpd="sng" algn="ctr">
+                      <a:solidFill>
+                        <a:schemeClr val="tx1"/>
+                      </a:solidFill>
+                      <a:prstDash val="solid"/>
+                      <a:round/>
+                      <a:headEnd type="none" w="med" len="med"/>
+                      <a:tailEnd type="none" w="med" len="med"/>
+                    </a:lnB>
+                  </a:tcPr>
+                </a:tc>
+                <a:tc>
+                  <a:txBody>
+                    <a:bodyPr/>
+                    <a:lstStyle/>
+                    <a:p>
+                      <a:pPr algn="ctr"/>
+                      <a:r>
+                        <a:rPr lang="en-US" sz="1600" dirty="0" smtClean="0"/>
+                        <a:t>107</a:t>
+                      </a:r>
+                      <a:endParaRPr lang="en-US" sz="1600" dirty="0"/>
+                    </a:p>
+                  </a:txBody>
+                  <a:tcPr anchor="ctr">
+                    <a:lnB w="12700" cap="flat" cmpd="sng" algn="ctr">
+                      <a:solidFill>
+                        <a:schemeClr val="tx1"/>
+                      </a:solidFill>
+                      <a:prstDash val="solid"/>
+                      <a:round/>
+                      <a:headEnd type="none" w="med" len="med"/>
+                      <a:tailEnd type="none" w="med" len="med"/>
+                    </a:lnB>
+                  </a:tcPr>
+                </a:tc>
+                <a:tc>
+                  <a:txBody>
+                    <a:bodyPr/>
+                    <a:lstStyle/>
+                    <a:p>
+                      <a:pPr algn="ctr"/>
+                      <a:r>
+                        <a:rPr lang="en-US" sz="1600" dirty="0" smtClean="0"/>
+                        <a:t>136</a:t>
+                      </a:r>
+                      <a:endParaRPr lang="en-US" sz="1600" dirty="0"/>
+                    </a:p>
+                  </a:txBody>
+                  <a:tcPr anchor="ctr">
+                    <a:lnB w="12700" cap="flat" cmpd="sng" algn="ctr">
+                      <a:solidFill>
+                        <a:schemeClr val="tx1"/>
+                      </a:solidFill>
+                      <a:prstDash val="solid"/>
+                      <a:round/>
+                      <a:headEnd type="none" w="med" len="med"/>
+                      <a:tailEnd type="none" w="med" len="med"/>
+                    </a:lnB>
+                  </a:tcPr>
+                </a:tc>
+                <a:tc>
+                  <a:txBody>
+                    <a:bodyPr/>
+                    <a:lstStyle/>
+                    <a:p>
+                      <a:pPr algn="ctr"/>
+                      <a:r>
+                        <a:rPr lang="en-US" sz="1600" dirty="0" smtClean="0"/>
+                        <a:t>50</a:t>
+                      </a:r>
+                      <a:endParaRPr lang="en-US" sz="1600" dirty="0"/>
+                    </a:p>
+                  </a:txBody>
+                  <a:tcPr anchor="ctr">
+                    <a:lnB w="12700" cap="flat" cmpd="sng" algn="ctr">
+                      <a:solidFill>
+                        <a:schemeClr val="tx1"/>
+                      </a:solidFill>
+                      <a:prstDash val="solid"/>
+                      <a:round/>
+                      <a:headEnd type="none" w="med" len="med"/>
+                      <a:tailEnd type="none" w="med" len="med"/>
+                    </a:lnB>
+                  </a:tcPr>
+                </a:tc>
+                <a:tc>
+                  <a:txBody>
+                    <a:bodyPr/>
+                    <a:lstStyle/>
+                    <a:p>
+                      <a:pPr algn="ctr"/>
+                      <a:r>
+                        <a:rPr lang="en-US" sz="1600" dirty="0" smtClean="0"/>
+                        <a:t>49</a:t>
+                      </a:r>
+                      <a:endParaRPr lang="en-US" sz="1600" dirty="0"/>
+                    </a:p>
+                  </a:txBody>
+                  <a:tcPr anchor="ctr">
+                    <a:lnB w="12700" cap="flat" cmpd="sng" algn="ctr">
+                      <a:solidFill>
+                        <a:schemeClr val="tx1"/>
+                      </a:solidFill>
+                      <a:prstDash val="solid"/>
+                      <a:round/>
+                      <a:headEnd type="none" w="med" len="med"/>
+                      <a:tailEnd type="none" w="med" len="med"/>
+                    </a:lnB>
+                  </a:tcPr>
+                </a:tc>
+                <a:tc>
+                  <a:txBody>
+                    <a:bodyPr/>
+                    <a:lstStyle/>
+                    <a:p>
+                      <a:pPr algn="ctr"/>
+                      <a:r>
+                        <a:rPr lang="en-US" sz="1600" dirty="0" smtClean="0"/>
+                        <a:t>70</a:t>
+                      </a:r>
+                      <a:endParaRPr lang="en-US" sz="1600" dirty="0"/>
+                    </a:p>
+                  </a:txBody>
+                  <a:tcPr anchor="ctr">
+                    <a:lnB w="12700" cap="flat" cmpd="sng" algn="ctr">
+                      <a:solidFill>
+                        <a:schemeClr val="tx1"/>
+                      </a:solidFill>
+                      <a:prstDash val="solid"/>
+                      <a:round/>
+                      <a:headEnd type="none" w="med" len="med"/>
+                      <a:tailEnd type="none" w="med" len="med"/>
+                    </a:lnB>
+                  </a:tcPr>
+                </a:tc>
+                <a:tc>
+                  <a:txBody>
+                    <a:bodyPr/>
+                    <a:lstStyle/>
+                    <a:p>
+                      <a:pPr algn="ctr"/>
+                      <a:r>
+                        <a:rPr lang="en-US" sz="1600" dirty="0" smtClean="0"/>
+                        <a:t>73</a:t>
+                      </a:r>
+                      <a:endParaRPr lang="en-US" sz="1600" dirty="0"/>
+                    </a:p>
+                  </a:txBody>
+                  <a:tcPr anchor="ctr">
+                    <a:lnB w="12700" cap="flat" cmpd="sng" algn="ctr">
+                      <a:solidFill>
+                        <a:schemeClr val="tx1"/>
+                      </a:solidFill>
+                      <a:prstDash val="solid"/>
+                      <a:round/>
+                      <a:headEnd type="none" w="med" len="med"/>
+                      <a:tailEnd type="none" w="med" len="med"/>
+                    </a:lnB>
+                  </a:tcPr>
+                </a:tc>
+                <a:tc>
+                  <a:txBody>
+                    <a:bodyPr/>
+                    <a:lstStyle/>
+                    <a:p>
+                      <a:pPr algn="ctr"/>
+                      <a:r>
+                        <a:rPr lang="en-US" sz="1600" dirty="0" smtClean="0"/>
+                        <a:t>36</a:t>
+                      </a:r>
+                      <a:endParaRPr lang="en-US" sz="1600" dirty="0"/>
+                    </a:p>
+                  </a:txBody>
+                  <a:tcPr anchor="ctr">
+                    <a:lnB w="12700" cap="flat" cmpd="sng" algn="ctr">
+                      <a:solidFill>
+                        <a:schemeClr val="tx1"/>
+                      </a:solidFill>
+                      <a:prstDash val="solid"/>
+                      <a:round/>
+                      <a:headEnd type="none" w="med" len="med"/>
+                      <a:tailEnd type="none" w="med" len="med"/>
+                    </a:lnB>
+                  </a:tcPr>
+                </a:tc>
+                <a:tc>
+                  <a:txBody>
+                    <a:bodyPr/>
+                    <a:lstStyle/>
+                    <a:p>
+                      <a:pPr algn="ctr"/>
+                      <a:r>
+                        <a:rPr lang="en-US" sz="1600" dirty="0" smtClean="0"/>
+                        <a:t>28</a:t>
+                      </a:r>
+                      <a:endParaRPr lang="en-US" sz="1600" dirty="0"/>
+                    </a:p>
+                  </a:txBody>
+                  <a:tcPr anchor="ctr">
+                    <a:lnB w="12700" cap="flat" cmpd="sng" algn="ctr">
+                      <a:solidFill>
+                        <a:schemeClr val="tx1"/>
+                      </a:solidFill>
+                      <a:prstDash val="solid"/>
+                      <a:round/>
+                      <a:headEnd type="none" w="med" len="med"/>
+                      <a:tailEnd type="none" w="med" len="med"/>
+                    </a:lnB>
+                  </a:tcPr>
+                </a:tc>
+                <a:tc>
+                  <a:txBody>
+                    <a:bodyPr/>
+                    <a:lstStyle/>
+                    <a:p>
+                      <a:pPr algn="ctr"/>
+                      <a:r>
+                        <a:rPr lang="en-US" sz="1600" dirty="0" smtClean="0"/>
+                        <a:t>7</a:t>
+                      </a:r>
+                      <a:endParaRPr lang="en-US" sz="1600" dirty="0"/>
+                    </a:p>
+                  </a:txBody>
+                  <a:tcPr anchor="ctr">
+                    <a:lnB w="12700" cap="flat" cmpd="sng" algn="ctr">
+                      <a:solidFill>
+                        <a:schemeClr val="tx1"/>
+                      </a:solidFill>
+                      <a:prstDash val="solid"/>
+                      <a:round/>
+                      <a:headEnd type="none" w="med" len="med"/>
+                      <a:tailEnd type="none" w="med" len="med"/>
+                    </a:lnB>
+                  </a:tcPr>
+                </a:tc>
+                <a:tc>
+                  <a:txBody>
+                    <a:bodyPr/>
+                    <a:lstStyle/>
+                    <a:p>
+                      <a:pPr algn="ctr"/>
+                      <a:r>
+                        <a:rPr lang="en-US" sz="1600" dirty="0" smtClean="0"/>
+                        <a:t>1</a:t>
+                      </a:r>
+                      <a:endParaRPr lang="en-US" sz="1600" dirty="0"/>
+                    </a:p>
+                  </a:txBody>
+                  <a:tcPr anchor="ctr">
+                    <a:lnB w="12700" cap="flat" cmpd="sng" algn="ctr">
+                      <a:solidFill>
+                        <a:schemeClr val="tx1"/>
+                      </a:solidFill>
+                      <a:prstDash val="solid"/>
+                      <a:round/>
+                      <a:headEnd type="none" w="med" len="med"/>
+                      <a:tailEnd type="none" w="med" len="med"/>
+                    </a:lnB>
+                  </a:tcPr>
+                </a:tc>
+                <a:tc>
+                  <a:txBody>
+                    <a:bodyPr/>
+                    <a:lstStyle/>
+                    <a:p>
+                      <a:pPr algn="ctr"/>
+                      <a:r>
+                        <a:rPr lang="en-US" sz="1600" dirty="0" smtClean="0"/>
+                        <a:t>6780</a:t>
+                      </a:r>
+                      <a:endParaRPr lang="en-US" sz="1600" dirty="0"/>
+                    </a:p>
+                  </a:txBody>
+                  <a:tcPr anchor="ctr">
+                    <a:lnR w="12700" cap="flat" cmpd="sng" algn="ctr">
+                      <a:solidFill>
+                        <a:schemeClr val="tx1"/>
+                      </a:solidFill>
+                      <a:prstDash val="solid"/>
+                      <a:round/>
+                      <a:headEnd type="none" w="med" len="med"/>
+                      <a:tailEnd type="none" w="med" len="med"/>
+                    </a:lnR>
+                    <a:lnB w="12700" cap="flat" cmpd="sng" algn="ctr">
+                      <a:solidFill>
+                        <a:schemeClr val="tx1"/>
+                      </a:solidFill>
+                      <a:prstDash val="solid"/>
+                      <a:round/>
+                      <a:headEnd type="none" w="med" len="med"/>
+                      <a:tailEnd type="none" w="med" len="med"/>
+                    </a:lnB>
+                  </a:tcPr>
+                </a:tc>
+                <a:extLst>
+                  <a:ext uri="{0D108BD9-81ED-4DB2-BD59-A6C34878D82A}">
+                    <a16:rowId xmlns:a16="http://schemas.microsoft.com/office/drawing/2014/main" val="1363691137"/>
+                  </a:ext>
+                </a:extLst>
+              </a:tr>
+            </a:tbl>
+          </a:graphicData>
+        </a:graphic>
+      </p:graphicFrame>
+      <p:sp>
+        <p:nvSpPr>
+          <p:cNvPr id="9" name="Rectangle 8"/>
+          <p:cNvSpPr/>
+          <p:nvPr/>
+        </p:nvSpPr>
+        <p:spPr>
+          <a:xfrm>
+            <a:off x="182878" y="3171182"/>
+            <a:ext cx="3659720" cy="369332"/>
+          </a:xfrm>
+          <a:prstGeom prst="rect">
+            <a:avLst/>
+          </a:prstGeom>
+        </p:spPr>
+        <p:txBody>
+          <a:bodyPr wrap="none">
+            <a:spAutoFit/>
+          </a:bodyPr>
+          <a:lstStyle/>
+          <a:p>
+            <a:r>
+              <a:rPr lang="en-US" dirty="0" smtClean="0"/>
+              <a:t>Number of SNPs that pair to n genes:</a:t>
+            </a:r>
+            <a:endParaRPr lang="en-US" dirty="0"/>
+          </a:p>
+        </p:txBody>
+      </p:sp>
+      <p:graphicFrame>
+        <p:nvGraphicFramePr>
+          <p:cNvPr id="10" name="Table 9"/>
+          <p:cNvGraphicFramePr>
+            <a:graphicFrameLocks noGrp="1"/>
+          </p:cNvGraphicFramePr>
+          <p:nvPr>
+            <p:extLst>
+              <p:ext uri="{D42A27DB-BD31-4B8C-83A1-F6EECF244321}">
+                <p14:modId xmlns:p14="http://schemas.microsoft.com/office/powerpoint/2010/main" val="1531797971"/>
+              </p:ext>
+            </p:extLst>
+          </p:nvPr>
+        </p:nvGraphicFramePr>
+        <p:xfrm>
+          <a:off x="588477" y="1487406"/>
+          <a:ext cx="8632033" cy="876442"/>
+        </p:xfrm>
+        <a:graphic>
+          <a:graphicData uri="http://schemas.openxmlformats.org/drawingml/2006/table">
+            <a:tbl>
+              <a:tblPr firstRow="1" bandRow="1">
+                <a:tableStyleId>{2D5ABB26-0587-4C30-8999-92F81FD0307C}</a:tableStyleId>
+              </a:tblPr>
+              <a:tblGrid>
+                <a:gridCol w="4412955">
+                  <a:extLst>
+                    <a:ext uri="{9D8B030D-6E8A-4147-A177-3AD203B41FA5}">
+                      <a16:colId xmlns:a16="http://schemas.microsoft.com/office/drawing/2014/main" val="1178349782"/>
+                    </a:ext>
+                  </a:extLst>
+                </a:gridCol>
+                <a:gridCol w="2109539">
+                  <a:extLst>
+                    <a:ext uri="{9D8B030D-6E8A-4147-A177-3AD203B41FA5}">
+                      <a16:colId xmlns:a16="http://schemas.microsoft.com/office/drawing/2014/main" val="1816200263"/>
+                    </a:ext>
+                  </a:extLst>
+                </a:gridCol>
+                <a:gridCol w="2109539">
+                  <a:extLst>
+                    <a:ext uri="{9D8B030D-6E8A-4147-A177-3AD203B41FA5}">
+                      <a16:colId xmlns:a16="http://schemas.microsoft.com/office/drawing/2014/main" val="3834981325"/>
+                    </a:ext>
+                  </a:extLst>
+                </a:gridCol>
+              </a:tblGrid>
+              <a:tr h="464962">
+                <a:tc>
+                  <a:txBody>
+                    <a:bodyPr/>
+                    <a:lstStyle/>
+                    <a:p>
+                      <a:pPr algn="ctr"/>
+                      <a:endParaRPr lang="en-US" sz="1800" dirty="0"/>
+                    </a:p>
+                  </a:txBody>
+                  <a:tcPr anchor="ctr">
+                    <a:lnL w="12700" cap="flat" cmpd="sng" algn="ctr">
+                      <a:solidFill>
+                        <a:schemeClr val="tx1"/>
+                      </a:solidFill>
+                      <a:prstDash val="solid"/>
+                      <a:round/>
+                      <a:headEnd type="none" w="med" len="med"/>
+                      <a:tailEnd type="none" w="med" len="med"/>
+                    </a:lnL>
+                    <a:lnR w="12700" cap="flat" cmpd="sng" algn="ctr">
+                      <a:solidFill>
+                        <a:schemeClr val="tx1"/>
+                      </a:solidFill>
+                      <a:prstDash val="solid"/>
+                      <a:round/>
+                      <a:headEnd type="none" w="med" len="med"/>
+                      <a:tailEnd type="none" w="med" len="med"/>
+                    </a:lnR>
+                    <a:lnT w="12700" cap="flat" cmpd="sng" algn="ctr">
+                      <a:solidFill>
+                        <a:schemeClr val="tx1"/>
+                      </a:solidFill>
+                      <a:prstDash val="solid"/>
+                      <a:round/>
+                      <a:headEnd type="none" w="med" len="med"/>
+                      <a:tailEnd type="none" w="med" len="med"/>
+                    </a:lnT>
+                    <a:lnB w="12700" cap="flat" cmpd="sng" algn="ctr">
+                      <a:solidFill>
+                        <a:schemeClr val="tx1"/>
+                      </a:solidFill>
+                      <a:prstDash val="solid"/>
+                      <a:round/>
+                      <a:headEnd type="none" w="med" len="med"/>
+                      <a:tailEnd type="none" w="med" len="med"/>
+                    </a:lnB>
+                  </a:tcPr>
+                </a:tc>
+                <a:tc>
+                  <a:txBody>
+                    <a:bodyPr/>
+                    <a:lstStyle/>
+                    <a:p>
+                      <a:pPr algn="ctr"/>
+                      <a:r>
+                        <a:rPr lang="en-US" sz="1800" dirty="0" smtClean="0"/>
+                        <a:t>Hippocampus</a:t>
+                      </a:r>
+                      <a:endParaRPr lang="en-US" sz="1800" dirty="0"/>
+                    </a:p>
+                  </a:txBody>
+                  <a:tcPr anchor="ctr">
+                    <a:lnL w="12700" cap="flat" cmpd="sng" algn="ctr">
+                      <a:solidFill>
+                        <a:schemeClr val="tx1"/>
+                      </a:solidFill>
+                      <a:prstDash val="solid"/>
+                      <a:round/>
+                      <a:headEnd type="none" w="med" len="med"/>
+                      <a:tailEnd type="none" w="med" len="med"/>
+                    </a:lnL>
+                    <a:lnR w="12700" cap="flat" cmpd="sng" algn="ctr">
+                      <a:solidFill>
+                        <a:schemeClr val="tx1"/>
+                      </a:solidFill>
+                      <a:prstDash val="solid"/>
+                      <a:round/>
+                      <a:headEnd type="none" w="med" len="med"/>
+                      <a:tailEnd type="none" w="med" len="med"/>
+                    </a:lnR>
+                    <a:lnT w="12700" cap="flat" cmpd="sng" algn="ctr">
+                      <a:solidFill>
+                        <a:schemeClr val="tx1"/>
+                      </a:solidFill>
+                      <a:prstDash val="solid"/>
+                      <a:round/>
+                      <a:headEnd type="none" w="med" len="med"/>
+                      <a:tailEnd type="none" w="med" len="med"/>
+                    </a:lnT>
+                    <a:lnB w="12700" cap="flat" cmpd="sng" algn="ctr">
+                      <a:solidFill>
+                        <a:schemeClr val="tx1"/>
+                      </a:solidFill>
+                      <a:prstDash val="solid"/>
+                      <a:round/>
+                      <a:headEnd type="none" w="med" len="med"/>
+                      <a:tailEnd type="none" w="med" len="med"/>
+                    </a:lnB>
+                  </a:tcPr>
+                </a:tc>
+                <a:tc>
+                  <a:txBody>
+                    <a:bodyPr/>
+                    <a:lstStyle/>
+                    <a:p>
+                      <a:pPr algn="ctr"/>
+                      <a:r>
+                        <a:rPr lang="en-US" sz="1800" dirty="0"/>
+                        <a:t>DLPFC</a:t>
+                      </a:r>
+                    </a:p>
+                  </a:txBody>
+                  <a:tcPr anchor="ctr">
+                    <a:lnL w="12700" cap="flat" cmpd="sng" algn="ctr">
+                      <a:solidFill>
+                        <a:schemeClr val="tx1"/>
+                      </a:solidFill>
+                      <a:prstDash val="solid"/>
+                      <a:round/>
+                      <a:headEnd type="none" w="med" len="med"/>
+                      <a:tailEnd type="none" w="med" len="med"/>
+                    </a:lnL>
+                    <a:lnR w="12700" cap="flat" cmpd="sng" algn="ctr">
+                      <a:solidFill>
+                        <a:schemeClr val="tx1"/>
+                      </a:solidFill>
+                      <a:prstDash val="solid"/>
+                      <a:round/>
+                      <a:headEnd type="none" w="med" len="med"/>
+                      <a:tailEnd type="none" w="med" len="med"/>
+                    </a:lnR>
+                    <a:lnT w="12700" cap="flat" cmpd="sng" algn="ctr">
+                      <a:solidFill>
+                        <a:schemeClr val="tx1"/>
+                      </a:solidFill>
+                      <a:prstDash val="solid"/>
+                      <a:round/>
+                      <a:headEnd type="none" w="med" len="med"/>
+                      <a:tailEnd type="none" w="med" len="med"/>
+                    </a:lnT>
+                    <a:lnB w="12700" cap="flat" cmpd="sng" algn="ctr">
+                      <a:solidFill>
+                        <a:schemeClr val="tx1"/>
+                      </a:solidFill>
+                      <a:prstDash val="solid"/>
+                      <a:round/>
+                      <a:headEnd type="none" w="med" len="med"/>
+                      <a:tailEnd type="none" w="med" len="med"/>
+                    </a:lnB>
+                  </a:tcPr>
+                </a:tc>
+                <a:extLst>
+                  <a:ext uri="{0D108BD9-81ED-4DB2-BD59-A6C34878D82A}">
+                    <a16:rowId xmlns:a16="http://schemas.microsoft.com/office/drawing/2014/main" val="2128684183"/>
+                  </a:ext>
+                </a:extLst>
+              </a:tr>
+              <a:tr h="411480">
+                <a:tc>
+                  <a:txBody>
+                    <a:bodyPr/>
+                    <a:lstStyle/>
+                    <a:p>
+                      <a:pPr algn="l"/>
+                      <a:r>
+                        <a:rPr lang="en-US" sz="1800" dirty="0"/>
+                        <a:t># </a:t>
+                      </a:r>
+                      <a:r>
+                        <a:rPr lang="en-US" sz="1800" dirty="0" smtClean="0"/>
+                        <a:t>unique SNPs (unique index SNPs)</a:t>
+                      </a:r>
+                      <a:endParaRPr lang="en-US" sz="1800" dirty="0"/>
+                    </a:p>
+                  </a:txBody>
+                  <a:tcPr anchor="ctr">
+                    <a:lnL w="12700" cap="flat" cmpd="sng" algn="ctr">
+                      <a:solidFill>
+                        <a:schemeClr val="tx1"/>
+                      </a:solidFill>
+                      <a:prstDash val="solid"/>
+                      <a:round/>
+                      <a:headEnd type="none" w="med" len="med"/>
+                      <a:tailEnd type="none" w="med" len="med"/>
+                    </a:lnL>
+                    <a:lnR w="12700" cap="flat" cmpd="sng" algn="ctr">
+                      <a:solidFill>
+                        <a:schemeClr val="tx1"/>
+                      </a:solidFill>
+                      <a:prstDash val="solid"/>
+                      <a:round/>
+                      <a:headEnd type="none" w="med" len="med"/>
+                      <a:tailEnd type="none" w="med" len="med"/>
+                    </a:lnR>
+                    <a:lnT w="12700" cap="flat" cmpd="sng" algn="ctr">
+                      <a:solidFill>
+                        <a:schemeClr val="tx1"/>
+                      </a:solidFill>
+                      <a:prstDash val="solid"/>
+                      <a:round/>
+                      <a:headEnd type="none" w="med" len="med"/>
+                      <a:tailEnd type="none" w="med" len="med"/>
+                    </a:lnT>
+                    <a:lnB w="12700" cap="flat" cmpd="sng" algn="ctr">
+                      <a:solidFill>
+                        <a:schemeClr val="tx1"/>
+                      </a:solidFill>
+                      <a:prstDash val="solid"/>
+                      <a:round/>
+                      <a:headEnd type="none" w="med" len="med"/>
+                      <a:tailEnd type="none" w="med" len="med"/>
+                    </a:lnB>
+                  </a:tcPr>
+                </a:tc>
+                <a:tc>
+                  <a:txBody>
+                    <a:bodyPr/>
+                    <a:lstStyle/>
+                    <a:p>
+                      <a:pPr algn="ctr"/>
+                      <a:r>
+                        <a:rPr lang="en-US" sz="1600" dirty="0" smtClean="0"/>
+                        <a:t>5510 (45)</a:t>
+                      </a:r>
+                      <a:endParaRPr lang="en-US" sz="1600" dirty="0"/>
+                    </a:p>
+                  </a:txBody>
+                  <a:tcPr anchor="ctr">
+                    <a:lnL w="12700" cap="flat" cmpd="sng" algn="ctr">
+                      <a:solidFill>
+                        <a:schemeClr val="tx1"/>
+                      </a:solidFill>
+                      <a:prstDash val="solid"/>
+                      <a:round/>
+                      <a:headEnd type="none" w="med" len="med"/>
+                      <a:tailEnd type="none" w="med" len="med"/>
+                    </a:lnL>
+                    <a:lnR w="12700" cap="flat" cmpd="sng" algn="ctr">
+                      <a:solidFill>
+                        <a:schemeClr val="tx1"/>
+                      </a:solidFill>
+                      <a:prstDash val="solid"/>
+                      <a:round/>
+                      <a:headEnd type="none" w="med" len="med"/>
+                      <a:tailEnd type="none" w="med" len="med"/>
+                    </a:lnR>
+                    <a:lnT w="12700" cap="flat" cmpd="sng" algn="ctr">
+                      <a:solidFill>
+                        <a:schemeClr val="tx1"/>
+                      </a:solidFill>
+                      <a:prstDash val="solid"/>
+                      <a:round/>
+                      <a:headEnd type="none" w="med" len="med"/>
+                      <a:tailEnd type="none" w="med" len="med"/>
+                    </a:lnT>
+                    <a:lnB w="12700" cap="flat" cmpd="sng" algn="ctr">
+                      <a:solidFill>
+                        <a:schemeClr val="tx1"/>
+                      </a:solidFill>
+                      <a:prstDash val="solid"/>
+                      <a:round/>
+                      <a:headEnd type="none" w="med" len="med"/>
+                      <a:tailEnd type="none" w="med" len="med"/>
+                    </a:lnB>
+                  </a:tcPr>
+                </a:tc>
+                <a:tc>
+                  <a:txBody>
+                    <a:bodyPr/>
+                    <a:lstStyle/>
+                    <a:p>
+                      <a:pPr algn="ctr"/>
+                      <a:r>
+                        <a:rPr lang="en-US" sz="1600" dirty="0" smtClean="0"/>
+                        <a:t>6780 (52)</a:t>
+                      </a:r>
+                      <a:endParaRPr lang="en-US" sz="1600" dirty="0"/>
+                    </a:p>
+                  </a:txBody>
+                  <a:tcPr anchor="ctr">
+                    <a:lnL w="12700" cap="flat" cmpd="sng" algn="ctr">
+                      <a:solidFill>
+                        <a:schemeClr val="tx1"/>
+                      </a:solidFill>
+                      <a:prstDash val="solid"/>
+                      <a:round/>
+                      <a:headEnd type="none" w="med" len="med"/>
+                      <a:tailEnd type="none" w="med" len="med"/>
+                    </a:lnL>
+                    <a:lnR w="12700" cap="flat" cmpd="sng" algn="ctr">
+                      <a:solidFill>
+                        <a:schemeClr val="tx1"/>
+                      </a:solidFill>
+                      <a:prstDash val="solid"/>
+                      <a:round/>
+                      <a:headEnd type="none" w="med" len="med"/>
+                      <a:tailEnd type="none" w="med" len="med"/>
+                    </a:lnR>
+                    <a:lnT w="12700" cap="flat" cmpd="sng" algn="ctr">
+                      <a:solidFill>
+                        <a:schemeClr val="tx1"/>
+                      </a:solidFill>
+                      <a:prstDash val="solid"/>
+                      <a:round/>
+                      <a:headEnd type="none" w="med" len="med"/>
+                      <a:tailEnd type="none" w="med" len="med"/>
+                    </a:lnT>
+                    <a:lnB w="12700" cap="flat" cmpd="sng" algn="ctr">
+                      <a:solidFill>
+                        <a:schemeClr val="tx1"/>
+                      </a:solidFill>
+                      <a:prstDash val="solid"/>
+                      <a:round/>
+                      <a:headEnd type="none" w="med" len="med"/>
+                      <a:tailEnd type="none" w="med" len="med"/>
+                    </a:lnB>
+                  </a:tcPr>
+                </a:tc>
+                <a:extLst>
+                  <a:ext uri="{0D108BD9-81ED-4DB2-BD59-A6C34878D82A}">
+                    <a16:rowId xmlns:a16="http://schemas.microsoft.com/office/drawing/2014/main" val="1681956944"/>
+                  </a:ext>
+                </a:extLst>
+              </a:tr>
+            </a:tbl>
+          </a:graphicData>
+        </a:graphic>
+      </p:graphicFrame>
+    </p:spTree>
+    <p:extLst>
+      <p:ext uri="{BB962C8B-B14F-4D97-AF65-F5344CB8AC3E}">
+        <p14:creationId xmlns:p14="http://schemas.microsoft.com/office/powerpoint/2010/main" val="2698720002"/>
       </p:ext>
     </p:extLst>
   </p:cSld>

</xml_diff>

<commit_message>
Updated IndexSNP numbers in powerpoint
</commit_message>
<xml_diff>
--- a/eQTL_GWAS_riskSNPs/raggr_results_tables.pptx
+++ b/eQTL_GWAS_riskSNPs/raggr_results_tables.pptx
@@ -12,6 +12,7 @@
     <p:sldId id="347" r:id="rId6"/>
     <p:sldId id="349" r:id="rId7"/>
     <p:sldId id="348" r:id="rId8"/>
+    <p:sldId id="350" r:id="rId9"/>
   </p:sldIdLst>
   <p:sldSz cx="12192000" cy="6858000"/>
   <p:notesSz cx="6858000" cy="9144000"/>
@@ -355,7 +356,7 @@
           <a:p>
             <a:fld id="{E491DC8F-E103-4FD8-8B4A-5D7FAD71FEDE}" type="datetimeFigureOut">
               <a:rPr lang="en-US" smtClean="0"/>
-              <a:t>6/26/2018</a:t>
+              <a:t>9/5/2018</a:t>
             </a:fld>
             <a:endParaRPr lang="en-US"/>
           </a:p>
@@ -568,7 +569,7 @@
           <a:p>
             <a:fld id="{E491DC8F-E103-4FD8-8B4A-5D7FAD71FEDE}" type="datetimeFigureOut">
               <a:rPr lang="en-US" smtClean="0"/>
-              <a:t>6/26/2018</a:t>
+              <a:t>9/5/2018</a:t>
             </a:fld>
             <a:endParaRPr lang="en-US"/>
           </a:p>
@@ -824,7 +825,7 @@
           <a:p>
             <a:fld id="{E491DC8F-E103-4FD8-8B4A-5D7FAD71FEDE}" type="datetimeFigureOut">
               <a:rPr lang="en-US" smtClean="0"/>
-              <a:t>6/26/2018</a:t>
+              <a:t>9/5/2018</a:t>
             </a:fld>
             <a:endParaRPr lang="en-US"/>
           </a:p>
@@ -999,7 +1000,7 @@
           <a:p>
             <a:fld id="{E491DC8F-E103-4FD8-8B4A-5D7FAD71FEDE}" type="datetimeFigureOut">
               <a:rPr lang="en-US" smtClean="0"/>
-              <a:t>6/26/2018</a:t>
+              <a:t>9/5/2018</a:t>
             </a:fld>
             <a:endParaRPr lang="en-US"/>
           </a:p>
@@ -1334,7 +1335,7 @@
           <a:p>
             <a:fld id="{E491DC8F-E103-4FD8-8B4A-5D7FAD71FEDE}" type="datetimeFigureOut">
               <a:rPr lang="en-US" smtClean="0"/>
-              <a:t>6/26/2018</a:t>
+              <a:t>9/5/2018</a:t>
             </a:fld>
             <a:endParaRPr lang="en-US"/>
           </a:p>
@@ -1614,7 +1615,7 @@
           <a:p>
             <a:fld id="{E491DC8F-E103-4FD8-8B4A-5D7FAD71FEDE}" type="datetimeFigureOut">
               <a:rPr lang="en-US" smtClean="0"/>
-              <a:t>6/26/2018</a:t>
+              <a:t>9/5/2018</a:t>
             </a:fld>
             <a:endParaRPr lang="en-US"/>
           </a:p>
@@ -1993,7 +1994,7 @@
           <a:p>
             <a:fld id="{E491DC8F-E103-4FD8-8B4A-5D7FAD71FEDE}" type="datetimeFigureOut">
               <a:rPr lang="en-US" smtClean="0"/>
-              <a:t>6/26/2018</a:t>
+              <a:t>9/5/2018</a:t>
             </a:fld>
             <a:endParaRPr lang="en-US"/>
           </a:p>
@@ -2111,7 +2112,7 @@
           <a:p>
             <a:fld id="{E491DC8F-E103-4FD8-8B4A-5D7FAD71FEDE}" type="datetimeFigureOut">
               <a:rPr lang="en-US" smtClean="0"/>
-              <a:t>6/26/2018</a:t>
+              <a:t>9/5/2018</a:t>
             </a:fld>
             <a:endParaRPr lang="en-US"/>
           </a:p>
@@ -2282,7 +2283,7 @@
           <a:p>
             <a:fld id="{E491DC8F-E103-4FD8-8B4A-5D7FAD71FEDE}" type="datetimeFigureOut">
               <a:rPr lang="en-US" smtClean="0"/>
-              <a:t>6/26/2018</a:t>
+              <a:t>9/5/2018</a:t>
             </a:fld>
             <a:endParaRPr lang="en-US"/>
           </a:p>
@@ -2636,7 +2637,7 @@
           <a:p>
             <a:fld id="{E491DC8F-E103-4FD8-8B4A-5D7FAD71FEDE}" type="datetimeFigureOut">
               <a:rPr lang="en-US" smtClean="0"/>
-              <a:t>6/26/2018</a:t>
+              <a:t>9/5/2018</a:t>
             </a:fld>
             <a:endParaRPr lang="en-US"/>
           </a:p>
@@ -3013,7 +3014,7 @@
           <a:p>
             <a:fld id="{E491DC8F-E103-4FD8-8B4A-5D7FAD71FEDE}" type="datetimeFigureOut">
               <a:rPr lang="en-US" smtClean="0"/>
-              <a:t>6/26/2018</a:t>
+              <a:t>9/5/2018</a:t>
             </a:fld>
             <a:endParaRPr lang="en-US"/>
           </a:p>
@@ -3305,7 +3306,7 @@
           <a:p>
             <a:fld id="{E491DC8F-E103-4FD8-8B4A-5D7FAD71FEDE}" type="datetimeFigureOut">
               <a:rPr lang="en-US" smtClean="0"/>
-              <a:t>6/26/2018</a:t>
+              <a:t>9/5/2018</a:t>
             </a:fld>
             <a:endParaRPr lang="en-US"/>
           </a:p>
@@ -8102,7 +8103,7 @@
           <p:nvPr>
             <p:extLst>
               <p:ext uri="{D42A27DB-BD31-4B8C-83A1-F6EECF244321}">
-                <p14:modId xmlns:p14="http://schemas.microsoft.com/office/powerpoint/2010/main" val="3130385695"/>
+                <p14:modId xmlns:p14="http://schemas.microsoft.com/office/powerpoint/2010/main" val="1481205532"/>
               </p:ext>
             </p:extLst>
           </p:nvPr>
@@ -8363,7 +8364,11 @@
                       <a:pPr algn="ctr"/>
                       <a:r>
                         <a:rPr lang="en-US" sz="1600" dirty="0" smtClean="0"/>
-                        <a:t>5510 (45)</a:t>
+                        <a:t>5510 </a:t>
+                      </a:r>
+                      <a:r>
+                        <a:rPr lang="en-US" sz="1600" dirty="0" smtClean="0"/>
+                        <a:t>(103)</a:t>
                       </a:r>
                       <a:endParaRPr lang="en-US" sz="1600" dirty="0"/>
                     </a:p>
@@ -8415,7 +8420,11 @@
                       <a:pPr algn="ctr"/>
                       <a:r>
                         <a:rPr lang="en-US" sz="1600" dirty="0" smtClean="0"/>
-                        <a:t>6780 (52)</a:t>
+                        <a:t>6780 </a:t>
+                      </a:r>
+                      <a:r>
+                        <a:rPr lang="en-US" sz="1600" dirty="0" smtClean="0"/>
+                        <a:t>(116)</a:t>
                       </a:r>
                       <a:endParaRPr lang="en-US" sz="1600" dirty="0"/>
                     </a:p>
@@ -9573,13 +9582,8 @@
                       </a:pPr>
                       <a:r>
                         <a:rPr lang="en-US" sz="1600" dirty="0" smtClean="0"/>
-                        <a:t>66,923 </a:t>
-                      </a:r>
-                      <a:r>
-                        <a:rPr lang="en-US" sz="1600" dirty="0" smtClean="0"/>
-                        <a:t>(334)</a:t>
-                      </a:r>
-                      <a:endParaRPr lang="en-US" sz="1600" dirty="0" smtClean="0"/>
+                        <a:t>66,923 (334)</a:t>
+                      </a:r>
                     </a:p>
                   </a:txBody>
                   <a:tcPr anchor="ctr">
@@ -9631,11 +9635,7 @@
                       <a:pPr algn="ctr"/>
                       <a:r>
                         <a:rPr lang="en-US" sz="1600" dirty="0" smtClean="0"/>
-                        <a:t>106,438 </a:t>
-                      </a:r>
-                      <a:r>
-                        <a:rPr lang="en-US" sz="1600" dirty="0" smtClean="0"/>
-                        <a:t>(412)</a:t>
+                        <a:t>106,438 (412)</a:t>
                       </a:r>
                       <a:endParaRPr lang="en-US" sz="1600" dirty="0"/>
                     </a:p>
@@ -10486,6 +10486,35 @@
           <a:chExt cx="0" cy="0"/>
         </a:xfrm>
       </p:grpSpPr>
+      <p:pic>
+        <p:nvPicPr>
+          <p:cNvPr id="3" name="Picture 2"/>
+          <p:cNvPicPr>
+            <a:picLocks noChangeAspect="1"/>
+          </p:cNvPicPr>
+          <p:nvPr/>
+        </p:nvPicPr>
+        <p:blipFill rotWithShape="1">
+          <a:blip r:embed="rId2" cstate="print">
+            <a:extLst>
+              <a:ext uri="{28A0092B-C50C-407E-A947-70E740481C1C}">
+                <a14:useLocalDpi xmlns:a14="http://schemas.microsoft.com/office/drawing/2010/main" val="0"/>
+              </a:ext>
+            </a:extLst>
+          </a:blip>
+          <a:srcRect l="2854" t="113" r="3115" b="16553"/>
+          <a:stretch/>
+        </p:blipFill>
+        <p:spPr>
+          <a:xfrm>
+            <a:off x="8513806" y="3639211"/>
+            <a:ext cx="3367216" cy="2984123"/>
+          </a:xfrm>
+          <a:prstGeom prst="rect">
+            <a:avLst/>
+          </a:prstGeom>
+        </p:spPr>
+      </p:pic>
       <p:sp>
         <p:nvSpPr>
           <p:cNvPr id="2" name="Title 1">
@@ -10552,35 +10581,6 @@
       </p:sp>
       <p:pic>
         <p:nvPicPr>
-          <p:cNvPr id="4" name="Picture 3"/>
-          <p:cNvPicPr>
-            <a:picLocks noChangeAspect="1"/>
-          </p:cNvPicPr>
-          <p:nvPr/>
-        </p:nvPicPr>
-        <p:blipFill rotWithShape="1">
-          <a:blip r:embed="rId2" cstate="print">
-            <a:extLst>
-              <a:ext uri="{28A0092B-C50C-407E-A947-70E740481C1C}">
-                <a14:useLocalDpi xmlns:a14="http://schemas.microsoft.com/office/drawing/2010/main" val="0"/>
-              </a:ext>
-            </a:extLst>
-          </a:blip>
-          <a:srcRect b="12328"/>
-          <a:stretch/>
-        </p:blipFill>
-        <p:spPr>
-          <a:xfrm>
-            <a:off x="8133672" y="3258139"/>
-            <a:ext cx="3782746" cy="3316397"/>
-          </a:xfrm>
-          <a:prstGeom prst="rect">
-            <a:avLst/>
-          </a:prstGeom>
-        </p:spPr>
-      </p:pic>
-      <p:pic>
-        <p:nvPicPr>
           <p:cNvPr id="5" name="Picture 4"/>
           <p:cNvPicPr>
             <a:picLocks noChangeAspect="1"/>
@@ -10617,7 +10617,7 @@
           <p:nvPr>
             <p:extLst>
               <p:ext uri="{D42A27DB-BD31-4B8C-83A1-F6EECF244321}">
-                <p14:modId xmlns:p14="http://schemas.microsoft.com/office/powerpoint/2010/main" val="3269112058"/>
+                <p14:modId xmlns:p14="http://schemas.microsoft.com/office/powerpoint/2010/main" val="1409659208"/>
               </p:ext>
             </p:extLst>
           </p:nvPr>
@@ -10878,7 +10878,11 @@
                       <a:pPr algn="ctr"/>
                       <a:r>
                         <a:rPr lang="en-US" sz="1600" dirty="0" smtClean="0"/>
-                        <a:t>5510 (45)</a:t>
+                        <a:t>5510 </a:t>
+                      </a:r>
+                      <a:r>
+                        <a:rPr lang="en-US" sz="1600" dirty="0" smtClean="0"/>
+                        <a:t>(103)</a:t>
                       </a:r>
                       <a:endParaRPr lang="en-US" sz="1600" dirty="0"/>
                     </a:p>
@@ -10930,7 +10934,11 @@
                       <a:pPr algn="ctr"/>
                       <a:r>
                         <a:rPr lang="en-US" sz="1600" dirty="0" smtClean="0"/>
-                        <a:t>6780 (52)</a:t>
+                        <a:t>6780 </a:t>
+                      </a:r>
+                      <a:r>
+                        <a:rPr lang="en-US" sz="1600" dirty="0" smtClean="0"/>
+                        <a:t>(116)</a:t>
                       </a:r>
                       <a:endParaRPr lang="en-US" sz="1600" dirty="0"/>
                     </a:p>
@@ -11047,6 +11055,44 @@
               <a:t>index SNPs: </a:t>
             </a:r>
             <a:endParaRPr lang="en-US" dirty="0"/>
+          </a:p>
+        </p:txBody>
+      </p:sp>
+      <p:sp>
+        <p:nvSpPr>
+          <p:cNvPr id="9" name="TextBox 8"/>
+          <p:cNvSpPr txBox="1"/>
+          <p:nvPr/>
+        </p:nvSpPr>
+        <p:spPr>
+          <a:xfrm>
+            <a:off x="7259594" y="3823877"/>
+            <a:ext cx="1427205" cy="369332"/>
+          </a:xfrm>
+          <a:prstGeom prst="rect">
+            <a:avLst/>
+          </a:prstGeom>
+          <a:noFill/>
+        </p:spPr>
+        <p:txBody>
+          <a:bodyPr wrap="square" rtlCol="0">
+            <a:spAutoFit/>
+          </a:bodyPr>
+          <a:lstStyle/>
+          <a:p>
+            <a:r>
+              <a:rPr lang="en-US" dirty="0" smtClean="0">
+                <a:solidFill>
+                  <a:srgbClr val="C00000"/>
+                </a:solidFill>
+              </a:rPr>
+              <a:t>Updated 9/5:</a:t>
+            </a:r>
+            <a:endParaRPr lang="en-US" dirty="0">
+              <a:solidFill>
+                <a:srgbClr val="C00000"/>
+              </a:solidFill>
+            </a:endParaRPr>
           </a:p>
         </p:txBody>
       </p:sp>
@@ -11159,7 +11205,7 @@
           <p:nvPr>
             <p:extLst>
               <p:ext uri="{D42A27DB-BD31-4B8C-83A1-F6EECF244321}">
-                <p14:modId xmlns:p14="http://schemas.microsoft.com/office/powerpoint/2010/main" val="2895277277"/>
+                <p14:modId xmlns:p14="http://schemas.microsoft.com/office/powerpoint/2010/main" val="1022215123"/>
               </p:ext>
             </p:extLst>
           </p:nvPr>
@@ -11420,7 +11466,11 @@
                       <a:pPr algn="ctr"/>
                       <a:r>
                         <a:rPr lang="en-US" sz="1600" dirty="0" smtClean="0"/>
-                        <a:t>5510 (45)</a:t>
+                        <a:t>5510 </a:t>
+                      </a:r>
+                      <a:r>
+                        <a:rPr lang="en-US" sz="1600" dirty="0" smtClean="0"/>
+                        <a:t>(103)</a:t>
                       </a:r>
                       <a:endParaRPr lang="en-US" sz="1600" dirty="0"/>
                     </a:p>
@@ -11472,7 +11522,11 @@
                       <a:pPr algn="ctr"/>
                       <a:r>
                         <a:rPr lang="en-US" sz="1600" dirty="0" smtClean="0"/>
-                        <a:t>6780 (52)</a:t>
+                        <a:t>6780 </a:t>
+                      </a:r>
+                      <a:r>
+                        <a:rPr lang="en-US" sz="1600" dirty="0" smtClean="0"/>
+                        <a:t>(116)</a:t>
                       </a:r>
                       <a:endParaRPr lang="en-US" sz="1600" dirty="0"/>
                     </a:p>
@@ -14925,7 +14979,7 @@
           <p:nvPr>
             <p:extLst>
               <p:ext uri="{D42A27DB-BD31-4B8C-83A1-F6EECF244321}">
-                <p14:modId xmlns:p14="http://schemas.microsoft.com/office/powerpoint/2010/main" val="1531797971"/>
+                <p14:modId xmlns:p14="http://schemas.microsoft.com/office/powerpoint/2010/main" val="4220634214"/>
               </p:ext>
             </p:extLst>
           </p:nvPr>
@@ -15186,7 +15240,11 @@
                       <a:pPr algn="ctr"/>
                       <a:r>
                         <a:rPr lang="en-US" sz="1600" dirty="0" smtClean="0"/>
-                        <a:t>5510 (45)</a:t>
+                        <a:t>5510 </a:t>
+                      </a:r>
+                      <a:r>
+                        <a:rPr lang="en-US" sz="1600" dirty="0" smtClean="0"/>
+                        <a:t>(103)</a:t>
                       </a:r>
                       <a:endParaRPr lang="en-US" sz="1600" dirty="0"/>
                     </a:p>
@@ -15238,7 +15296,11 @@
                       <a:pPr algn="ctr"/>
                       <a:r>
                         <a:rPr lang="en-US" sz="1600" dirty="0" smtClean="0"/>
-                        <a:t>6780 (52)</a:t>
+                        <a:t>6780 </a:t>
+                      </a:r>
+                      <a:r>
+                        <a:rPr lang="en-US" sz="1600" dirty="0" smtClean="0"/>
+                        <a:t>(116)</a:t>
                       </a:r>
                       <a:endParaRPr lang="en-US" sz="1600" dirty="0"/>
                     </a:p>
@@ -15296,6 +15358,3705 @@
     <p:extLst>
       <p:ext uri="{BB962C8B-B14F-4D97-AF65-F5344CB8AC3E}">
         <p14:creationId xmlns:p14="http://schemas.microsoft.com/office/powerpoint/2010/main" val="2698720002"/>
+      </p:ext>
+    </p:extLst>
+  </p:cSld>
+  <p:clrMapOvr>
+    <a:masterClrMapping/>
+  </p:clrMapOvr>
+</p:sld>
+</file>
+
+<file path=ppt/slides/slide8.xml><?xml version="1.0" encoding="utf-8"?>
+<p:sld xmlns:a="http://schemas.openxmlformats.org/drawingml/2006/main" xmlns:r="http://schemas.openxmlformats.org/officeDocument/2006/relationships" xmlns:p="http://schemas.openxmlformats.org/presentationml/2006/main">
+  <p:cSld>
+    <p:spTree>
+      <p:nvGrpSpPr>
+        <p:cNvPr id="1" name=""/>
+        <p:cNvGrpSpPr/>
+        <p:nvPr/>
+      </p:nvGrpSpPr>
+      <p:grpSpPr>
+        <a:xfrm>
+          <a:off x="0" y="0"/>
+          <a:ext cx="0" cy="0"/>
+          <a:chOff x="0" y="0"/>
+          <a:chExt cx="0" cy="0"/>
+        </a:xfrm>
+      </p:grpSpPr>
+      <p:sp>
+        <p:nvSpPr>
+          <p:cNvPr id="2" name="Title 1">
+            <a:extLst>
+              <a:ext uri="{FF2B5EF4-FFF2-40B4-BE49-F238E27FC236}">
+                <a16:creationId xmlns:a16="http://schemas.microsoft.com/office/drawing/2014/main" id="{5CFE0278-5FE9-4F97-9C97-2D0BFFE62AE7}"/>
+              </a:ext>
+            </a:extLst>
+          </p:cNvPr>
+          <p:cNvSpPr>
+            <a:spLocks noGrp="1"/>
+          </p:cNvSpPr>
+          <p:nvPr>
+            <p:ph type="title"/>
+          </p:nvPr>
+        </p:nvSpPr>
+        <p:spPr>
+          <a:xfrm>
+            <a:off x="734781" y="407530"/>
+            <a:ext cx="10058400" cy="839291"/>
+          </a:xfrm>
+        </p:spPr>
+        <p:txBody>
+          <a:bodyPr/>
+          <a:lstStyle/>
+          <a:p>
+            <a:r>
+              <a:rPr lang="en-US" dirty="0">
+                <a:latin typeface="+mn-lt"/>
+              </a:rPr>
+              <a:t>Overall </a:t>
+            </a:r>
+            <a:r>
+              <a:rPr lang="en-US" dirty="0" err="1">
+                <a:latin typeface="+mn-lt"/>
+              </a:rPr>
+              <a:t>eQTLs</a:t>
+            </a:r>
+            <a:r>
+              <a:rPr lang="en-US" dirty="0">
+                <a:latin typeface="+mn-lt"/>
+              </a:rPr>
+              <a:t> at </a:t>
+            </a:r>
+            <a:r>
+              <a:rPr lang="en-US" dirty="0" smtClean="0">
+                <a:latin typeface="+mn-lt"/>
+              </a:rPr>
+              <a:t>FDR &lt; 1% </a:t>
+            </a:r>
+            <a:r>
+              <a:rPr lang="en-US" dirty="0"/>
+              <a:t>- </a:t>
+            </a:r>
+            <a:r>
+              <a:rPr lang="en-US" dirty="0" err="1"/>
+              <a:t>rAggr</a:t>
+            </a:r>
+            <a:endParaRPr lang="en-US" dirty="0">
+              <a:latin typeface="+mn-lt"/>
+            </a:endParaRPr>
+          </a:p>
+        </p:txBody>
+      </p:sp>
+      <p:graphicFrame>
+        <p:nvGraphicFramePr>
+          <p:cNvPr id="3" name="Table 2"/>
+          <p:cNvGraphicFramePr>
+            <a:graphicFrameLocks noGrp="1"/>
+          </p:cNvGraphicFramePr>
+          <p:nvPr>
+            <p:extLst>
+              <p:ext uri="{D42A27DB-BD31-4B8C-83A1-F6EECF244321}">
+                <p14:modId xmlns:p14="http://schemas.microsoft.com/office/powerpoint/2010/main" val="1464596246"/>
+              </p:ext>
+            </p:extLst>
+          </p:nvPr>
+        </p:nvGraphicFramePr>
+        <p:xfrm>
+          <a:off x="182878" y="3673178"/>
+          <a:ext cx="11790827" cy="1959528"/>
+        </p:xfrm>
+        <a:graphic>
+          <a:graphicData uri="http://schemas.openxmlformats.org/drawingml/2006/table">
+            <a:tbl>
+              <a:tblPr firstCol="1" bandRow="1">
+                <a:tableStyleId>{073A0DAA-6AF3-43AB-8588-CEC1D06C72B9}</a:tableStyleId>
+              </a:tblPr>
+              <a:tblGrid>
+                <a:gridCol w="734603">
+                  <a:extLst>
+                    <a:ext uri="{9D8B030D-6E8A-4147-A177-3AD203B41FA5}">
+                      <a16:colId xmlns:a16="http://schemas.microsoft.com/office/drawing/2014/main" val="321783189"/>
+                    </a:ext>
+                  </a:extLst>
+                </a:gridCol>
+                <a:gridCol w="419417">
+                  <a:extLst>
+                    <a:ext uri="{9D8B030D-6E8A-4147-A177-3AD203B41FA5}">
+                      <a16:colId xmlns:a16="http://schemas.microsoft.com/office/drawing/2014/main" val="983072481"/>
+                    </a:ext>
+                  </a:extLst>
+                </a:gridCol>
+                <a:gridCol w="419417">
+                  <a:extLst>
+                    <a:ext uri="{9D8B030D-6E8A-4147-A177-3AD203B41FA5}">
+                      <a16:colId xmlns:a16="http://schemas.microsoft.com/office/drawing/2014/main" val="1542481117"/>
+                    </a:ext>
+                  </a:extLst>
+                </a:gridCol>
+                <a:gridCol w="419417">
+                  <a:extLst>
+                    <a:ext uri="{9D8B030D-6E8A-4147-A177-3AD203B41FA5}">
+                      <a16:colId xmlns:a16="http://schemas.microsoft.com/office/drawing/2014/main" val="47893457"/>
+                    </a:ext>
+                  </a:extLst>
+                </a:gridCol>
+                <a:gridCol w="419417">
+                  <a:extLst>
+                    <a:ext uri="{9D8B030D-6E8A-4147-A177-3AD203B41FA5}">
+                      <a16:colId xmlns:a16="http://schemas.microsoft.com/office/drawing/2014/main" val="2212632435"/>
+                    </a:ext>
+                  </a:extLst>
+                </a:gridCol>
+                <a:gridCol w="419417">
+                  <a:extLst>
+                    <a:ext uri="{9D8B030D-6E8A-4147-A177-3AD203B41FA5}">
+                      <a16:colId xmlns:a16="http://schemas.microsoft.com/office/drawing/2014/main" val="3242244007"/>
+                    </a:ext>
+                  </a:extLst>
+                </a:gridCol>
+                <a:gridCol w="419417">
+                  <a:extLst>
+                    <a:ext uri="{9D8B030D-6E8A-4147-A177-3AD203B41FA5}">
+                      <a16:colId xmlns:a16="http://schemas.microsoft.com/office/drawing/2014/main" val="373322989"/>
+                    </a:ext>
+                  </a:extLst>
+                </a:gridCol>
+                <a:gridCol w="419417">
+                  <a:extLst>
+                    <a:ext uri="{9D8B030D-6E8A-4147-A177-3AD203B41FA5}">
+                      <a16:colId xmlns:a16="http://schemas.microsoft.com/office/drawing/2014/main" val="2004755825"/>
+                    </a:ext>
+                  </a:extLst>
+                </a:gridCol>
+                <a:gridCol w="419417">
+                  <a:extLst>
+                    <a:ext uri="{9D8B030D-6E8A-4147-A177-3AD203B41FA5}">
+                      <a16:colId xmlns:a16="http://schemas.microsoft.com/office/drawing/2014/main" val="3632885095"/>
+                    </a:ext>
+                  </a:extLst>
+                </a:gridCol>
+                <a:gridCol w="419417">
+                  <a:extLst>
+                    <a:ext uri="{9D8B030D-6E8A-4147-A177-3AD203B41FA5}">
+                      <a16:colId xmlns:a16="http://schemas.microsoft.com/office/drawing/2014/main" val="3440648747"/>
+                    </a:ext>
+                  </a:extLst>
+                </a:gridCol>
+                <a:gridCol w="419417">
+                  <a:extLst>
+                    <a:ext uri="{9D8B030D-6E8A-4147-A177-3AD203B41FA5}">
+                      <a16:colId xmlns:a16="http://schemas.microsoft.com/office/drawing/2014/main" val="194009094"/>
+                    </a:ext>
+                  </a:extLst>
+                </a:gridCol>
+                <a:gridCol w="419417">
+                  <a:extLst>
+                    <a:ext uri="{9D8B030D-6E8A-4147-A177-3AD203B41FA5}">
+                      <a16:colId xmlns:a16="http://schemas.microsoft.com/office/drawing/2014/main" val="1813486093"/>
+                    </a:ext>
+                  </a:extLst>
+                </a:gridCol>
+                <a:gridCol w="419417">
+                  <a:extLst>
+                    <a:ext uri="{9D8B030D-6E8A-4147-A177-3AD203B41FA5}">
+                      <a16:colId xmlns:a16="http://schemas.microsoft.com/office/drawing/2014/main" val="81180624"/>
+                    </a:ext>
+                  </a:extLst>
+                </a:gridCol>
+                <a:gridCol w="419417">
+                  <a:extLst>
+                    <a:ext uri="{9D8B030D-6E8A-4147-A177-3AD203B41FA5}">
+                      <a16:colId xmlns:a16="http://schemas.microsoft.com/office/drawing/2014/main" val="674025747"/>
+                    </a:ext>
+                  </a:extLst>
+                </a:gridCol>
+                <a:gridCol w="419417">
+                  <a:extLst>
+                    <a:ext uri="{9D8B030D-6E8A-4147-A177-3AD203B41FA5}">
+                      <a16:colId xmlns:a16="http://schemas.microsoft.com/office/drawing/2014/main" val="983902903"/>
+                    </a:ext>
+                  </a:extLst>
+                </a:gridCol>
+                <a:gridCol w="419417">
+                  <a:extLst>
+                    <a:ext uri="{9D8B030D-6E8A-4147-A177-3AD203B41FA5}">
+                      <a16:colId xmlns:a16="http://schemas.microsoft.com/office/drawing/2014/main" val="2464655292"/>
+                    </a:ext>
+                  </a:extLst>
+                </a:gridCol>
+                <a:gridCol w="419417">
+                  <a:extLst>
+                    <a:ext uri="{9D8B030D-6E8A-4147-A177-3AD203B41FA5}">
+                      <a16:colId xmlns:a16="http://schemas.microsoft.com/office/drawing/2014/main" val="3388589090"/>
+                    </a:ext>
+                  </a:extLst>
+                </a:gridCol>
+                <a:gridCol w="419417">
+                  <a:extLst>
+                    <a:ext uri="{9D8B030D-6E8A-4147-A177-3AD203B41FA5}">
+                      <a16:colId xmlns:a16="http://schemas.microsoft.com/office/drawing/2014/main" val="672264503"/>
+                    </a:ext>
+                  </a:extLst>
+                </a:gridCol>
+                <a:gridCol w="419417">
+                  <a:extLst>
+                    <a:ext uri="{9D8B030D-6E8A-4147-A177-3AD203B41FA5}">
+                      <a16:colId xmlns:a16="http://schemas.microsoft.com/office/drawing/2014/main" val="2903210534"/>
+                    </a:ext>
+                  </a:extLst>
+                </a:gridCol>
+                <a:gridCol w="419417">
+                  <a:extLst>
+                    <a:ext uri="{9D8B030D-6E8A-4147-A177-3AD203B41FA5}">
+                      <a16:colId xmlns:a16="http://schemas.microsoft.com/office/drawing/2014/main" val="3914328701"/>
+                    </a:ext>
+                  </a:extLst>
+                </a:gridCol>
+                <a:gridCol w="419417">
+                  <a:extLst>
+                    <a:ext uri="{9D8B030D-6E8A-4147-A177-3AD203B41FA5}">
+                      <a16:colId xmlns:a16="http://schemas.microsoft.com/office/drawing/2014/main" val="1395181067"/>
+                    </a:ext>
+                  </a:extLst>
+                </a:gridCol>
+                <a:gridCol w="419417">
+                  <a:extLst>
+                    <a:ext uri="{9D8B030D-6E8A-4147-A177-3AD203B41FA5}">
+                      <a16:colId xmlns:a16="http://schemas.microsoft.com/office/drawing/2014/main" val="49607373"/>
+                    </a:ext>
+                  </a:extLst>
+                </a:gridCol>
+                <a:gridCol w="419417">
+                  <a:extLst>
+                    <a:ext uri="{9D8B030D-6E8A-4147-A177-3AD203B41FA5}">
+                      <a16:colId xmlns:a16="http://schemas.microsoft.com/office/drawing/2014/main" val="2766919843"/>
+                    </a:ext>
+                  </a:extLst>
+                </a:gridCol>
+                <a:gridCol w="419417">
+                  <a:extLst>
+                    <a:ext uri="{9D8B030D-6E8A-4147-A177-3AD203B41FA5}">
+                      <a16:colId xmlns:a16="http://schemas.microsoft.com/office/drawing/2014/main" val="3360177626"/>
+                    </a:ext>
+                  </a:extLst>
+                </a:gridCol>
+                <a:gridCol w="419417">
+                  <a:extLst>
+                    <a:ext uri="{9D8B030D-6E8A-4147-A177-3AD203B41FA5}">
+                      <a16:colId xmlns:a16="http://schemas.microsoft.com/office/drawing/2014/main" val="2323266073"/>
+                    </a:ext>
+                  </a:extLst>
+                </a:gridCol>
+                <a:gridCol w="419417">
+                  <a:extLst>
+                    <a:ext uri="{9D8B030D-6E8A-4147-A177-3AD203B41FA5}">
+                      <a16:colId xmlns:a16="http://schemas.microsoft.com/office/drawing/2014/main" val="1672443541"/>
+                    </a:ext>
+                  </a:extLst>
+                </a:gridCol>
+                <a:gridCol w="570799">
+                  <a:extLst>
+                    <a:ext uri="{9D8B030D-6E8A-4147-A177-3AD203B41FA5}">
+                      <a16:colId xmlns:a16="http://schemas.microsoft.com/office/drawing/2014/main" val="2653118477"/>
+                    </a:ext>
+                  </a:extLst>
+                </a:gridCol>
+              </a:tblGrid>
+              <a:tr h="489882">
+                <a:tc rowSpan="2">
+                  <a:txBody>
+                    <a:bodyPr/>
+                    <a:lstStyle/>
+                    <a:p>
+                      <a:pPr algn="ctr"/>
+                      <a:r>
+                        <a:rPr lang="en-US" sz="1400" dirty="0" smtClean="0"/>
+                        <a:t>Hippo</a:t>
+                      </a:r>
+                      <a:endParaRPr lang="en-US" sz="1400" dirty="0"/>
+                    </a:p>
+                  </a:txBody>
+                  <a:tcPr anchor="ctr">
+                    <a:lnL w="12700" cap="flat" cmpd="sng" algn="ctr">
+                      <a:solidFill>
+                        <a:schemeClr val="tx1"/>
+                      </a:solidFill>
+                      <a:prstDash val="solid"/>
+                      <a:round/>
+                      <a:headEnd type="none" w="med" len="med"/>
+                      <a:tailEnd type="none" w="med" len="med"/>
+                    </a:lnL>
+                    <a:lnT w="12700" cap="flat" cmpd="sng" algn="ctr">
+                      <a:solidFill>
+                        <a:schemeClr val="tx1"/>
+                      </a:solidFill>
+                      <a:prstDash val="solid"/>
+                      <a:round/>
+                      <a:headEnd type="none" w="med" len="med"/>
+                      <a:tailEnd type="none" w="med" len="med"/>
+                    </a:lnT>
+                    <a:lnB w="12700" cap="flat" cmpd="sng" algn="ctr">
+                      <a:solidFill>
+                        <a:schemeClr val="tx1"/>
+                      </a:solidFill>
+                      <a:prstDash val="solid"/>
+                      <a:round/>
+                      <a:headEnd type="none" w="med" len="med"/>
+                      <a:tailEnd type="none" w="med" len="med"/>
+                    </a:lnB>
+                  </a:tcPr>
+                </a:tc>
+                <a:tc>
+                  <a:txBody>
+                    <a:bodyPr/>
+                    <a:lstStyle/>
+                    <a:p>
+                      <a:pPr algn="ctr"/>
+                      <a:r>
+                        <a:rPr lang="en-US" sz="1400" dirty="0" smtClean="0"/>
+                        <a:t>1</a:t>
+                      </a:r>
+                      <a:endParaRPr lang="en-US" sz="1400" dirty="0"/>
+                    </a:p>
+                  </a:txBody>
+                  <a:tcPr anchor="ctr">
+                    <a:lnT w="12700" cap="flat" cmpd="sng" algn="ctr">
+                      <a:solidFill>
+                        <a:schemeClr val="tx1"/>
+                      </a:solidFill>
+                      <a:prstDash val="solid"/>
+                      <a:round/>
+                      <a:headEnd type="none" w="med" len="med"/>
+                      <a:tailEnd type="none" w="med" len="med"/>
+                    </a:lnT>
+                  </a:tcPr>
+                </a:tc>
+                <a:tc>
+                  <a:txBody>
+                    <a:bodyPr/>
+                    <a:lstStyle/>
+                    <a:p>
+                      <a:pPr algn="ctr"/>
+                      <a:r>
+                        <a:rPr lang="en-US" sz="1400" dirty="0" smtClean="0"/>
+                        <a:t>2</a:t>
+                      </a:r>
+                      <a:endParaRPr lang="en-US" sz="1400" dirty="0"/>
+                    </a:p>
+                  </a:txBody>
+                  <a:tcPr anchor="ctr">
+                    <a:lnT w="12700" cap="flat" cmpd="sng" algn="ctr">
+                      <a:solidFill>
+                        <a:schemeClr val="tx1"/>
+                      </a:solidFill>
+                      <a:prstDash val="solid"/>
+                      <a:round/>
+                      <a:headEnd type="none" w="med" len="med"/>
+                      <a:tailEnd type="none" w="med" len="med"/>
+                    </a:lnT>
+                  </a:tcPr>
+                </a:tc>
+                <a:tc>
+                  <a:txBody>
+                    <a:bodyPr/>
+                    <a:lstStyle/>
+                    <a:p>
+                      <a:pPr algn="ctr"/>
+                      <a:r>
+                        <a:rPr lang="en-US" sz="1400" dirty="0" smtClean="0"/>
+                        <a:t>3</a:t>
+                      </a:r>
+                      <a:endParaRPr lang="en-US" sz="1400" dirty="0"/>
+                    </a:p>
+                  </a:txBody>
+                  <a:tcPr anchor="ctr">
+                    <a:lnT w="12700" cap="flat" cmpd="sng" algn="ctr">
+                      <a:solidFill>
+                        <a:schemeClr val="tx1"/>
+                      </a:solidFill>
+                      <a:prstDash val="solid"/>
+                      <a:round/>
+                      <a:headEnd type="none" w="med" len="med"/>
+                      <a:tailEnd type="none" w="med" len="med"/>
+                    </a:lnT>
+                  </a:tcPr>
+                </a:tc>
+                <a:tc>
+                  <a:txBody>
+                    <a:bodyPr/>
+                    <a:lstStyle/>
+                    <a:p>
+                      <a:pPr algn="ctr"/>
+                      <a:r>
+                        <a:rPr lang="en-US" sz="1400" dirty="0" smtClean="0"/>
+                        <a:t>4</a:t>
+                      </a:r>
+                      <a:endParaRPr lang="en-US" sz="1400" dirty="0"/>
+                    </a:p>
+                  </a:txBody>
+                  <a:tcPr anchor="ctr">
+                    <a:lnT w="12700" cap="flat" cmpd="sng" algn="ctr">
+                      <a:solidFill>
+                        <a:schemeClr val="tx1"/>
+                      </a:solidFill>
+                      <a:prstDash val="solid"/>
+                      <a:round/>
+                      <a:headEnd type="none" w="med" len="med"/>
+                      <a:tailEnd type="none" w="med" len="med"/>
+                    </a:lnT>
+                  </a:tcPr>
+                </a:tc>
+                <a:tc>
+                  <a:txBody>
+                    <a:bodyPr/>
+                    <a:lstStyle/>
+                    <a:p>
+                      <a:pPr algn="ctr"/>
+                      <a:r>
+                        <a:rPr lang="en-US" sz="1400" dirty="0" smtClean="0"/>
+                        <a:t>5</a:t>
+                      </a:r>
+                      <a:endParaRPr lang="en-US" sz="1400" dirty="0"/>
+                    </a:p>
+                  </a:txBody>
+                  <a:tcPr anchor="ctr">
+                    <a:lnT w="12700" cap="flat" cmpd="sng" algn="ctr">
+                      <a:solidFill>
+                        <a:schemeClr val="tx1"/>
+                      </a:solidFill>
+                      <a:prstDash val="solid"/>
+                      <a:round/>
+                      <a:headEnd type="none" w="med" len="med"/>
+                      <a:tailEnd type="none" w="med" len="med"/>
+                    </a:lnT>
+                  </a:tcPr>
+                </a:tc>
+                <a:tc>
+                  <a:txBody>
+                    <a:bodyPr/>
+                    <a:lstStyle/>
+                    <a:p>
+                      <a:pPr algn="ctr"/>
+                      <a:r>
+                        <a:rPr lang="en-US" sz="1400" dirty="0" smtClean="0"/>
+                        <a:t>6</a:t>
+                      </a:r>
+                      <a:endParaRPr lang="en-US" sz="1400" dirty="0"/>
+                    </a:p>
+                  </a:txBody>
+                  <a:tcPr anchor="ctr">
+                    <a:lnT w="12700" cap="flat" cmpd="sng" algn="ctr">
+                      <a:solidFill>
+                        <a:schemeClr val="tx1"/>
+                      </a:solidFill>
+                      <a:prstDash val="solid"/>
+                      <a:round/>
+                      <a:headEnd type="none" w="med" len="med"/>
+                      <a:tailEnd type="none" w="med" len="med"/>
+                    </a:lnT>
+                  </a:tcPr>
+                </a:tc>
+                <a:tc>
+                  <a:txBody>
+                    <a:bodyPr/>
+                    <a:lstStyle/>
+                    <a:p>
+                      <a:pPr algn="ctr"/>
+                      <a:r>
+                        <a:rPr lang="en-US" sz="1400" dirty="0" smtClean="0"/>
+                        <a:t>7</a:t>
+                      </a:r>
+                      <a:endParaRPr lang="en-US" sz="1400" dirty="0"/>
+                    </a:p>
+                  </a:txBody>
+                  <a:tcPr anchor="ctr">
+                    <a:lnT w="12700" cap="flat" cmpd="sng" algn="ctr">
+                      <a:solidFill>
+                        <a:schemeClr val="tx1"/>
+                      </a:solidFill>
+                      <a:prstDash val="solid"/>
+                      <a:round/>
+                      <a:headEnd type="none" w="med" len="med"/>
+                      <a:tailEnd type="none" w="med" len="med"/>
+                    </a:lnT>
+                  </a:tcPr>
+                </a:tc>
+                <a:tc>
+                  <a:txBody>
+                    <a:bodyPr/>
+                    <a:lstStyle/>
+                    <a:p>
+                      <a:pPr algn="ctr"/>
+                      <a:r>
+                        <a:rPr lang="en-US" sz="1400" dirty="0" smtClean="0"/>
+                        <a:t>8</a:t>
+                      </a:r>
+                      <a:endParaRPr lang="en-US" sz="1400" dirty="0"/>
+                    </a:p>
+                  </a:txBody>
+                  <a:tcPr anchor="ctr">
+                    <a:lnT w="12700" cap="flat" cmpd="sng" algn="ctr">
+                      <a:solidFill>
+                        <a:schemeClr val="tx1"/>
+                      </a:solidFill>
+                      <a:prstDash val="solid"/>
+                      <a:round/>
+                      <a:headEnd type="none" w="med" len="med"/>
+                      <a:tailEnd type="none" w="med" len="med"/>
+                    </a:lnT>
+                  </a:tcPr>
+                </a:tc>
+                <a:tc>
+                  <a:txBody>
+                    <a:bodyPr/>
+                    <a:lstStyle/>
+                    <a:p>
+                      <a:pPr algn="ctr"/>
+                      <a:r>
+                        <a:rPr lang="en-US" sz="1400" dirty="0" smtClean="0"/>
+                        <a:t>9</a:t>
+                      </a:r>
+                      <a:endParaRPr lang="en-US" sz="1400" dirty="0"/>
+                    </a:p>
+                  </a:txBody>
+                  <a:tcPr anchor="ctr">
+                    <a:lnT w="12700" cap="flat" cmpd="sng" algn="ctr">
+                      <a:solidFill>
+                        <a:schemeClr val="tx1"/>
+                      </a:solidFill>
+                      <a:prstDash val="solid"/>
+                      <a:round/>
+                      <a:headEnd type="none" w="med" len="med"/>
+                      <a:tailEnd type="none" w="med" len="med"/>
+                    </a:lnT>
+                  </a:tcPr>
+                </a:tc>
+                <a:tc>
+                  <a:txBody>
+                    <a:bodyPr/>
+                    <a:lstStyle/>
+                    <a:p>
+                      <a:pPr algn="ctr"/>
+                      <a:r>
+                        <a:rPr lang="en-US" sz="1400" dirty="0" smtClean="0"/>
+                        <a:t>10</a:t>
+                      </a:r>
+                      <a:endParaRPr lang="en-US" sz="1400" dirty="0"/>
+                    </a:p>
+                  </a:txBody>
+                  <a:tcPr anchor="ctr">
+                    <a:lnT w="12700" cap="flat" cmpd="sng" algn="ctr">
+                      <a:solidFill>
+                        <a:schemeClr val="tx1"/>
+                      </a:solidFill>
+                      <a:prstDash val="solid"/>
+                      <a:round/>
+                      <a:headEnd type="none" w="med" len="med"/>
+                      <a:tailEnd type="none" w="med" len="med"/>
+                    </a:lnT>
+                  </a:tcPr>
+                </a:tc>
+                <a:tc>
+                  <a:txBody>
+                    <a:bodyPr/>
+                    <a:lstStyle/>
+                    <a:p>
+                      <a:pPr algn="ctr"/>
+                      <a:r>
+                        <a:rPr lang="en-US" sz="1400" dirty="0" smtClean="0"/>
+                        <a:t>11</a:t>
+                      </a:r>
+                      <a:endParaRPr lang="en-US" sz="1400" dirty="0"/>
+                    </a:p>
+                  </a:txBody>
+                  <a:tcPr anchor="ctr">
+                    <a:lnT w="12700" cap="flat" cmpd="sng" algn="ctr">
+                      <a:solidFill>
+                        <a:schemeClr val="tx1"/>
+                      </a:solidFill>
+                      <a:prstDash val="solid"/>
+                      <a:round/>
+                      <a:headEnd type="none" w="med" len="med"/>
+                      <a:tailEnd type="none" w="med" len="med"/>
+                    </a:lnT>
+                  </a:tcPr>
+                </a:tc>
+                <a:tc>
+                  <a:txBody>
+                    <a:bodyPr/>
+                    <a:lstStyle/>
+                    <a:p>
+                      <a:pPr algn="ctr"/>
+                      <a:r>
+                        <a:rPr lang="en-US" sz="1400" dirty="0" smtClean="0"/>
+                        <a:t>12</a:t>
+                      </a:r>
+                      <a:endParaRPr lang="en-US" sz="1400" dirty="0"/>
+                    </a:p>
+                  </a:txBody>
+                  <a:tcPr anchor="ctr">
+                    <a:lnT w="12700" cap="flat" cmpd="sng" algn="ctr">
+                      <a:solidFill>
+                        <a:schemeClr val="tx1"/>
+                      </a:solidFill>
+                      <a:prstDash val="solid"/>
+                      <a:round/>
+                      <a:headEnd type="none" w="med" len="med"/>
+                      <a:tailEnd type="none" w="med" len="med"/>
+                    </a:lnT>
+                  </a:tcPr>
+                </a:tc>
+                <a:tc>
+                  <a:txBody>
+                    <a:bodyPr/>
+                    <a:lstStyle/>
+                    <a:p>
+                      <a:pPr algn="ctr"/>
+                      <a:r>
+                        <a:rPr lang="en-US" sz="1400" dirty="0" smtClean="0"/>
+                        <a:t>13</a:t>
+                      </a:r>
+                      <a:endParaRPr lang="en-US" sz="1400" dirty="0"/>
+                    </a:p>
+                  </a:txBody>
+                  <a:tcPr anchor="ctr">
+                    <a:lnT w="12700" cap="flat" cmpd="sng" algn="ctr">
+                      <a:solidFill>
+                        <a:schemeClr val="tx1"/>
+                      </a:solidFill>
+                      <a:prstDash val="solid"/>
+                      <a:round/>
+                      <a:headEnd type="none" w="med" len="med"/>
+                      <a:tailEnd type="none" w="med" len="med"/>
+                    </a:lnT>
+                  </a:tcPr>
+                </a:tc>
+                <a:tc>
+                  <a:txBody>
+                    <a:bodyPr/>
+                    <a:lstStyle/>
+                    <a:p>
+                      <a:pPr algn="ctr"/>
+                      <a:r>
+                        <a:rPr lang="en-US" sz="1400" dirty="0" smtClean="0"/>
+                        <a:t>14</a:t>
+                      </a:r>
+                      <a:endParaRPr lang="en-US" sz="1400" dirty="0"/>
+                    </a:p>
+                  </a:txBody>
+                  <a:tcPr anchor="ctr">
+                    <a:lnT w="12700" cap="flat" cmpd="sng" algn="ctr">
+                      <a:solidFill>
+                        <a:schemeClr val="tx1"/>
+                      </a:solidFill>
+                      <a:prstDash val="solid"/>
+                      <a:round/>
+                      <a:headEnd type="none" w="med" len="med"/>
+                      <a:tailEnd type="none" w="med" len="med"/>
+                    </a:lnT>
+                  </a:tcPr>
+                </a:tc>
+                <a:tc>
+                  <a:txBody>
+                    <a:bodyPr/>
+                    <a:lstStyle/>
+                    <a:p>
+                      <a:pPr algn="ctr"/>
+                      <a:r>
+                        <a:rPr lang="en-US" sz="1400" dirty="0" smtClean="0"/>
+                        <a:t>15</a:t>
+                      </a:r>
+                      <a:endParaRPr lang="en-US" sz="1400" dirty="0"/>
+                    </a:p>
+                  </a:txBody>
+                  <a:tcPr anchor="ctr">
+                    <a:lnT w="12700" cap="flat" cmpd="sng" algn="ctr">
+                      <a:solidFill>
+                        <a:schemeClr val="tx1"/>
+                      </a:solidFill>
+                      <a:prstDash val="solid"/>
+                      <a:round/>
+                      <a:headEnd type="none" w="med" len="med"/>
+                      <a:tailEnd type="none" w="med" len="med"/>
+                    </a:lnT>
+                  </a:tcPr>
+                </a:tc>
+                <a:tc>
+                  <a:txBody>
+                    <a:bodyPr/>
+                    <a:lstStyle/>
+                    <a:p>
+                      <a:pPr algn="ctr"/>
+                      <a:r>
+                        <a:rPr lang="en-US" sz="1400" dirty="0" smtClean="0"/>
+                        <a:t>16</a:t>
+                      </a:r>
+                      <a:endParaRPr lang="en-US" sz="1400" dirty="0"/>
+                    </a:p>
+                  </a:txBody>
+                  <a:tcPr anchor="ctr">
+                    <a:lnT w="12700" cap="flat" cmpd="sng" algn="ctr">
+                      <a:solidFill>
+                        <a:schemeClr val="tx1"/>
+                      </a:solidFill>
+                      <a:prstDash val="solid"/>
+                      <a:round/>
+                      <a:headEnd type="none" w="med" len="med"/>
+                      <a:tailEnd type="none" w="med" len="med"/>
+                    </a:lnT>
+                  </a:tcPr>
+                </a:tc>
+                <a:tc>
+                  <a:txBody>
+                    <a:bodyPr/>
+                    <a:lstStyle/>
+                    <a:p>
+                      <a:pPr algn="ctr"/>
+                      <a:r>
+                        <a:rPr lang="en-US" sz="1400" b="0" dirty="0" smtClean="0"/>
+                        <a:t>17</a:t>
+                      </a:r>
+                      <a:endParaRPr lang="en-US" sz="1400" b="0" dirty="0"/>
+                    </a:p>
+                  </a:txBody>
+                  <a:tcPr anchor="ctr">
+                    <a:lnT w="12700" cap="flat" cmpd="sng" algn="ctr">
+                      <a:solidFill>
+                        <a:schemeClr val="tx1"/>
+                      </a:solidFill>
+                      <a:prstDash val="solid"/>
+                      <a:round/>
+                      <a:headEnd type="none" w="med" len="med"/>
+                      <a:tailEnd type="none" w="med" len="med"/>
+                    </a:lnT>
+                  </a:tcPr>
+                </a:tc>
+                <a:tc>
+                  <a:txBody>
+                    <a:bodyPr/>
+                    <a:lstStyle/>
+                    <a:p>
+                      <a:pPr algn="ctr"/>
+                      <a:r>
+                        <a:rPr lang="en-US" sz="1400" b="0" dirty="0" smtClean="0"/>
+                        <a:t>18</a:t>
+                      </a:r>
+                      <a:endParaRPr lang="en-US" sz="1400" b="0" dirty="0"/>
+                    </a:p>
+                  </a:txBody>
+                  <a:tcPr anchor="ctr">
+                    <a:lnT w="12700" cap="flat" cmpd="sng" algn="ctr">
+                      <a:solidFill>
+                        <a:schemeClr val="tx1"/>
+                      </a:solidFill>
+                      <a:prstDash val="solid"/>
+                      <a:round/>
+                      <a:headEnd type="none" w="med" len="med"/>
+                      <a:tailEnd type="none" w="med" len="med"/>
+                    </a:lnT>
+                  </a:tcPr>
+                </a:tc>
+                <a:tc>
+                  <a:txBody>
+                    <a:bodyPr/>
+                    <a:lstStyle/>
+                    <a:p>
+                      <a:pPr algn="ctr"/>
+                      <a:r>
+                        <a:rPr lang="en-US" sz="1400" b="0" dirty="0" smtClean="0"/>
+                        <a:t>19</a:t>
+                      </a:r>
+                      <a:endParaRPr lang="en-US" sz="1400" b="0" dirty="0"/>
+                    </a:p>
+                  </a:txBody>
+                  <a:tcPr anchor="ctr">
+                    <a:lnT w="12700" cap="flat" cmpd="sng" algn="ctr">
+                      <a:solidFill>
+                        <a:schemeClr val="tx1"/>
+                      </a:solidFill>
+                      <a:prstDash val="solid"/>
+                      <a:round/>
+                      <a:headEnd type="none" w="med" len="med"/>
+                      <a:tailEnd type="none" w="med" len="med"/>
+                    </a:lnT>
+                  </a:tcPr>
+                </a:tc>
+                <a:tc>
+                  <a:txBody>
+                    <a:bodyPr/>
+                    <a:lstStyle/>
+                    <a:p>
+                      <a:pPr algn="ctr"/>
+                      <a:r>
+                        <a:rPr lang="en-US" sz="1400" b="0" dirty="0" smtClean="0"/>
+                        <a:t>20</a:t>
+                      </a:r>
+                      <a:endParaRPr lang="en-US" sz="1400" b="0" dirty="0"/>
+                    </a:p>
+                  </a:txBody>
+                  <a:tcPr anchor="ctr">
+                    <a:lnT w="12700" cap="flat" cmpd="sng" algn="ctr">
+                      <a:solidFill>
+                        <a:schemeClr val="tx1"/>
+                      </a:solidFill>
+                      <a:prstDash val="solid"/>
+                      <a:round/>
+                      <a:headEnd type="none" w="med" len="med"/>
+                      <a:tailEnd type="none" w="med" len="med"/>
+                    </a:lnT>
+                  </a:tcPr>
+                </a:tc>
+                <a:tc>
+                  <a:txBody>
+                    <a:bodyPr/>
+                    <a:lstStyle/>
+                    <a:p>
+                      <a:pPr algn="ctr"/>
+                      <a:r>
+                        <a:rPr lang="en-US" sz="1400" b="0" dirty="0" smtClean="0"/>
+                        <a:t>21</a:t>
+                      </a:r>
+                      <a:endParaRPr lang="en-US" sz="1400" b="0" dirty="0"/>
+                    </a:p>
+                  </a:txBody>
+                  <a:tcPr anchor="ctr">
+                    <a:lnT w="12700" cap="flat" cmpd="sng" algn="ctr">
+                      <a:solidFill>
+                        <a:schemeClr val="tx1"/>
+                      </a:solidFill>
+                      <a:prstDash val="solid"/>
+                      <a:round/>
+                      <a:headEnd type="none" w="med" len="med"/>
+                      <a:tailEnd type="none" w="med" len="med"/>
+                    </a:lnT>
+                  </a:tcPr>
+                </a:tc>
+                <a:tc>
+                  <a:txBody>
+                    <a:bodyPr/>
+                    <a:lstStyle/>
+                    <a:p>
+                      <a:pPr algn="ctr"/>
+                      <a:r>
+                        <a:rPr lang="en-US" sz="1400" b="0" dirty="0" smtClean="0"/>
+                        <a:t>22</a:t>
+                      </a:r>
+                      <a:endParaRPr lang="en-US" sz="1400" b="0" dirty="0"/>
+                    </a:p>
+                  </a:txBody>
+                  <a:tcPr anchor="ctr">
+                    <a:lnT w="12700" cap="flat" cmpd="sng" algn="ctr">
+                      <a:solidFill>
+                        <a:schemeClr val="tx1"/>
+                      </a:solidFill>
+                      <a:prstDash val="solid"/>
+                      <a:round/>
+                      <a:headEnd type="none" w="med" len="med"/>
+                      <a:tailEnd type="none" w="med" len="med"/>
+                    </a:lnT>
+                  </a:tcPr>
+                </a:tc>
+                <a:tc>
+                  <a:txBody>
+                    <a:bodyPr/>
+                    <a:lstStyle/>
+                    <a:p>
+                      <a:pPr algn="ctr"/>
+                      <a:r>
+                        <a:rPr lang="en-US" sz="1400" b="0" dirty="0" smtClean="0"/>
+                        <a:t>23</a:t>
+                      </a:r>
+                      <a:endParaRPr lang="en-US" sz="1400" b="0" dirty="0"/>
+                    </a:p>
+                  </a:txBody>
+                  <a:tcPr anchor="ctr">
+                    <a:lnT w="12700" cap="flat" cmpd="sng" algn="ctr">
+                      <a:solidFill>
+                        <a:schemeClr val="tx1"/>
+                      </a:solidFill>
+                      <a:prstDash val="solid"/>
+                      <a:round/>
+                      <a:headEnd type="none" w="med" len="med"/>
+                      <a:tailEnd type="none" w="med" len="med"/>
+                    </a:lnT>
+                  </a:tcPr>
+                </a:tc>
+                <a:tc>
+                  <a:txBody>
+                    <a:bodyPr/>
+                    <a:lstStyle/>
+                    <a:p>
+                      <a:pPr algn="ctr"/>
+                      <a:r>
+                        <a:rPr lang="en-US" sz="1400" b="0" dirty="0" smtClean="0"/>
+                        <a:t>24</a:t>
+                      </a:r>
+                      <a:endParaRPr lang="en-US" sz="1400" b="0" dirty="0"/>
+                    </a:p>
+                  </a:txBody>
+                  <a:tcPr anchor="ctr">
+                    <a:lnT w="12700" cap="flat" cmpd="sng" algn="ctr">
+                      <a:solidFill>
+                        <a:schemeClr val="tx1"/>
+                      </a:solidFill>
+                      <a:prstDash val="solid"/>
+                      <a:round/>
+                      <a:headEnd type="none" w="med" len="med"/>
+                      <a:tailEnd type="none" w="med" len="med"/>
+                    </a:lnT>
+                  </a:tcPr>
+                </a:tc>
+                <a:tc>
+                  <a:txBody>
+                    <a:bodyPr/>
+                    <a:lstStyle/>
+                    <a:p>
+                      <a:pPr algn="ctr"/>
+                      <a:r>
+                        <a:rPr lang="en-US" sz="1400" b="0" dirty="0" smtClean="0"/>
+                        <a:t>25</a:t>
+                      </a:r>
+                      <a:endParaRPr lang="en-US" sz="1400" b="0" dirty="0"/>
+                    </a:p>
+                  </a:txBody>
+                  <a:tcPr anchor="ctr">
+                    <a:lnT w="12700" cap="flat" cmpd="sng" algn="ctr">
+                      <a:solidFill>
+                        <a:schemeClr val="tx1"/>
+                      </a:solidFill>
+                      <a:prstDash val="solid"/>
+                      <a:round/>
+                      <a:headEnd type="none" w="med" len="med"/>
+                      <a:tailEnd type="none" w="med" len="med"/>
+                    </a:lnT>
+                  </a:tcPr>
+                </a:tc>
+                <a:tc>
+                  <a:txBody>
+                    <a:bodyPr/>
+                    <a:lstStyle/>
+                    <a:p>
+                      <a:pPr algn="ctr"/>
+                      <a:r>
+                        <a:rPr lang="en-US" sz="1400" b="1" dirty="0" smtClean="0"/>
+                        <a:t>Total</a:t>
+                      </a:r>
+                      <a:endParaRPr lang="en-US" sz="1400" b="1" dirty="0"/>
+                    </a:p>
+                  </a:txBody>
+                  <a:tcPr anchor="ctr">
+                    <a:lnR w="12700" cap="flat" cmpd="sng" algn="ctr">
+                      <a:solidFill>
+                        <a:schemeClr val="tx1"/>
+                      </a:solidFill>
+                      <a:prstDash val="solid"/>
+                      <a:round/>
+                      <a:headEnd type="none" w="med" len="med"/>
+                      <a:tailEnd type="none" w="med" len="med"/>
+                    </a:lnR>
+                    <a:lnT w="12700" cap="flat" cmpd="sng" algn="ctr">
+                      <a:solidFill>
+                        <a:schemeClr val="tx1"/>
+                      </a:solidFill>
+                      <a:prstDash val="solid"/>
+                      <a:round/>
+                      <a:headEnd type="none" w="med" len="med"/>
+                      <a:tailEnd type="none" w="med" len="med"/>
+                    </a:lnT>
+                  </a:tcPr>
+                </a:tc>
+                <a:extLst>
+                  <a:ext uri="{0D108BD9-81ED-4DB2-BD59-A6C34878D82A}">
+                    <a16:rowId xmlns:a16="http://schemas.microsoft.com/office/drawing/2014/main" val="3415911684"/>
+                  </a:ext>
+                </a:extLst>
+              </a:tr>
+              <a:tr h="489882">
+                <a:tc vMerge="1">
+                  <a:txBody>
+                    <a:bodyPr/>
+                    <a:lstStyle/>
+                    <a:p>
+                      <a:endParaRPr lang="en-US" dirty="0"/>
+                    </a:p>
+                  </a:txBody>
+                  <a:tcPr/>
+                </a:tc>
+                <a:tc>
+                  <a:txBody>
+                    <a:bodyPr/>
+                    <a:lstStyle/>
+                    <a:p>
+                      <a:pPr algn="ctr"/>
+                      <a:r>
+                        <a:rPr lang="en-US" sz="1400" dirty="0" smtClean="0"/>
+                        <a:t>38</a:t>
+                      </a:r>
+                      <a:endParaRPr lang="en-US" sz="1400" dirty="0"/>
+                    </a:p>
+                  </a:txBody>
+                  <a:tcPr anchor="ctr">
+                    <a:lnB w="12700" cap="flat" cmpd="sng" algn="ctr">
+                      <a:solidFill>
+                        <a:schemeClr val="tx1"/>
+                      </a:solidFill>
+                      <a:prstDash val="solid"/>
+                      <a:round/>
+                      <a:headEnd type="none" w="med" len="med"/>
+                      <a:tailEnd type="none" w="med" len="med"/>
+                    </a:lnB>
+                  </a:tcPr>
+                </a:tc>
+                <a:tc>
+                  <a:txBody>
+                    <a:bodyPr/>
+                    <a:lstStyle/>
+                    <a:p>
+                      <a:pPr algn="ctr"/>
+                      <a:r>
+                        <a:rPr lang="en-US" sz="1400" dirty="0" smtClean="0"/>
+                        <a:t>18</a:t>
+                      </a:r>
+                      <a:endParaRPr lang="en-US" sz="1400" dirty="0"/>
+                    </a:p>
+                  </a:txBody>
+                  <a:tcPr anchor="ctr">
+                    <a:lnB w="12700" cap="flat" cmpd="sng" algn="ctr">
+                      <a:solidFill>
+                        <a:schemeClr val="tx1"/>
+                      </a:solidFill>
+                      <a:prstDash val="solid"/>
+                      <a:round/>
+                      <a:headEnd type="none" w="med" len="med"/>
+                      <a:tailEnd type="none" w="med" len="med"/>
+                    </a:lnB>
+                  </a:tcPr>
+                </a:tc>
+                <a:tc>
+                  <a:txBody>
+                    <a:bodyPr/>
+                    <a:lstStyle/>
+                    <a:p>
+                      <a:pPr algn="ctr"/>
+                      <a:r>
+                        <a:rPr lang="en-US" sz="1400" dirty="0" smtClean="0"/>
+                        <a:t>13</a:t>
+                      </a:r>
+                      <a:endParaRPr lang="en-US" sz="1400" dirty="0"/>
+                    </a:p>
+                  </a:txBody>
+                  <a:tcPr anchor="ctr">
+                    <a:lnB w="12700" cap="flat" cmpd="sng" algn="ctr">
+                      <a:solidFill>
+                        <a:schemeClr val="tx1"/>
+                      </a:solidFill>
+                      <a:prstDash val="solid"/>
+                      <a:round/>
+                      <a:headEnd type="none" w="med" len="med"/>
+                      <a:tailEnd type="none" w="med" len="med"/>
+                    </a:lnB>
+                  </a:tcPr>
+                </a:tc>
+                <a:tc>
+                  <a:txBody>
+                    <a:bodyPr/>
+                    <a:lstStyle/>
+                    <a:p>
+                      <a:pPr algn="ctr"/>
+                      <a:r>
+                        <a:rPr lang="en-US" sz="1400" dirty="0" smtClean="0"/>
+                        <a:t>9</a:t>
+                      </a:r>
+                      <a:endParaRPr lang="en-US" sz="1400" dirty="0"/>
+                    </a:p>
+                  </a:txBody>
+                  <a:tcPr anchor="ctr">
+                    <a:lnB w="12700" cap="flat" cmpd="sng" algn="ctr">
+                      <a:solidFill>
+                        <a:schemeClr val="tx1"/>
+                      </a:solidFill>
+                      <a:prstDash val="solid"/>
+                      <a:round/>
+                      <a:headEnd type="none" w="med" len="med"/>
+                      <a:tailEnd type="none" w="med" len="med"/>
+                    </a:lnB>
+                  </a:tcPr>
+                </a:tc>
+                <a:tc>
+                  <a:txBody>
+                    <a:bodyPr/>
+                    <a:lstStyle/>
+                    <a:p>
+                      <a:pPr algn="ctr"/>
+                      <a:r>
+                        <a:rPr lang="en-US" sz="1400" dirty="0" smtClean="0"/>
+                        <a:t>4</a:t>
+                      </a:r>
+                      <a:endParaRPr lang="en-US" sz="1400" dirty="0"/>
+                    </a:p>
+                  </a:txBody>
+                  <a:tcPr anchor="ctr">
+                    <a:lnB w="12700" cap="flat" cmpd="sng" algn="ctr">
+                      <a:solidFill>
+                        <a:schemeClr val="tx1"/>
+                      </a:solidFill>
+                      <a:prstDash val="solid"/>
+                      <a:round/>
+                      <a:headEnd type="none" w="med" len="med"/>
+                      <a:tailEnd type="none" w="med" len="med"/>
+                    </a:lnB>
+                  </a:tcPr>
+                </a:tc>
+                <a:tc>
+                  <a:txBody>
+                    <a:bodyPr/>
+                    <a:lstStyle/>
+                    <a:p>
+                      <a:pPr algn="ctr"/>
+                      <a:r>
+                        <a:rPr lang="en-US" sz="1400" dirty="0" smtClean="0"/>
+                        <a:t>1</a:t>
+                      </a:r>
+                      <a:endParaRPr lang="en-US" sz="1400" dirty="0"/>
+                    </a:p>
+                  </a:txBody>
+                  <a:tcPr anchor="ctr">
+                    <a:lnB w="12700" cap="flat" cmpd="sng" algn="ctr">
+                      <a:solidFill>
+                        <a:schemeClr val="tx1"/>
+                      </a:solidFill>
+                      <a:prstDash val="solid"/>
+                      <a:round/>
+                      <a:headEnd type="none" w="med" len="med"/>
+                      <a:tailEnd type="none" w="med" len="med"/>
+                    </a:lnB>
+                  </a:tcPr>
+                </a:tc>
+                <a:tc>
+                  <a:txBody>
+                    <a:bodyPr/>
+                    <a:lstStyle/>
+                    <a:p>
+                      <a:pPr algn="ctr"/>
+                      <a:r>
+                        <a:rPr lang="en-US" sz="1400" dirty="0" smtClean="0"/>
+                        <a:t>4</a:t>
+                      </a:r>
+                      <a:endParaRPr lang="en-US" sz="1400" dirty="0"/>
+                    </a:p>
+                  </a:txBody>
+                  <a:tcPr anchor="ctr">
+                    <a:lnB w="12700" cap="flat" cmpd="sng" algn="ctr">
+                      <a:solidFill>
+                        <a:schemeClr val="tx1"/>
+                      </a:solidFill>
+                      <a:prstDash val="solid"/>
+                      <a:round/>
+                      <a:headEnd type="none" w="med" len="med"/>
+                      <a:tailEnd type="none" w="med" len="med"/>
+                    </a:lnB>
+                  </a:tcPr>
+                </a:tc>
+                <a:tc>
+                  <a:txBody>
+                    <a:bodyPr/>
+                    <a:lstStyle/>
+                    <a:p>
+                      <a:pPr algn="ctr"/>
+                      <a:r>
+                        <a:rPr lang="en-US" sz="1400" dirty="0" smtClean="0"/>
+                        <a:t>2</a:t>
+                      </a:r>
+                      <a:endParaRPr lang="en-US" sz="1400" dirty="0"/>
+                    </a:p>
+                  </a:txBody>
+                  <a:tcPr anchor="ctr">
+                    <a:lnB w="12700" cap="flat" cmpd="sng" algn="ctr">
+                      <a:solidFill>
+                        <a:schemeClr val="tx1"/>
+                      </a:solidFill>
+                      <a:prstDash val="solid"/>
+                      <a:round/>
+                      <a:headEnd type="none" w="med" len="med"/>
+                      <a:tailEnd type="none" w="med" len="med"/>
+                    </a:lnB>
+                  </a:tcPr>
+                </a:tc>
+                <a:tc>
+                  <a:txBody>
+                    <a:bodyPr/>
+                    <a:lstStyle/>
+                    <a:p>
+                      <a:pPr algn="ctr"/>
+                      <a:r>
+                        <a:rPr lang="en-US" sz="1400" dirty="0" smtClean="0"/>
+                        <a:t>5</a:t>
+                      </a:r>
+                      <a:endParaRPr lang="en-US" sz="1400" dirty="0"/>
+                    </a:p>
+                  </a:txBody>
+                  <a:tcPr anchor="ctr">
+                    <a:lnB w="12700" cap="flat" cmpd="sng" algn="ctr">
+                      <a:solidFill>
+                        <a:schemeClr val="tx1"/>
+                      </a:solidFill>
+                      <a:prstDash val="solid"/>
+                      <a:round/>
+                      <a:headEnd type="none" w="med" len="med"/>
+                      <a:tailEnd type="none" w="med" len="med"/>
+                    </a:lnB>
+                  </a:tcPr>
+                </a:tc>
+                <a:tc>
+                  <a:txBody>
+                    <a:bodyPr/>
+                    <a:lstStyle/>
+                    <a:p>
+                      <a:pPr algn="ctr"/>
+                      <a:r>
+                        <a:rPr lang="en-US" sz="1400" dirty="0" smtClean="0"/>
+                        <a:t>1</a:t>
+                      </a:r>
+                      <a:endParaRPr lang="en-US" sz="1400" dirty="0"/>
+                    </a:p>
+                  </a:txBody>
+                  <a:tcPr anchor="ctr">
+                    <a:lnB w="12700" cap="flat" cmpd="sng" algn="ctr">
+                      <a:solidFill>
+                        <a:schemeClr val="tx1"/>
+                      </a:solidFill>
+                      <a:prstDash val="solid"/>
+                      <a:round/>
+                      <a:headEnd type="none" w="med" len="med"/>
+                      <a:tailEnd type="none" w="med" len="med"/>
+                    </a:lnB>
+                  </a:tcPr>
+                </a:tc>
+                <a:tc>
+                  <a:txBody>
+                    <a:bodyPr/>
+                    <a:lstStyle/>
+                    <a:p>
+                      <a:pPr algn="ctr"/>
+                      <a:r>
+                        <a:rPr lang="en-US" sz="1400" dirty="0" smtClean="0"/>
+                        <a:t>1</a:t>
+                      </a:r>
+                      <a:endParaRPr lang="en-US" sz="1400" dirty="0"/>
+                    </a:p>
+                  </a:txBody>
+                  <a:tcPr anchor="ctr">
+                    <a:lnB w="12700" cap="flat" cmpd="sng" algn="ctr">
+                      <a:solidFill>
+                        <a:schemeClr val="tx1"/>
+                      </a:solidFill>
+                      <a:prstDash val="solid"/>
+                      <a:round/>
+                      <a:headEnd type="none" w="med" len="med"/>
+                      <a:tailEnd type="none" w="med" len="med"/>
+                    </a:lnB>
+                  </a:tcPr>
+                </a:tc>
+                <a:tc>
+                  <a:txBody>
+                    <a:bodyPr/>
+                    <a:lstStyle/>
+                    <a:p>
+                      <a:pPr algn="ctr"/>
+                      <a:r>
+                        <a:rPr lang="en-US" sz="1400" dirty="0" smtClean="0"/>
+                        <a:t>1</a:t>
+                      </a:r>
+                      <a:endParaRPr lang="en-US" sz="1400" dirty="0"/>
+                    </a:p>
+                  </a:txBody>
+                  <a:tcPr anchor="ctr">
+                    <a:lnB w="12700" cap="flat" cmpd="sng" algn="ctr">
+                      <a:solidFill>
+                        <a:schemeClr val="tx1"/>
+                      </a:solidFill>
+                      <a:prstDash val="solid"/>
+                      <a:round/>
+                      <a:headEnd type="none" w="med" len="med"/>
+                      <a:tailEnd type="none" w="med" len="med"/>
+                    </a:lnB>
+                  </a:tcPr>
+                </a:tc>
+                <a:tc>
+                  <a:txBody>
+                    <a:bodyPr/>
+                    <a:lstStyle/>
+                    <a:p>
+                      <a:pPr algn="ctr"/>
+                      <a:r>
+                        <a:rPr lang="en-US" sz="1400" dirty="0" smtClean="0">
+                          <a:solidFill>
+                            <a:schemeClr val="bg1">
+                              <a:lumMod val="50000"/>
+                            </a:schemeClr>
+                          </a:solidFill>
+                        </a:rPr>
+                        <a:t>-</a:t>
+                      </a:r>
+                      <a:endParaRPr lang="en-US" sz="1400" dirty="0">
+                        <a:solidFill>
+                          <a:schemeClr val="bg1">
+                            <a:lumMod val="50000"/>
+                          </a:schemeClr>
+                        </a:solidFill>
+                      </a:endParaRPr>
+                    </a:p>
+                  </a:txBody>
+                  <a:tcPr anchor="ctr">
+                    <a:lnB w="12700" cap="flat" cmpd="sng" algn="ctr">
+                      <a:solidFill>
+                        <a:schemeClr val="tx1"/>
+                      </a:solidFill>
+                      <a:prstDash val="solid"/>
+                      <a:round/>
+                      <a:headEnd type="none" w="med" len="med"/>
+                      <a:tailEnd type="none" w="med" len="med"/>
+                    </a:lnB>
+                  </a:tcPr>
+                </a:tc>
+                <a:tc>
+                  <a:txBody>
+                    <a:bodyPr/>
+                    <a:lstStyle/>
+                    <a:p>
+                      <a:pPr algn="ctr"/>
+                      <a:r>
+                        <a:rPr lang="en-US" sz="1400" dirty="0" smtClean="0"/>
+                        <a:t>3</a:t>
+                      </a:r>
+                      <a:endParaRPr lang="en-US" sz="1400" dirty="0"/>
+                    </a:p>
+                  </a:txBody>
+                  <a:tcPr anchor="ctr">
+                    <a:lnB w="12700" cap="flat" cmpd="sng" algn="ctr">
+                      <a:solidFill>
+                        <a:schemeClr val="tx1"/>
+                      </a:solidFill>
+                      <a:prstDash val="solid"/>
+                      <a:round/>
+                      <a:headEnd type="none" w="med" len="med"/>
+                      <a:tailEnd type="none" w="med" len="med"/>
+                    </a:lnB>
+                  </a:tcPr>
+                </a:tc>
+                <a:tc>
+                  <a:txBody>
+                    <a:bodyPr/>
+                    <a:lstStyle/>
+                    <a:p>
+                      <a:pPr algn="ctr"/>
+                      <a:r>
+                        <a:rPr lang="en-US" sz="1400" dirty="0" smtClean="0">
+                          <a:solidFill>
+                            <a:schemeClr val="bg1">
+                              <a:lumMod val="50000"/>
+                            </a:schemeClr>
+                          </a:solidFill>
+                        </a:rPr>
+                        <a:t>-</a:t>
+                      </a:r>
+                      <a:endParaRPr lang="en-US" sz="1400" dirty="0">
+                        <a:solidFill>
+                          <a:schemeClr val="bg1">
+                            <a:lumMod val="50000"/>
+                          </a:schemeClr>
+                        </a:solidFill>
+                      </a:endParaRPr>
+                    </a:p>
+                  </a:txBody>
+                  <a:tcPr anchor="ctr">
+                    <a:lnB w="12700" cap="flat" cmpd="sng" algn="ctr">
+                      <a:solidFill>
+                        <a:schemeClr val="tx1"/>
+                      </a:solidFill>
+                      <a:prstDash val="solid"/>
+                      <a:round/>
+                      <a:headEnd type="none" w="med" len="med"/>
+                      <a:tailEnd type="none" w="med" len="med"/>
+                    </a:lnB>
+                  </a:tcPr>
+                </a:tc>
+                <a:tc>
+                  <a:txBody>
+                    <a:bodyPr/>
+                    <a:lstStyle/>
+                    <a:p>
+                      <a:pPr algn="ctr"/>
+                      <a:r>
+                        <a:rPr lang="en-US" sz="1400" dirty="0" smtClean="0">
+                          <a:solidFill>
+                            <a:schemeClr val="bg1">
+                              <a:lumMod val="50000"/>
+                            </a:schemeClr>
+                          </a:solidFill>
+                        </a:rPr>
+                        <a:t>-</a:t>
+                      </a:r>
+                      <a:endParaRPr lang="en-US" sz="1400" dirty="0">
+                        <a:solidFill>
+                          <a:schemeClr val="bg1">
+                            <a:lumMod val="50000"/>
+                          </a:schemeClr>
+                        </a:solidFill>
+                      </a:endParaRPr>
+                    </a:p>
+                  </a:txBody>
+                  <a:tcPr anchor="ctr">
+                    <a:lnB w="12700" cap="flat" cmpd="sng" algn="ctr">
+                      <a:solidFill>
+                        <a:schemeClr val="tx1"/>
+                      </a:solidFill>
+                      <a:prstDash val="solid"/>
+                      <a:round/>
+                      <a:headEnd type="none" w="med" len="med"/>
+                      <a:tailEnd type="none" w="med" len="med"/>
+                    </a:lnB>
+                  </a:tcPr>
+                </a:tc>
+                <a:tc>
+                  <a:txBody>
+                    <a:bodyPr/>
+                    <a:lstStyle/>
+                    <a:p>
+                      <a:pPr algn="ctr"/>
+                      <a:r>
+                        <a:rPr lang="en-US" sz="1400" dirty="0" smtClean="0">
+                          <a:solidFill>
+                            <a:schemeClr val="bg1">
+                              <a:lumMod val="50000"/>
+                            </a:schemeClr>
+                          </a:solidFill>
+                        </a:rPr>
+                        <a:t>-</a:t>
+                      </a:r>
+                      <a:endParaRPr lang="en-US" sz="1400" dirty="0">
+                        <a:solidFill>
+                          <a:schemeClr val="bg1">
+                            <a:lumMod val="50000"/>
+                          </a:schemeClr>
+                        </a:solidFill>
+                      </a:endParaRPr>
+                    </a:p>
+                  </a:txBody>
+                  <a:tcPr anchor="ctr">
+                    <a:lnB w="12700" cap="flat" cmpd="sng" algn="ctr">
+                      <a:solidFill>
+                        <a:schemeClr val="tx1"/>
+                      </a:solidFill>
+                      <a:prstDash val="solid"/>
+                      <a:round/>
+                      <a:headEnd type="none" w="med" len="med"/>
+                      <a:tailEnd type="none" w="med" len="med"/>
+                    </a:lnB>
+                  </a:tcPr>
+                </a:tc>
+                <a:tc>
+                  <a:txBody>
+                    <a:bodyPr/>
+                    <a:lstStyle/>
+                    <a:p>
+                      <a:pPr algn="ctr"/>
+                      <a:r>
+                        <a:rPr lang="en-US" sz="1400" dirty="0" smtClean="0"/>
+                        <a:t>1</a:t>
+                      </a:r>
+                      <a:endParaRPr lang="en-US" sz="1400" dirty="0"/>
+                    </a:p>
+                  </a:txBody>
+                  <a:tcPr anchor="ctr">
+                    <a:lnB w="12700" cap="flat" cmpd="sng" algn="ctr">
+                      <a:solidFill>
+                        <a:schemeClr val="tx1"/>
+                      </a:solidFill>
+                      <a:prstDash val="solid"/>
+                      <a:round/>
+                      <a:headEnd type="none" w="med" len="med"/>
+                      <a:tailEnd type="none" w="med" len="med"/>
+                    </a:lnB>
+                  </a:tcPr>
+                </a:tc>
+                <a:tc>
+                  <a:txBody>
+                    <a:bodyPr/>
+                    <a:lstStyle/>
+                    <a:p>
+                      <a:pPr algn="ctr"/>
+                      <a:r>
+                        <a:rPr lang="en-US" sz="1400" dirty="0" smtClean="0">
+                          <a:solidFill>
+                            <a:schemeClr val="bg1">
+                              <a:lumMod val="50000"/>
+                            </a:schemeClr>
+                          </a:solidFill>
+                        </a:rPr>
+                        <a:t>-</a:t>
+                      </a:r>
+                      <a:endParaRPr lang="en-US" sz="1400" dirty="0">
+                        <a:solidFill>
+                          <a:schemeClr val="bg1">
+                            <a:lumMod val="50000"/>
+                          </a:schemeClr>
+                        </a:solidFill>
+                      </a:endParaRPr>
+                    </a:p>
+                  </a:txBody>
+                  <a:tcPr anchor="ctr">
+                    <a:lnB w="12700" cap="flat" cmpd="sng" algn="ctr">
+                      <a:solidFill>
+                        <a:schemeClr val="tx1"/>
+                      </a:solidFill>
+                      <a:prstDash val="solid"/>
+                      <a:round/>
+                      <a:headEnd type="none" w="med" len="med"/>
+                      <a:tailEnd type="none" w="med" len="med"/>
+                    </a:lnB>
+                  </a:tcPr>
+                </a:tc>
+                <a:tc>
+                  <a:txBody>
+                    <a:bodyPr/>
+                    <a:lstStyle/>
+                    <a:p>
+                      <a:pPr algn="ctr"/>
+                      <a:r>
+                        <a:rPr lang="en-US" sz="1400" dirty="0" smtClean="0">
+                          <a:solidFill>
+                            <a:schemeClr val="bg1">
+                              <a:lumMod val="50000"/>
+                            </a:schemeClr>
+                          </a:solidFill>
+                        </a:rPr>
+                        <a:t>-</a:t>
+                      </a:r>
+                      <a:endParaRPr lang="en-US" sz="1400" dirty="0">
+                        <a:solidFill>
+                          <a:schemeClr val="bg1">
+                            <a:lumMod val="50000"/>
+                          </a:schemeClr>
+                        </a:solidFill>
+                      </a:endParaRPr>
+                    </a:p>
+                  </a:txBody>
+                  <a:tcPr anchor="ctr">
+                    <a:lnB w="12700" cap="flat" cmpd="sng" algn="ctr">
+                      <a:solidFill>
+                        <a:schemeClr val="tx1"/>
+                      </a:solidFill>
+                      <a:prstDash val="solid"/>
+                      <a:round/>
+                      <a:headEnd type="none" w="med" len="med"/>
+                      <a:tailEnd type="none" w="med" len="med"/>
+                    </a:lnB>
+                  </a:tcPr>
+                </a:tc>
+                <a:tc>
+                  <a:txBody>
+                    <a:bodyPr/>
+                    <a:lstStyle/>
+                    <a:p>
+                      <a:pPr algn="ctr"/>
+                      <a:r>
+                        <a:rPr lang="en-US" sz="1400" dirty="0" smtClean="0">
+                          <a:solidFill>
+                            <a:schemeClr val="bg1">
+                              <a:lumMod val="50000"/>
+                            </a:schemeClr>
+                          </a:solidFill>
+                        </a:rPr>
+                        <a:t>-</a:t>
+                      </a:r>
+                      <a:endParaRPr lang="en-US" sz="1400" dirty="0">
+                        <a:solidFill>
+                          <a:schemeClr val="bg1">
+                            <a:lumMod val="50000"/>
+                          </a:schemeClr>
+                        </a:solidFill>
+                      </a:endParaRPr>
+                    </a:p>
+                  </a:txBody>
+                  <a:tcPr anchor="ctr">
+                    <a:lnB w="12700" cap="flat" cmpd="sng" algn="ctr">
+                      <a:solidFill>
+                        <a:schemeClr val="tx1"/>
+                      </a:solidFill>
+                      <a:prstDash val="solid"/>
+                      <a:round/>
+                      <a:headEnd type="none" w="med" len="med"/>
+                      <a:tailEnd type="none" w="med" len="med"/>
+                    </a:lnB>
+                  </a:tcPr>
+                </a:tc>
+                <a:tc>
+                  <a:txBody>
+                    <a:bodyPr/>
+                    <a:lstStyle/>
+                    <a:p>
+                      <a:pPr algn="ctr"/>
+                      <a:r>
+                        <a:rPr lang="en-US" sz="1400" dirty="0" smtClean="0"/>
+                        <a:t>1</a:t>
+                      </a:r>
+                      <a:endParaRPr lang="en-US" sz="1400" dirty="0"/>
+                    </a:p>
+                  </a:txBody>
+                  <a:tcPr anchor="ctr">
+                    <a:lnB w="12700" cap="flat" cmpd="sng" algn="ctr">
+                      <a:solidFill>
+                        <a:schemeClr val="tx1"/>
+                      </a:solidFill>
+                      <a:prstDash val="solid"/>
+                      <a:round/>
+                      <a:headEnd type="none" w="med" len="med"/>
+                      <a:tailEnd type="none" w="med" len="med"/>
+                    </a:lnB>
+                  </a:tcPr>
+                </a:tc>
+                <a:tc>
+                  <a:txBody>
+                    <a:bodyPr/>
+                    <a:lstStyle/>
+                    <a:p>
+                      <a:pPr algn="ctr"/>
+                      <a:r>
+                        <a:rPr lang="en-US" sz="1400" dirty="0" smtClean="0">
+                          <a:solidFill>
+                            <a:schemeClr val="bg1">
+                              <a:lumMod val="50000"/>
+                            </a:schemeClr>
+                          </a:solidFill>
+                        </a:rPr>
+                        <a:t>-</a:t>
+                      </a:r>
+                      <a:endParaRPr lang="en-US" sz="1400" dirty="0">
+                        <a:solidFill>
+                          <a:schemeClr val="bg1">
+                            <a:lumMod val="50000"/>
+                          </a:schemeClr>
+                        </a:solidFill>
+                      </a:endParaRPr>
+                    </a:p>
+                  </a:txBody>
+                  <a:tcPr anchor="ctr">
+                    <a:lnB w="12700" cap="flat" cmpd="sng" algn="ctr">
+                      <a:solidFill>
+                        <a:schemeClr val="tx1"/>
+                      </a:solidFill>
+                      <a:prstDash val="solid"/>
+                      <a:round/>
+                      <a:headEnd type="none" w="med" len="med"/>
+                      <a:tailEnd type="none" w="med" len="med"/>
+                    </a:lnB>
+                  </a:tcPr>
+                </a:tc>
+                <a:tc>
+                  <a:txBody>
+                    <a:bodyPr/>
+                    <a:lstStyle/>
+                    <a:p>
+                      <a:pPr algn="ctr"/>
+                      <a:r>
+                        <a:rPr lang="en-US" sz="1400" dirty="0" smtClean="0">
+                          <a:solidFill>
+                            <a:schemeClr val="bg1">
+                              <a:lumMod val="50000"/>
+                            </a:schemeClr>
+                          </a:solidFill>
+                        </a:rPr>
+                        <a:t>-</a:t>
+                      </a:r>
+                      <a:endParaRPr lang="en-US" sz="1400" dirty="0">
+                        <a:solidFill>
+                          <a:schemeClr val="bg1">
+                            <a:lumMod val="50000"/>
+                          </a:schemeClr>
+                        </a:solidFill>
+                      </a:endParaRPr>
+                    </a:p>
+                  </a:txBody>
+                  <a:tcPr anchor="ctr">
+                    <a:lnB w="12700" cap="flat" cmpd="sng" algn="ctr">
+                      <a:solidFill>
+                        <a:schemeClr val="tx1"/>
+                      </a:solidFill>
+                      <a:prstDash val="solid"/>
+                      <a:round/>
+                      <a:headEnd type="none" w="med" len="med"/>
+                      <a:tailEnd type="none" w="med" len="med"/>
+                    </a:lnB>
+                  </a:tcPr>
+                </a:tc>
+                <a:tc>
+                  <a:txBody>
+                    <a:bodyPr/>
+                    <a:lstStyle/>
+                    <a:p>
+                      <a:pPr algn="ctr"/>
+                      <a:r>
+                        <a:rPr lang="en-US" sz="1400" dirty="0" smtClean="0"/>
+                        <a:t>1</a:t>
+                      </a:r>
+                      <a:endParaRPr lang="en-US" sz="1400" dirty="0"/>
+                    </a:p>
+                  </a:txBody>
+                  <a:tcPr anchor="ctr">
+                    <a:lnB w="12700" cap="flat" cmpd="sng" algn="ctr">
+                      <a:solidFill>
+                        <a:schemeClr val="tx1"/>
+                      </a:solidFill>
+                      <a:prstDash val="solid"/>
+                      <a:round/>
+                      <a:headEnd type="none" w="med" len="med"/>
+                      <a:tailEnd type="none" w="med" len="med"/>
+                    </a:lnB>
+                  </a:tcPr>
+                </a:tc>
+                <a:tc>
+                  <a:txBody>
+                    <a:bodyPr/>
+                    <a:lstStyle/>
+                    <a:p>
+                      <a:pPr algn="ctr"/>
+                      <a:r>
+                        <a:rPr lang="en-US" sz="1400" dirty="0" smtClean="0"/>
+                        <a:t>103</a:t>
+                      </a:r>
+                      <a:endParaRPr lang="en-US" sz="1400" dirty="0"/>
+                    </a:p>
+                  </a:txBody>
+                  <a:tcPr anchor="ctr">
+                    <a:lnR w="12700" cap="flat" cmpd="sng" algn="ctr">
+                      <a:solidFill>
+                        <a:schemeClr val="tx1"/>
+                      </a:solidFill>
+                      <a:prstDash val="solid"/>
+                      <a:round/>
+                      <a:headEnd type="none" w="med" len="med"/>
+                      <a:tailEnd type="none" w="med" len="med"/>
+                    </a:lnR>
+                    <a:lnB w="12700" cap="flat" cmpd="sng" algn="ctr">
+                      <a:solidFill>
+                        <a:schemeClr val="tx1"/>
+                      </a:solidFill>
+                      <a:prstDash val="solid"/>
+                      <a:round/>
+                      <a:headEnd type="none" w="med" len="med"/>
+                      <a:tailEnd type="none" w="med" len="med"/>
+                    </a:lnB>
+                  </a:tcPr>
+                </a:tc>
+                <a:extLst>
+                  <a:ext uri="{0D108BD9-81ED-4DB2-BD59-A6C34878D82A}">
+                    <a16:rowId xmlns:a16="http://schemas.microsoft.com/office/drawing/2014/main" val="2128326411"/>
+                  </a:ext>
+                </a:extLst>
+              </a:tr>
+              <a:tr h="489882">
+                <a:tc rowSpan="2">
+                  <a:txBody>
+                    <a:bodyPr/>
+                    <a:lstStyle/>
+                    <a:p>
+                      <a:pPr algn="ctr"/>
+                      <a:r>
+                        <a:rPr lang="en-US" sz="1400" dirty="0" smtClean="0"/>
+                        <a:t>DLPFC</a:t>
+                      </a:r>
+                      <a:endParaRPr lang="en-US" sz="1400" dirty="0"/>
+                    </a:p>
+                  </a:txBody>
+                  <a:tcPr anchor="ctr">
+                    <a:lnL w="12700" cap="flat" cmpd="sng" algn="ctr">
+                      <a:solidFill>
+                        <a:schemeClr val="tx1"/>
+                      </a:solidFill>
+                      <a:prstDash val="solid"/>
+                      <a:round/>
+                      <a:headEnd type="none" w="med" len="med"/>
+                      <a:tailEnd type="none" w="med" len="med"/>
+                    </a:lnL>
+                    <a:lnT w="12700" cap="flat" cmpd="sng" algn="ctr">
+                      <a:solidFill>
+                        <a:schemeClr val="tx1"/>
+                      </a:solidFill>
+                      <a:prstDash val="solid"/>
+                      <a:round/>
+                      <a:headEnd type="none" w="med" len="med"/>
+                      <a:tailEnd type="none" w="med" len="med"/>
+                    </a:lnT>
+                    <a:lnB w="12700" cap="flat" cmpd="sng" algn="ctr">
+                      <a:solidFill>
+                        <a:schemeClr val="tx1"/>
+                      </a:solidFill>
+                      <a:prstDash val="solid"/>
+                      <a:round/>
+                      <a:headEnd type="none" w="med" len="med"/>
+                      <a:tailEnd type="none" w="med" len="med"/>
+                    </a:lnB>
+                  </a:tcPr>
+                </a:tc>
+                <a:tc>
+                  <a:txBody>
+                    <a:bodyPr/>
+                    <a:lstStyle/>
+                    <a:p>
+                      <a:pPr algn="ctr"/>
+                      <a:r>
+                        <a:rPr lang="en-US" sz="1400" dirty="0" smtClean="0"/>
+                        <a:t>1</a:t>
+                      </a:r>
+                      <a:endParaRPr lang="en-US" sz="1400" dirty="0"/>
+                    </a:p>
+                  </a:txBody>
+                  <a:tcPr anchor="ctr">
+                    <a:lnT w="12700" cap="flat" cmpd="sng" algn="ctr">
+                      <a:solidFill>
+                        <a:schemeClr val="tx1"/>
+                      </a:solidFill>
+                      <a:prstDash val="solid"/>
+                      <a:round/>
+                      <a:headEnd type="none" w="med" len="med"/>
+                      <a:tailEnd type="none" w="med" len="med"/>
+                    </a:lnT>
+                  </a:tcPr>
+                </a:tc>
+                <a:tc>
+                  <a:txBody>
+                    <a:bodyPr/>
+                    <a:lstStyle/>
+                    <a:p>
+                      <a:pPr algn="ctr"/>
+                      <a:r>
+                        <a:rPr lang="en-US" sz="1400" dirty="0" smtClean="0"/>
+                        <a:t>2</a:t>
+                      </a:r>
+                      <a:endParaRPr lang="en-US" sz="1400" dirty="0"/>
+                    </a:p>
+                  </a:txBody>
+                  <a:tcPr anchor="ctr">
+                    <a:lnT w="12700" cap="flat" cmpd="sng" algn="ctr">
+                      <a:solidFill>
+                        <a:schemeClr val="tx1"/>
+                      </a:solidFill>
+                      <a:prstDash val="solid"/>
+                      <a:round/>
+                      <a:headEnd type="none" w="med" len="med"/>
+                      <a:tailEnd type="none" w="med" len="med"/>
+                    </a:lnT>
+                  </a:tcPr>
+                </a:tc>
+                <a:tc>
+                  <a:txBody>
+                    <a:bodyPr/>
+                    <a:lstStyle/>
+                    <a:p>
+                      <a:pPr algn="ctr"/>
+                      <a:r>
+                        <a:rPr lang="en-US" sz="1400" dirty="0" smtClean="0"/>
+                        <a:t>3</a:t>
+                      </a:r>
+                      <a:endParaRPr lang="en-US" sz="1400" dirty="0"/>
+                    </a:p>
+                  </a:txBody>
+                  <a:tcPr anchor="ctr">
+                    <a:lnT w="12700" cap="flat" cmpd="sng" algn="ctr">
+                      <a:solidFill>
+                        <a:schemeClr val="tx1"/>
+                      </a:solidFill>
+                      <a:prstDash val="solid"/>
+                      <a:round/>
+                      <a:headEnd type="none" w="med" len="med"/>
+                      <a:tailEnd type="none" w="med" len="med"/>
+                    </a:lnT>
+                  </a:tcPr>
+                </a:tc>
+                <a:tc>
+                  <a:txBody>
+                    <a:bodyPr/>
+                    <a:lstStyle/>
+                    <a:p>
+                      <a:pPr algn="ctr"/>
+                      <a:r>
+                        <a:rPr lang="en-US" sz="1400" dirty="0" smtClean="0"/>
+                        <a:t>4</a:t>
+                      </a:r>
+                      <a:endParaRPr lang="en-US" sz="1400" dirty="0"/>
+                    </a:p>
+                  </a:txBody>
+                  <a:tcPr anchor="ctr">
+                    <a:lnT w="12700" cap="flat" cmpd="sng" algn="ctr">
+                      <a:solidFill>
+                        <a:schemeClr val="tx1"/>
+                      </a:solidFill>
+                      <a:prstDash val="solid"/>
+                      <a:round/>
+                      <a:headEnd type="none" w="med" len="med"/>
+                      <a:tailEnd type="none" w="med" len="med"/>
+                    </a:lnT>
+                  </a:tcPr>
+                </a:tc>
+                <a:tc>
+                  <a:txBody>
+                    <a:bodyPr/>
+                    <a:lstStyle/>
+                    <a:p>
+                      <a:pPr algn="ctr"/>
+                      <a:r>
+                        <a:rPr lang="en-US" sz="1400" dirty="0" smtClean="0"/>
+                        <a:t>5</a:t>
+                      </a:r>
+                      <a:endParaRPr lang="en-US" sz="1400" dirty="0"/>
+                    </a:p>
+                  </a:txBody>
+                  <a:tcPr anchor="ctr">
+                    <a:lnT w="12700" cap="flat" cmpd="sng" algn="ctr">
+                      <a:solidFill>
+                        <a:schemeClr val="tx1"/>
+                      </a:solidFill>
+                      <a:prstDash val="solid"/>
+                      <a:round/>
+                      <a:headEnd type="none" w="med" len="med"/>
+                      <a:tailEnd type="none" w="med" len="med"/>
+                    </a:lnT>
+                  </a:tcPr>
+                </a:tc>
+                <a:tc>
+                  <a:txBody>
+                    <a:bodyPr/>
+                    <a:lstStyle/>
+                    <a:p>
+                      <a:pPr algn="ctr"/>
+                      <a:r>
+                        <a:rPr lang="en-US" sz="1400" dirty="0" smtClean="0"/>
+                        <a:t>6</a:t>
+                      </a:r>
+                      <a:endParaRPr lang="en-US" sz="1400" dirty="0"/>
+                    </a:p>
+                  </a:txBody>
+                  <a:tcPr anchor="ctr">
+                    <a:lnT w="12700" cap="flat" cmpd="sng" algn="ctr">
+                      <a:solidFill>
+                        <a:schemeClr val="tx1"/>
+                      </a:solidFill>
+                      <a:prstDash val="solid"/>
+                      <a:round/>
+                      <a:headEnd type="none" w="med" len="med"/>
+                      <a:tailEnd type="none" w="med" len="med"/>
+                    </a:lnT>
+                  </a:tcPr>
+                </a:tc>
+                <a:tc>
+                  <a:txBody>
+                    <a:bodyPr/>
+                    <a:lstStyle/>
+                    <a:p>
+                      <a:pPr algn="ctr"/>
+                      <a:r>
+                        <a:rPr lang="en-US" sz="1400" dirty="0" smtClean="0"/>
+                        <a:t>7</a:t>
+                      </a:r>
+                      <a:endParaRPr lang="en-US" sz="1400" dirty="0"/>
+                    </a:p>
+                  </a:txBody>
+                  <a:tcPr anchor="ctr">
+                    <a:lnT w="12700" cap="flat" cmpd="sng" algn="ctr">
+                      <a:solidFill>
+                        <a:schemeClr val="tx1"/>
+                      </a:solidFill>
+                      <a:prstDash val="solid"/>
+                      <a:round/>
+                      <a:headEnd type="none" w="med" len="med"/>
+                      <a:tailEnd type="none" w="med" len="med"/>
+                    </a:lnT>
+                  </a:tcPr>
+                </a:tc>
+                <a:tc>
+                  <a:txBody>
+                    <a:bodyPr/>
+                    <a:lstStyle/>
+                    <a:p>
+                      <a:pPr algn="ctr"/>
+                      <a:r>
+                        <a:rPr lang="en-US" sz="1400" dirty="0" smtClean="0"/>
+                        <a:t>8</a:t>
+                      </a:r>
+                      <a:endParaRPr lang="en-US" sz="1400" dirty="0"/>
+                    </a:p>
+                  </a:txBody>
+                  <a:tcPr anchor="ctr">
+                    <a:lnT w="12700" cap="flat" cmpd="sng" algn="ctr">
+                      <a:solidFill>
+                        <a:schemeClr val="tx1"/>
+                      </a:solidFill>
+                      <a:prstDash val="solid"/>
+                      <a:round/>
+                      <a:headEnd type="none" w="med" len="med"/>
+                      <a:tailEnd type="none" w="med" len="med"/>
+                    </a:lnT>
+                  </a:tcPr>
+                </a:tc>
+                <a:tc>
+                  <a:txBody>
+                    <a:bodyPr/>
+                    <a:lstStyle/>
+                    <a:p>
+                      <a:pPr algn="ctr"/>
+                      <a:r>
+                        <a:rPr lang="en-US" sz="1400" dirty="0" smtClean="0"/>
+                        <a:t>9</a:t>
+                      </a:r>
+                      <a:endParaRPr lang="en-US" sz="1400" dirty="0"/>
+                    </a:p>
+                  </a:txBody>
+                  <a:tcPr anchor="ctr">
+                    <a:lnT w="12700" cap="flat" cmpd="sng" algn="ctr">
+                      <a:solidFill>
+                        <a:schemeClr val="tx1"/>
+                      </a:solidFill>
+                      <a:prstDash val="solid"/>
+                      <a:round/>
+                      <a:headEnd type="none" w="med" len="med"/>
+                      <a:tailEnd type="none" w="med" len="med"/>
+                    </a:lnT>
+                  </a:tcPr>
+                </a:tc>
+                <a:tc>
+                  <a:txBody>
+                    <a:bodyPr/>
+                    <a:lstStyle/>
+                    <a:p>
+                      <a:pPr algn="ctr"/>
+                      <a:r>
+                        <a:rPr lang="en-US" sz="1400" dirty="0" smtClean="0"/>
+                        <a:t>10</a:t>
+                      </a:r>
+                      <a:endParaRPr lang="en-US" sz="1400" dirty="0"/>
+                    </a:p>
+                  </a:txBody>
+                  <a:tcPr anchor="ctr">
+                    <a:lnT w="12700" cap="flat" cmpd="sng" algn="ctr">
+                      <a:solidFill>
+                        <a:schemeClr val="tx1"/>
+                      </a:solidFill>
+                      <a:prstDash val="solid"/>
+                      <a:round/>
+                      <a:headEnd type="none" w="med" len="med"/>
+                      <a:tailEnd type="none" w="med" len="med"/>
+                    </a:lnT>
+                  </a:tcPr>
+                </a:tc>
+                <a:tc>
+                  <a:txBody>
+                    <a:bodyPr/>
+                    <a:lstStyle/>
+                    <a:p>
+                      <a:pPr algn="ctr"/>
+                      <a:r>
+                        <a:rPr lang="en-US" sz="1400" dirty="0" smtClean="0"/>
+                        <a:t>11</a:t>
+                      </a:r>
+                      <a:endParaRPr lang="en-US" sz="1400" dirty="0"/>
+                    </a:p>
+                  </a:txBody>
+                  <a:tcPr anchor="ctr">
+                    <a:lnT w="12700" cap="flat" cmpd="sng" algn="ctr">
+                      <a:solidFill>
+                        <a:schemeClr val="tx1"/>
+                      </a:solidFill>
+                      <a:prstDash val="solid"/>
+                      <a:round/>
+                      <a:headEnd type="none" w="med" len="med"/>
+                      <a:tailEnd type="none" w="med" len="med"/>
+                    </a:lnT>
+                  </a:tcPr>
+                </a:tc>
+                <a:tc>
+                  <a:txBody>
+                    <a:bodyPr/>
+                    <a:lstStyle/>
+                    <a:p>
+                      <a:pPr algn="ctr"/>
+                      <a:r>
+                        <a:rPr lang="en-US" sz="1400" dirty="0" smtClean="0"/>
+                        <a:t>12</a:t>
+                      </a:r>
+                      <a:endParaRPr lang="en-US" sz="1400" dirty="0"/>
+                    </a:p>
+                  </a:txBody>
+                  <a:tcPr anchor="ctr">
+                    <a:lnT w="12700" cap="flat" cmpd="sng" algn="ctr">
+                      <a:solidFill>
+                        <a:schemeClr val="tx1"/>
+                      </a:solidFill>
+                      <a:prstDash val="solid"/>
+                      <a:round/>
+                      <a:headEnd type="none" w="med" len="med"/>
+                      <a:tailEnd type="none" w="med" len="med"/>
+                    </a:lnT>
+                  </a:tcPr>
+                </a:tc>
+                <a:tc>
+                  <a:txBody>
+                    <a:bodyPr/>
+                    <a:lstStyle/>
+                    <a:p>
+                      <a:pPr algn="ctr"/>
+                      <a:r>
+                        <a:rPr lang="en-US" sz="1400" dirty="0" smtClean="0"/>
+                        <a:t>13</a:t>
+                      </a:r>
+                      <a:endParaRPr lang="en-US" sz="1400" dirty="0"/>
+                    </a:p>
+                  </a:txBody>
+                  <a:tcPr anchor="ctr">
+                    <a:lnT w="12700" cap="flat" cmpd="sng" algn="ctr">
+                      <a:solidFill>
+                        <a:schemeClr val="tx1"/>
+                      </a:solidFill>
+                      <a:prstDash val="solid"/>
+                      <a:round/>
+                      <a:headEnd type="none" w="med" len="med"/>
+                      <a:tailEnd type="none" w="med" len="med"/>
+                    </a:lnT>
+                  </a:tcPr>
+                </a:tc>
+                <a:tc>
+                  <a:txBody>
+                    <a:bodyPr/>
+                    <a:lstStyle/>
+                    <a:p>
+                      <a:pPr algn="ctr"/>
+                      <a:r>
+                        <a:rPr lang="en-US" sz="1400" dirty="0" smtClean="0"/>
+                        <a:t>14</a:t>
+                      </a:r>
+                      <a:endParaRPr lang="en-US" sz="1400" dirty="0"/>
+                    </a:p>
+                  </a:txBody>
+                  <a:tcPr anchor="ctr">
+                    <a:lnT w="12700" cap="flat" cmpd="sng" algn="ctr">
+                      <a:solidFill>
+                        <a:schemeClr val="tx1"/>
+                      </a:solidFill>
+                      <a:prstDash val="solid"/>
+                      <a:round/>
+                      <a:headEnd type="none" w="med" len="med"/>
+                      <a:tailEnd type="none" w="med" len="med"/>
+                    </a:lnT>
+                  </a:tcPr>
+                </a:tc>
+                <a:tc>
+                  <a:txBody>
+                    <a:bodyPr/>
+                    <a:lstStyle/>
+                    <a:p>
+                      <a:pPr algn="ctr"/>
+                      <a:r>
+                        <a:rPr lang="en-US" sz="1400" dirty="0" smtClean="0"/>
+                        <a:t>15</a:t>
+                      </a:r>
+                      <a:endParaRPr lang="en-US" sz="1400" dirty="0"/>
+                    </a:p>
+                  </a:txBody>
+                  <a:tcPr anchor="ctr">
+                    <a:lnT w="12700" cap="flat" cmpd="sng" algn="ctr">
+                      <a:solidFill>
+                        <a:schemeClr val="tx1"/>
+                      </a:solidFill>
+                      <a:prstDash val="solid"/>
+                      <a:round/>
+                      <a:headEnd type="none" w="med" len="med"/>
+                      <a:tailEnd type="none" w="med" len="med"/>
+                    </a:lnT>
+                  </a:tcPr>
+                </a:tc>
+                <a:tc>
+                  <a:txBody>
+                    <a:bodyPr/>
+                    <a:lstStyle/>
+                    <a:p>
+                      <a:pPr algn="ctr"/>
+                      <a:r>
+                        <a:rPr lang="en-US" sz="1400" dirty="0" smtClean="0"/>
+                        <a:t>16</a:t>
+                      </a:r>
+                      <a:endParaRPr lang="en-US" sz="1400" dirty="0"/>
+                    </a:p>
+                  </a:txBody>
+                  <a:tcPr anchor="ctr">
+                    <a:lnT w="12700" cap="flat" cmpd="sng" algn="ctr">
+                      <a:solidFill>
+                        <a:schemeClr val="tx1"/>
+                      </a:solidFill>
+                      <a:prstDash val="solid"/>
+                      <a:round/>
+                      <a:headEnd type="none" w="med" len="med"/>
+                      <a:tailEnd type="none" w="med" len="med"/>
+                    </a:lnT>
+                  </a:tcPr>
+                </a:tc>
+                <a:tc>
+                  <a:txBody>
+                    <a:bodyPr/>
+                    <a:lstStyle/>
+                    <a:p>
+                      <a:pPr algn="ctr"/>
+                      <a:r>
+                        <a:rPr lang="en-US" sz="1400" b="0" dirty="0" smtClean="0"/>
+                        <a:t>17</a:t>
+                      </a:r>
+                      <a:endParaRPr lang="en-US" sz="1400" b="0" dirty="0"/>
+                    </a:p>
+                  </a:txBody>
+                  <a:tcPr anchor="ctr">
+                    <a:lnT w="12700" cap="flat" cmpd="sng" algn="ctr">
+                      <a:solidFill>
+                        <a:schemeClr val="tx1"/>
+                      </a:solidFill>
+                      <a:prstDash val="solid"/>
+                      <a:round/>
+                      <a:headEnd type="none" w="med" len="med"/>
+                      <a:tailEnd type="none" w="med" len="med"/>
+                    </a:lnT>
+                  </a:tcPr>
+                </a:tc>
+                <a:tc>
+                  <a:txBody>
+                    <a:bodyPr/>
+                    <a:lstStyle/>
+                    <a:p>
+                      <a:pPr algn="ctr"/>
+                      <a:r>
+                        <a:rPr lang="en-US" sz="1400" b="0" dirty="0" smtClean="0"/>
+                        <a:t>18</a:t>
+                      </a:r>
+                      <a:endParaRPr lang="en-US" sz="1400" b="0" dirty="0"/>
+                    </a:p>
+                  </a:txBody>
+                  <a:tcPr anchor="ctr">
+                    <a:lnT w="12700" cap="flat" cmpd="sng" algn="ctr">
+                      <a:solidFill>
+                        <a:schemeClr val="tx1"/>
+                      </a:solidFill>
+                      <a:prstDash val="solid"/>
+                      <a:round/>
+                      <a:headEnd type="none" w="med" len="med"/>
+                      <a:tailEnd type="none" w="med" len="med"/>
+                    </a:lnT>
+                  </a:tcPr>
+                </a:tc>
+                <a:tc>
+                  <a:txBody>
+                    <a:bodyPr/>
+                    <a:lstStyle/>
+                    <a:p>
+                      <a:pPr algn="ctr"/>
+                      <a:r>
+                        <a:rPr lang="en-US" sz="1400" b="0" dirty="0" smtClean="0"/>
+                        <a:t>19</a:t>
+                      </a:r>
+                      <a:endParaRPr lang="en-US" sz="1400" b="0" dirty="0"/>
+                    </a:p>
+                  </a:txBody>
+                  <a:tcPr anchor="ctr">
+                    <a:lnT w="12700" cap="flat" cmpd="sng" algn="ctr">
+                      <a:solidFill>
+                        <a:schemeClr val="tx1"/>
+                      </a:solidFill>
+                      <a:prstDash val="solid"/>
+                      <a:round/>
+                      <a:headEnd type="none" w="med" len="med"/>
+                      <a:tailEnd type="none" w="med" len="med"/>
+                    </a:lnT>
+                  </a:tcPr>
+                </a:tc>
+                <a:tc>
+                  <a:txBody>
+                    <a:bodyPr/>
+                    <a:lstStyle/>
+                    <a:p>
+                      <a:pPr algn="ctr"/>
+                      <a:r>
+                        <a:rPr lang="en-US" sz="1400" b="0" dirty="0" smtClean="0"/>
+                        <a:t>20</a:t>
+                      </a:r>
+                      <a:endParaRPr lang="en-US" sz="1400" b="0" dirty="0"/>
+                    </a:p>
+                  </a:txBody>
+                  <a:tcPr anchor="ctr">
+                    <a:lnT w="12700" cap="flat" cmpd="sng" algn="ctr">
+                      <a:solidFill>
+                        <a:schemeClr val="tx1"/>
+                      </a:solidFill>
+                      <a:prstDash val="solid"/>
+                      <a:round/>
+                      <a:headEnd type="none" w="med" len="med"/>
+                      <a:tailEnd type="none" w="med" len="med"/>
+                    </a:lnT>
+                  </a:tcPr>
+                </a:tc>
+                <a:tc>
+                  <a:txBody>
+                    <a:bodyPr/>
+                    <a:lstStyle/>
+                    <a:p>
+                      <a:pPr algn="ctr"/>
+                      <a:r>
+                        <a:rPr lang="en-US" sz="1400" b="0" dirty="0" smtClean="0"/>
+                        <a:t>21</a:t>
+                      </a:r>
+                      <a:endParaRPr lang="en-US" sz="1400" b="0" dirty="0"/>
+                    </a:p>
+                  </a:txBody>
+                  <a:tcPr anchor="ctr">
+                    <a:lnT w="12700" cap="flat" cmpd="sng" algn="ctr">
+                      <a:solidFill>
+                        <a:schemeClr val="tx1"/>
+                      </a:solidFill>
+                      <a:prstDash val="solid"/>
+                      <a:round/>
+                      <a:headEnd type="none" w="med" len="med"/>
+                      <a:tailEnd type="none" w="med" len="med"/>
+                    </a:lnT>
+                  </a:tcPr>
+                </a:tc>
+                <a:tc>
+                  <a:txBody>
+                    <a:bodyPr/>
+                    <a:lstStyle/>
+                    <a:p>
+                      <a:pPr algn="ctr"/>
+                      <a:r>
+                        <a:rPr lang="en-US" sz="1400" b="0" dirty="0" smtClean="0"/>
+                        <a:t>22</a:t>
+                      </a:r>
+                      <a:endParaRPr lang="en-US" sz="1400" b="0" dirty="0"/>
+                    </a:p>
+                  </a:txBody>
+                  <a:tcPr anchor="ctr">
+                    <a:lnT w="12700" cap="flat" cmpd="sng" algn="ctr">
+                      <a:solidFill>
+                        <a:schemeClr val="tx1"/>
+                      </a:solidFill>
+                      <a:prstDash val="solid"/>
+                      <a:round/>
+                      <a:headEnd type="none" w="med" len="med"/>
+                      <a:tailEnd type="none" w="med" len="med"/>
+                    </a:lnT>
+                  </a:tcPr>
+                </a:tc>
+                <a:tc>
+                  <a:txBody>
+                    <a:bodyPr/>
+                    <a:lstStyle/>
+                    <a:p>
+                      <a:pPr algn="ctr"/>
+                      <a:r>
+                        <a:rPr lang="en-US" sz="1400" b="0" dirty="0" smtClean="0"/>
+                        <a:t>23</a:t>
+                      </a:r>
+                      <a:endParaRPr lang="en-US" sz="1400" b="0" dirty="0"/>
+                    </a:p>
+                  </a:txBody>
+                  <a:tcPr anchor="ctr">
+                    <a:lnT w="12700" cap="flat" cmpd="sng" algn="ctr">
+                      <a:solidFill>
+                        <a:schemeClr val="tx1"/>
+                      </a:solidFill>
+                      <a:prstDash val="solid"/>
+                      <a:round/>
+                      <a:headEnd type="none" w="med" len="med"/>
+                      <a:tailEnd type="none" w="med" len="med"/>
+                    </a:lnT>
+                  </a:tcPr>
+                </a:tc>
+                <a:tc>
+                  <a:txBody>
+                    <a:bodyPr/>
+                    <a:lstStyle/>
+                    <a:p>
+                      <a:pPr algn="ctr"/>
+                      <a:r>
+                        <a:rPr lang="en-US" sz="1400" b="0" dirty="0" smtClean="0"/>
+                        <a:t>24</a:t>
+                      </a:r>
+                      <a:endParaRPr lang="en-US" sz="1400" b="0" dirty="0"/>
+                    </a:p>
+                  </a:txBody>
+                  <a:tcPr anchor="ctr">
+                    <a:lnT w="12700" cap="flat" cmpd="sng" algn="ctr">
+                      <a:solidFill>
+                        <a:schemeClr val="tx1"/>
+                      </a:solidFill>
+                      <a:prstDash val="solid"/>
+                      <a:round/>
+                      <a:headEnd type="none" w="med" len="med"/>
+                      <a:tailEnd type="none" w="med" len="med"/>
+                    </a:lnT>
+                  </a:tcPr>
+                </a:tc>
+                <a:tc>
+                  <a:txBody>
+                    <a:bodyPr/>
+                    <a:lstStyle/>
+                    <a:p>
+                      <a:pPr algn="ctr"/>
+                      <a:r>
+                        <a:rPr lang="en-US" sz="1400" b="0" dirty="0" smtClean="0"/>
+                        <a:t>25</a:t>
+                      </a:r>
+                      <a:endParaRPr lang="en-US" sz="1400" b="0" dirty="0"/>
+                    </a:p>
+                  </a:txBody>
+                  <a:tcPr anchor="ctr">
+                    <a:lnT w="12700" cap="flat" cmpd="sng" algn="ctr">
+                      <a:solidFill>
+                        <a:schemeClr val="tx1"/>
+                      </a:solidFill>
+                      <a:prstDash val="solid"/>
+                      <a:round/>
+                      <a:headEnd type="none" w="med" len="med"/>
+                      <a:tailEnd type="none" w="med" len="med"/>
+                    </a:lnT>
+                  </a:tcPr>
+                </a:tc>
+                <a:tc>
+                  <a:txBody>
+                    <a:bodyPr/>
+                    <a:lstStyle/>
+                    <a:p>
+                      <a:pPr marL="0" marR="0" lvl="0" indent="0" algn="ctr" defTabSz="914400" rtl="0" eaLnBrk="1" fontAlgn="auto" latinLnBrk="0" hangingPunct="1">
+                        <a:lnSpc>
+                          <a:spcPct val="100000"/>
+                        </a:lnSpc>
+                        <a:spcBef>
+                          <a:spcPts val="0"/>
+                        </a:spcBef>
+                        <a:spcAft>
+                          <a:spcPts val="0"/>
+                        </a:spcAft>
+                        <a:buClrTx/>
+                        <a:buSzTx/>
+                        <a:buFontTx/>
+                        <a:buNone/>
+                        <a:tabLst/>
+                        <a:defRPr/>
+                      </a:pPr>
+                      <a:r>
+                        <a:rPr lang="en-US" sz="1400" b="1" dirty="0" smtClean="0"/>
+                        <a:t>Total</a:t>
+                      </a:r>
+                    </a:p>
+                  </a:txBody>
+                  <a:tcPr anchor="ctr">
+                    <a:lnR w="12700" cap="flat" cmpd="sng" algn="ctr">
+                      <a:solidFill>
+                        <a:schemeClr val="tx1"/>
+                      </a:solidFill>
+                      <a:prstDash val="solid"/>
+                      <a:round/>
+                      <a:headEnd type="none" w="med" len="med"/>
+                      <a:tailEnd type="none" w="med" len="med"/>
+                    </a:lnR>
+                    <a:lnT w="12700" cap="flat" cmpd="sng" algn="ctr">
+                      <a:solidFill>
+                        <a:schemeClr val="tx1"/>
+                      </a:solidFill>
+                      <a:prstDash val="solid"/>
+                      <a:round/>
+                      <a:headEnd type="none" w="med" len="med"/>
+                      <a:tailEnd type="none" w="med" len="med"/>
+                    </a:lnT>
+                  </a:tcPr>
+                </a:tc>
+                <a:extLst>
+                  <a:ext uri="{0D108BD9-81ED-4DB2-BD59-A6C34878D82A}">
+                    <a16:rowId xmlns:a16="http://schemas.microsoft.com/office/drawing/2014/main" val="2810899241"/>
+                  </a:ext>
+                </a:extLst>
+              </a:tr>
+              <a:tr h="489882">
+                <a:tc vMerge="1">
+                  <a:txBody>
+                    <a:bodyPr/>
+                    <a:lstStyle/>
+                    <a:p>
+                      <a:endParaRPr lang="en-US" dirty="0"/>
+                    </a:p>
+                  </a:txBody>
+                  <a:tcPr/>
+                </a:tc>
+                <a:tc>
+                  <a:txBody>
+                    <a:bodyPr/>
+                    <a:lstStyle/>
+                    <a:p>
+                      <a:pPr algn="ctr"/>
+                      <a:r>
+                        <a:rPr lang="en-US" sz="1400" dirty="0" smtClean="0"/>
+                        <a:t>37</a:t>
+                      </a:r>
+                      <a:endParaRPr lang="en-US" sz="1400" dirty="0"/>
+                    </a:p>
+                  </a:txBody>
+                  <a:tcPr anchor="ctr">
+                    <a:lnB w="12700" cap="flat" cmpd="sng" algn="ctr">
+                      <a:solidFill>
+                        <a:schemeClr val="tx1"/>
+                      </a:solidFill>
+                      <a:prstDash val="solid"/>
+                      <a:round/>
+                      <a:headEnd type="none" w="med" len="med"/>
+                      <a:tailEnd type="none" w="med" len="med"/>
+                    </a:lnB>
+                  </a:tcPr>
+                </a:tc>
+                <a:tc>
+                  <a:txBody>
+                    <a:bodyPr/>
+                    <a:lstStyle/>
+                    <a:p>
+                      <a:pPr algn="ctr"/>
+                      <a:r>
+                        <a:rPr lang="en-US" sz="1400" dirty="0" smtClean="0"/>
+                        <a:t>19</a:t>
+                      </a:r>
+                      <a:endParaRPr lang="en-US" sz="1400" dirty="0"/>
+                    </a:p>
+                  </a:txBody>
+                  <a:tcPr anchor="ctr">
+                    <a:lnB w="12700" cap="flat" cmpd="sng" algn="ctr">
+                      <a:solidFill>
+                        <a:schemeClr val="tx1"/>
+                      </a:solidFill>
+                      <a:prstDash val="solid"/>
+                      <a:round/>
+                      <a:headEnd type="none" w="med" len="med"/>
+                      <a:tailEnd type="none" w="med" len="med"/>
+                    </a:lnB>
+                  </a:tcPr>
+                </a:tc>
+                <a:tc>
+                  <a:txBody>
+                    <a:bodyPr/>
+                    <a:lstStyle/>
+                    <a:p>
+                      <a:pPr algn="ctr"/>
+                      <a:r>
+                        <a:rPr lang="en-US" sz="1400" dirty="0" smtClean="0"/>
+                        <a:t>20</a:t>
+                      </a:r>
+                      <a:endParaRPr lang="en-US" sz="1400" dirty="0"/>
+                    </a:p>
+                  </a:txBody>
+                  <a:tcPr anchor="ctr">
+                    <a:lnB w="12700" cap="flat" cmpd="sng" algn="ctr">
+                      <a:solidFill>
+                        <a:schemeClr val="tx1"/>
+                      </a:solidFill>
+                      <a:prstDash val="solid"/>
+                      <a:round/>
+                      <a:headEnd type="none" w="med" len="med"/>
+                      <a:tailEnd type="none" w="med" len="med"/>
+                    </a:lnB>
+                  </a:tcPr>
+                </a:tc>
+                <a:tc>
+                  <a:txBody>
+                    <a:bodyPr/>
+                    <a:lstStyle/>
+                    <a:p>
+                      <a:pPr algn="ctr"/>
+                      <a:r>
+                        <a:rPr lang="en-US" sz="1400" dirty="0" smtClean="0"/>
+                        <a:t>8</a:t>
+                      </a:r>
+                      <a:endParaRPr lang="en-US" sz="1400" dirty="0"/>
+                    </a:p>
+                  </a:txBody>
+                  <a:tcPr anchor="ctr">
+                    <a:lnB w="12700" cap="flat" cmpd="sng" algn="ctr">
+                      <a:solidFill>
+                        <a:schemeClr val="tx1"/>
+                      </a:solidFill>
+                      <a:prstDash val="solid"/>
+                      <a:round/>
+                      <a:headEnd type="none" w="med" len="med"/>
+                      <a:tailEnd type="none" w="med" len="med"/>
+                    </a:lnB>
+                  </a:tcPr>
+                </a:tc>
+                <a:tc>
+                  <a:txBody>
+                    <a:bodyPr/>
+                    <a:lstStyle/>
+                    <a:p>
+                      <a:pPr algn="ctr"/>
+                      <a:r>
+                        <a:rPr lang="en-US" sz="1400" dirty="0" smtClean="0"/>
+                        <a:t>7</a:t>
+                      </a:r>
+                      <a:endParaRPr lang="en-US" sz="1400" dirty="0"/>
+                    </a:p>
+                  </a:txBody>
+                  <a:tcPr anchor="ctr">
+                    <a:lnB w="12700" cap="flat" cmpd="sng" algn="ctr">
+                      <a:solidFill>
+                        <a:schemeClr val="tx1"/>
+                      </a:solidFill>
+                      <a:prstDash val="solid"/>
+                      <a:round/>
+                      <a:headEnd type="none" w="med" len="med"/>
+                      <a:tailEnd type="none" w="med" len="med"/>
+                    </a:lnB>
+                  </a:tcPr>
+                </a:tc>
+                <a:tc>
+                  <a:txBody>
+                    <a:bodyPr/>
+                    <a:lstStyle/>
+                    <a:p>
+                      <a:pPr algn="ctr"/>
+                      <a:r>
+                        <a:rPr lang="en-US" sz="1400" dirty="0" smtClean="0"/>
+                        <a:t>2</a:t>
+                      </a:r>
+                      <a:endParaRPr lang="en-US" sz="1400" dirty="0"/>
+                    </a:p>
+                  </a:txBody>
+                  <a:tcPr anchor="ctr">
+                    <a:lnB w="12700" cap="flat" cmpd="sng" algn="ctr">
+                      <a:solidFill>
+                        <a:schemeClr val="tx1"/>
+                      </a:solidFill>
+                      <a:prstDash val="solid"/>
+                      <a:round/>
+                      <a:headEnd type="none" w="med" len="med"/>
+                      <a:tailEnd type="none" w="med" len="med"/>
+                    </a:lnB>
+                  </a:tcPr>
+                </a:tc>
+                <a:tc>
+                  <a:txBody>
+                    <a:bodyPr/>
+                    <a:lstStyle/>
+                    <a:p>
+                      <a:pPr algn="ctr"/>
+                      <a:r>
+                        <a:rPr lang="en-US" sz="1400" dirty="0" smtClean="0"/>
+                        <a:t>3</a:t>
+                      </a:r>
+                      <a:endParaRPr lang="en-US" sz="1400" dirty="0"/>
+                    </a:p>
+                  </a:txBody>
+                  <a:tcPr anchor="ctr">
+                    <a:lnB w="12700" cap="flat" cmpd="sng" algn="ctr">
+                      <a:solidFill>
+                        <a:schemeClr val="tx1"/>
+                      </a:solidFill>
+                      <a:prstDash val="solid"/>
+                      <a:round/>
+                      <a:headEnd type="none" w="med" len="med"/>
+                      <a:tailEnd type="none" w="med" len="med"/>
+                    </a:lnB>
+                  </a:tcPr>
+                </a:tc>
+                <a:tc>
+                  <a:txBody>
+                    <a:bodyPr/>
+                    <a:lstStyle/>
+                    <a:p>
+                      <a:pPr algn="ctr"/>
+                      <a:r>
+                        <a:rPr lang="en-US" sz="1400" dirty="0" smtClean="0"/>
+                        <a:t>4</a:t>
+                      </a:r>
+                      <a:endParaRPr lang="en-US" sz="1400" dirty="0"/>
+                    </a:p>
+                  </a:txBody>
+                  <a:tcPr anchor="ctr">
+                    <a:lnB w="12700" cap="flat" cmpd="sng" algn="ctr">
+                      <a:solidFill>
+                        <a:schemeClr val="tx1"/>
+                      </a:solidFill>
+                      <a:prstDash val="solid"/>
+                      <a:round/>
+                      <a:headEnd type="none" w="med" len="med"/>
+                      <a:tailEnd type="none" w="med" len="med"/>
+                    </a:lnB>
+                  </a:tcPr>
+                </a:tc>
+                <a:tc>
+                  <a:txBody>
+                    <a:bodyPr/>
+                    <a:lstStyle/>
+                    <a:p>
+                      <a:pPr algn="ctr"/>
+                      <a:r>
+                        <a:rPr lang="en-US" sz="1400" dirty="0" smtClean="0"/>
+                        <a:t>4</a:t>
+                      </a:r>
+                      <a:endParaRPr lang="en-US" sz="1400" dirty="0"/>
+                    </a:p>
+                  </a:txBody>
+                  <a:tcPr anchor="ctr">
+                    <a:lnB w="12700" cap="flat" cmpd="sng" algn="ctr">
+                      <a:solidFill>
+                        <a:schemeClr val="tx1"/>
+                      </a:solidFill>
+                      <a:prstDash val="solid"/>
+                      <a:round/>
+                      <a:headEnd type="none" w="med" len="med"/>
+                      <a:tailEnd type="none" w="med" len="med"/>
+                    </a:lnB>
+                  </a:tcPr>
+                </a:tc>
+                <a:tc>
+                  <a:txBody>
+                    <a:bodyPr/>
+                    <a:lstStyle/>
+                    <a:p>
+                      <a:pPr algn="ctr"/>
+                      <a:r>
+                        <a:rPr lang="en-US" sz="1400" dirty="0" smtClean="0"/>
+                        <a:t>4</a:t>
+                      </a:r>
+                      <a:endParaRPr lang="en-US" sz="1400" dirty="0"/>
+                    </a:p>
+                  </a:txBody>
+                  <a:tcPr anchor="ctr">
+                    <a:lnB w="12700" cap="flat" cmpd="sng" algn="ctr">
+                      <a:solidFill>
+                        <a:schemeClr val="tx1"/>
+                      </a:solidFill>
+                      <a:prstDash val="solid"/>
+                      <a:round/>
+                      <a:headEnd type="none" w="med" len="med"/>
+                      <a:tailEnd type="none" w="med" len="med"/>
+                    </a:lnB>
+                  </a:tcPr>
+                </a:tc>
+                <a:tc>
+                  <a:txBody>
+                    <a:bodyPr/>
+                    <a:lstStyle/>
+                    <a:p>
+                      <a:pPr algn="ctr"/>
+                      <a:r>
+                        <a:rPr lang="en-US" sz="1400" dirty="0" smtClean="0"/>
+                        <a:t>2</a:t>
+                      </a:r>
+                      <a:endParaRPr lang="en-US" sz="1400" dirty="0"/>
+                    </a:p>
+                  </a:txBody>
+                  <a:tcPr anchor="ctr">
+                    <a:lnB w="12700" cap="flat" cmpd="sng" algn="ctr">
+                      <a:solidFill>
+                        <a:schemeClr val="tx1"/>
+                      </a:solidFill>
+                      <a:prstDash val="solid"/>
+                      <a:round/>
+                      <a:headEnd type="none" w="med" len="med"/>
+                      <a:tailEnd type="none" w="med" len="med"/>
+                    </a:lnB>
+                  </a:tcPr>
+                </a:tc>
+                <a:tc>
+                  <a:txBody>
+                    <a:bodyPr/>
+                    <a:lstStyle/>
+                    <a:p>
+                      <a:pPr algn="ctr"/>
+                      <a:r>
+                        <a:rPr lang="en-US" sz="1400" dirty="0" smtClean="0"/>
+                        <a:t>3</a:t>
+                      </a:r>
+                      <a:endParaRPr lang="en-US" sz="1400" dirty="0"/>
+                    </a:p>
+                  </a:txBody>
+                  <a:tcPr anchor="ctr">
+                    <a:lnB w="12700" cap="flat" cmpd="sng" algn="ctr">
+                      <a:solidFill>
+                        <a:schemeClr val="tx1"/>
+                      </a:solidFill>
+                      <a:prstDash val="solid"/>
+                      <a:round/>
+                      <a:headEnd type="none" w="med" len="med"/>
+                      <a:tailEnd type="none" w="med" len="med"/>
+                    </a:lnB>
+                  </a:tcPr>
+                </a:tc>
+                <a:tc>
+                  <a:txBody>
+                    <a:bodyPr/>
+                    <a:lstStyle/>
+                    <a:p>
+                      <a:pPr algn="ctr"/>
+                      <a:r>
+                        <a:rPr lang="en-US" sz="1400" dirty="0" smtClean="0"/>
+                        <a:t>1</a:t>
+                      </a:r>
+                      <a:endParaRPr lang="en-US" sz="1400" dirty="0"/>
+                    </a:p>
+                  </a:txBody>
+                  <a:tcPr anchor="ctr">
+                    <a:lnB w="12700" cap="flat" cmpd="sng" algn="ctr">
+                      <a:solidFill>
+                        <a:schemeClr val="tx1"/>
+                      </a:solidFill>
+                      <a:prstDash val="solid"/>
+                      <a:round/>
+                      <a:headEnd type="none" w="med" len="med"/>
+                      <a:tailEnd type="none" w="med" len="med"/>
+                    </a:lnB>
+                  </a:tcPr>
+                </a:tc>
+                <a:tc>
+                  <a:txBody>
+                    <a:bodyPr/>
+                    <a:lstStyle/>
+                    <a:p>
+                      <a:pPr algn="ctr"/>
+                      <a:r>
+                        <a:rPr lang="en-US" sz="1400" dirty="0" smtClean="0"/>
+                        <a:t>1</a:t>
+                      </a:r>
+                      <a:endParaRPr lang="en-US" sz="1400" dirty="0"/>
+                    </a:p>
+                  </a:txBody>
+                  <a:tcPr anchor="ctr">
+                    <a:lnB w="12700" cap="flat" cmpd="sng" algn="ctr">
+                      <a:solidFill>
+                        <a:schemeClr val="tx1"/>
+                      </a:solidFill>
+                      <a:prstDash val="solid"/>
+                      <a:round/>
+                      <a:headEnd type="none" w="med" len="med"/>
+                      <a:tailEnd type="none" w="med" len="med"/>
+                    </a:lnB>
+                  </a:tcPr>
+                </a:tc>
+                <a:tc>
+                  <a:txBody>
+                    <a:bodyPr/>
+                    <a:lstStyle/>
+                    <a:p>
+                      <a:pPr algn="ctr"/>
+                      <a:r>
+                        <a:rPr lang="en-US" sz="1400" dirty="0" smtClean="0"/>
+                        <a:t>1</a:t>
+                      </a:r>
+                      <a:endParaRPr lang="en-US" sz="1400" dirty="0"/>
+                    </a:p>
+                  </a:txBody>
+                  <a:tcPr anchor="ctr">
+                    <a:lnB w="12700" cap="flat" cmpd="sng" algn="ctr">
+                      <a:solidFill>
+                        <a:schemeClr val="tx1"/>
+                      </a:solidFill>
+                      <a:prstDash val="solid"/>
+                      <a:round/>
+                      <a:headEnd type="none" w="med" len="med"/>
+                      <a:tailEnd type="none" w="med" len="med"/>
+                    </a:lnB>
+                  </a:tcPr>
+                </a:tc>
+                <a:tc>
+                  <a:txBody>
+                    <a:bodyPr/>
+                    <a:lstStyle/>
+                    <a:p>
+                      <a:pPr algn="ctr"/>
+                      <a:r>
+                        <a:rPr lang="en-US" sz="1400" dirty="0" smtClean="0">
+                          <a:solidFill>
+                            <a:schemeClr val="bg1">
+                              <a:lumMod val="50000"/>
+                            </a:schemeClr>
+                          </a:solidFill>
+                        </a:rPr>
+                        <a:t>-</a:t>
+                      </a:r>
+                      <a:endParaRPr lang="en-US" sz="1400" dirty="0">
+                        <a:solidFill>
+                          <a:schemeClr val="bg1">
+                            <a:lumMod val="50000"/>
+                          </a:schemeClr>
+                        </a:solidFill>
+                      </a:endParaRPr>
+                    </a:p>
+                  </a:txBody>
+                  <a:tcPr anchor="ctr">
+                    <a:lnB w="12700" cap="flat" cmpd="sng" algn="ctr">
+                      <a:solidFill>
+                        <a:schemeClr val="tx1"/>
+                      </a:solidFill>
+                      <a:prstDash val="solid"/>
+                      <a:round/>
+                      <a:headEnd type="none" w="med" len="med"/>
+                      <a:tailEnd type="none" w="med" len="med"/>
+                    </a:lnB>
+                  </a:tcPr>
+                </a:tc>
+                <a:tc>
+                  <a:txBody>
+                    <a:bodyPr/>
+                    <a:lstStyle/>
+                    <a:p>
+                      <a:pPr algn="ctr"/>
+                      <a:r>
+                        <a:rPr lang="en-US" sz="1400" dirty="0" smtClean="0"/>
+                        <a:t>1</a:t>
+                      </a:r>
+                      <a:endParaRPr lang="en-US" sz="1400" dirty="0"/>
+                    </a:p>
+                  </a:txBody>
+                  <a:tcPr anchor="ctr">
+                    <a:lnB w="12700" cap="flat" cmpd="sng" algn="ctr">
+                      <a:solidFill>
+                        <a:schemeClr val="tx1"/>
+                      </a:solidFill>
+                      <a:prstDash val="solid"/>
+                      <a:round/>
+                      <a:headEnd type="none" w="med" len="med"/>
+                      <a:tailEnd type="none" w="med" len="med"/>
+                    </a:lnB>
+                  </a:tcPr>
+                </a:tc>
+                <a:tc>
+                  <a:txBody>
+                    <a:bodyPr/>
+                    <a:lstStyle/>
+                    <a:p>
+                      <a:pPr algn="ctr"/>
+                      <a:r>
+                        <a:rPr lang="en-US" sz="1400" dirty="0" smtClean="0">
+                          <a:solidFill>
+                            <a:schemeClr val="bg1">
+                              <a:lumMod val="50000"/>
+                            </a:schemeClr>
+                          </a:solidFill>
+                        </a:rPr>
+                        <a:t>-</a:t>
+                      </a:r>
+                      <a:endParaRPr lang="en-US" sz="1400" dirty="0">
+                        <a:solidFill>
+                          <a:schemeClr val="bg1">
+                            <a:lumMod val="50000"/>
+                          </a:schemeClr>
+                        </a:solidFill>
+                      </a:endParaRPr>
+                    </a:p>
+                  </a:txBody>
+                  <a:tcPr anchor="ctr">
+                    <a:lnB w="12700" cap="flat" cmpd="sng" algn="ctr">
+                      <a:solidFill>
+                        <a:schemeClr val="tx1"/>
+                      </a:solidFill>
+                      <a:prstDash val="solid"/>
+                      <a:round/>
+                      <a:headEnd type="none" w="med" len="med"/>
+                      <a:tailEnd type="none" w="med" len="med"/>
+                    </a:lnB>
+                  </a:tcPr>
+                </a:tc>
+                <a:tc>
+                  <a:txBody>
+                    <a:bodyPr/>
+                    <a:lstStyle/>
+                    <a:p>
+                      <a:pPr algn="ctr"/>
+                      <a:r>
+                        <a:rPr lang="en-US" sz="1400" dirty="0" smtClean="0">
+                          <a:solidFill>
+                            <a:schemeClr val="bg1">
+                              <a:lumMod val="50000"/>
+                            </a:schemeClr>
+                          </a:solidFill>
+                        </a:rPr>
+                        <a:t>-</a:t>
+                      </a:r>
+                      <a:endParaRPr lang="en-US" sz="1400" dirty="0">
+                        <a:solidFill>
+                          <a:schemeClr val="bg1">
+                            <a:lumMod val="50000"/>
+                          </a:schemeClr>
+                        </a:solidFill>
+                      </a:endParaRPr>
+                    </a:p>
+                  </a:txBody>
+                  <a:tcPr anchor="ctr">
+                    <a:lnB w="12700" cap="flat" cmpd="sng" algn="ctr">
+                      <a:solidFill>
+                        <a:schemeClr val="tx1"/>
+                      </a:solidFill>
+                      <a:prstDash val="solid"/>
+                      <a:round/>
+                      <a:headEnd type="none" w="med" len="med"/>
+                      <a:tailEnd type="none" w="med" len="med"/>
+                    </a:lnB>
+                  </a:tcPr>
+                </a:tc>
+                <a:tc>
+                  <a:txBody>
+                    <a:bodyPr/>
+                    <a:lstStyle/>
+                    <a:p>
+                      <a:pPr algn="ctr"/>
+                      <a:r>
+                        <a:rPr lang="en-US" sz="1400" dirty="0" smtClean="0"/>
+                        <a:t>1</a:t>
+                      </a:r>
+                      <a:endParaRPr lang="en-US" sz="1400" dirty="0"/>
+                    </a:p>
+                  </a:txBody>
+                  <a:tcPr anchor="ctr">
+                    <a:lnB w="12700" cap="flat" cmpd="sng" algn="ctr">
+                      <a:solidFill>
+                        <a:schemeClr val="tx1"/>
+                      </a:solidFill>
+                      <a:prstDash val="solid"/>
+                      <a:round/>
+                      <a:headEnd type="none" w="med" len="med"/>
+                      <a:tailEnd type="none" w="med" len="med"/>
+                    </a:lnB>
+                  </a:tcPr>
+                </a:tc>
+                <a:tc>
+                  <a:txBody>
+                    <a:bodyPr/>
+                    <a:lstStyle/>
+                    <a:p>
+                      <a:pPr algn="ctr"/>
+                      <a:r>
+                        <a:rPr lang="en-US" sz="1400" dirty="0" smtClean="0">
+                          <a:solidFill>
+                            <a:schemeClr val="bg1">
+                              <a:lumMod val="50000"/>
+                            </a:schemeClr>
+                          </a:solidFill>
+                        </a:rPr>
+                        <a:t>-</a:t>
+                      </a:r>
+                      <a:endParaRPr lang="en-US" sz="1400" dirty="0">
+                        <a:solidFill>
+                          <a:schemeClr val="bg1">
+                            <a:lumMod val="50000"/>
+                          </a:schemeClr>
+                        </a:solidFill>
+                      </a:endParaRPr>
+                    </a:p>
+                  </a:txBody>
+                  <a:tcPr anchor="ctr">
+                    <a:lnB w="12700" cap="flat" cmpd="sng" algn="ctr">
+                      <a:solidFill>
+                        <a:schemeClr val="tx1"/>
+                      </a:solidFill>
+                      <a:prstDash val="solid"/>
+                      <a:round/>
+                      <a:headEnd type="none" w="med" len="med"/>
+                      <a:tailEnd type="none" w="med" len="med"/>
+                    </a:lnB>
+                  </a:tcPr>
+                </a:tc>
+                <a:tc>
+                  <a:txBody>
+                    <a:bodyPr/>
+                    <a:lstStyle/>
+                    <a:p>
+                      <a:pPr algn="ctr"/>
+                      <a:r>
+                        <a:rPr lang="en-US" sz="1400" dirty="0" smtClean="0">
+                          <a:solidFill>
+                            <a:schemeClr val="bg1">
+                              <a:lumMod val="50000"/>
+                            </a:schemeClr>
+                          </a:solidFill>
+                        </a:rPr>
+                        <a:t>-</a:t>
+                      </a:r>
+                      <a:endParaRPr lang="en-US" sz="1400" dirty="0">
+                        <a:solidFill>
+                          <a:schemeClr val="bg1">
+                            <a:lumMod val="50000"/>
+                          </a:schemeClr>
+                        </a:solidFill>
+                      </a:endParaRPr>
+                    </a:p>
+                  </a:txBody>
+                  <a:tcPr anchor="ctr">
+                    <a:lnB w="12700" cap="flat" cmpd="sng" algn="ctr">
+                      <a:solidFill>
+                        <a:schemeClr val="tx1"/>
+                      </a:solidFill>
+                      <a:prstDash val="solid"/>
+                      <a:round/>
+                      <a:headEnd type="none" w="med" len="med"/>
+                      <a:tailEnd type="none" w="med" len="med"/>
+                    </a:lnB>
+                  </a:tcPr>
+                </a:tc>
+                <a:tc>
+                  <a:txBody>
+                    <a:bodyPr/>
+                    <a:lstStyle/>
+                    <a:p>
+                      <a:pPr algn="ctr"/>
+                      <a:r>
+                        <a:rPr lang="en-US" sz="1400" dirty="0" smtClean="0"/>
+                        <a:t>1</a:t>
+                      </a:r>
+                      <a:endParaRPr lang="en-US" sz="1400" dirty="0"/>
+                    </a:p>
+                  </a:txBody>
+                  <a:tcPr anchor="ctr">
+                    <a:lnB w="12700" cap="flat" cmpd="sng" algn="ctr">
+                      <a:solidFill>
+                        <a:schemeClr val="tx1"/>
+                      </a:solidFill>
+                      <a:prstDash val="solid"/>
+                      <a:round/>
+                      <a:headEnd type="none" w="med" len="med"/>
+                      <a:tailEnd type="none" w="med" len="med"/>
+                    </a:lnB>
+                  </a:tcPr>
+                </a:tc>
+                <a:tc>
+                  <a:txBody>
+                    <a:bodyPr/>
+                    <a:lstStyle/>
+                    <a:p>
+                      <a:pPr algn="ctr"/>
+                      <a:r>
+                        <a:rPr lang="en-US" sz="1400" dirty="0" smtClean="0"/>
+                        <a:t>1</a:t>
+                      </a:r>
+                      <a:endParaRPr lang="en-US" sz="1400" dirty="0"/>
+                    </a:p>
+                  </a:txBody>
+                  <a:tcPr anchor="ctr">
+                    <a:lnB w="12700" cap="flat" cmpd="sng" algn="ctr">
+                      <a:solidFill>
+                        <a:schemeClr val="tx1"/>
+                      </a:solidFill>
+                      <a:prstDash val="solid"/>
+                      <a:round/>
+                      <a:headEnd type="none" w="med" len="med"/>
+                      <a:tailEnd type="none" w="med" len="med"/>
+                    </a:lnB>
+                  </a:tcPr>
+                </a:tc>
+                <a:tc>
+                  <a:txBody>
+                    <a:bodyPr/>
+                    <a:lstStyle/>
+                    <a:p>
+                      <a:pPr algn="ctr"/>
+                      <a:r>
+                        <a:rPr lang="en-US" sz="1400" dirty="0" smtClean="0">
+                          <a:solidFill>
+                            <a:schemeClr val="bg1">
+                              <a:lumMod val="50000"/>
+                            </a:schemeClr>
+                          </a:solidFill>
+                        </a:rPr>
+                        <a:t>-</a:t>
+                      </a:r>
+                      <a:endParaRPr lang="en-US" sz="1400" dirty="0">
+                        <a:solidFill>
+                          <a:schemeClr val="bg1">
+                            <a:lumMod val="50000"/>
+                          </a:schemeClr>
+                        </a:solidFill>
+                      </a:endParaRPr>
+                    </a:p>
+                  </a:txBody>
+                  <a:tcPr anchor="ctr">
+                    <a:lnB w="12700" cap="flat" cmpd="sng" algn="ctr">
+                      <a:solidFill>
+                        <a:schemeClr val="tx1"/>
+                      </a:solidFill>
+                      <a:prstDash val="solid"/>
+                      <a:round/>
+                      <a:headEnd type="none" w="med" len="med"/>
+                      <a:tailEnd type="none" w="med" len="med"/>
+                    </a:lnB>
+                  </a:tcPr>
+                </a:tc>
+                <a:tc>
+                  <a:txBody>
+                    <a:bodyPr/>
+                    <a:lstStyle/>
+                    <a:p>
+                      <a:pPr algn="ctr"/>
+                      <a:r>
+                        <a:rPr lang="en-US" sz="1400" dirty="0" smtClean="0"/>
+                        <a:t>116</a:t>
+                      </a:r>
+                      <a:endParaRPr lang="en-US" sz="1400" dirty="0"/>
+                    </a:p>
+                  </a:txBody>
+                  <a:tcPr anchor="ctr">
+                    <a:lnR w="12700" cap="flat" cmpd="sng" algn="ctr">
+                      <a:solidFill>
+                        <a:schemeClr val="tx1"/>
+                      </a:solidFill>
+                      <a:prstDash val="solid"/>
+                      <a:round/>
+                      <a:headEnd type="none" w="med" len="med"/>
+                      <a:tailEnd type="none" w="med" len="med"/>
+                    </a:lnR>
+                    <a:lnB w="12700" cap="flat" cmpd="sng" algn="ctr">
+                      <a:solidFill>
+                        <a:schemeClr val="tx1"/>
+                      </a:solidFill>
+                      <a:prstDash val="solid"/>
+                      <a:round/>
+                      <a:headEnd type="none" w="med" len="med"/>
+                      <a:tailEnd type="none" w="med" len="med"/>
+                    </a:lnB>
+                  </a:tcPr>
+                </a:tc>
+                <a:extLst>
+                  <a:ext uri="{0D108BD9-81ED-4DB2-BD59-A6C34878D82A}">
+                    <a16:rowId xmlns:a16="http://schemas.microsoft.com/office/drawing/2014/main" val="1363691137"/>
+                  </a:ext>
+                </a:extLst>
+              </a:tr>
+            </a:tbl>
+          </a:graphicData>
+        </a:graphic>
+      </p:graphicFrame>
+      <p:sp>
+        <p:nvSpPr>
+          <p:cNvPr id="9" name="Rectangle 8"/>
+          <p:cNvSpPr/>
+          <p:nvPr/>
+        </p:nvSpPr>
+        <p:spPr>
+          <a:xfrm>
+            <a:off x="182878" y="3189717"/>
+            <a:ext cx="4456156" cy="369332"/>
+          </a:xfrm>
+          <a:prstGeom prst="rect">
+            <a:avLst/>
+          </a:prstGeom>
+        </p:spPr>
+        <p:txBody>
+          <a:bodyPr wrap="none">
+            <a:spAutoFit/>
+          </a:bodyPr>
+          <a:lstStyle/>
+          <a:p>
+            <a:r>
+              <a:rPr lang="en-US" dirty="0" smtClean="0"/>
+              <a:t>Number of </a:t>
+            </a:r>
+            <a:r>
+              <a:rPr lang="en-US" dirty="0" smtClean="0"/>
+              <a:t>*Index SNPs* </a:t>
+            </a:r>
+            <a:r>
+              <a:rPr lang="en-US" dirty="0" smtClean="0"/>
+              <a:t>that pair to n genes:</a:t>
+            </a:r>
+            <a:endParaRPr lang="en-US" dirty="0"/>
+          </a:p>
+        </p:txBody>
+      </p:sp>
+      <p:graphicFrame>
+        <p:nvGraphicFramePr>
+          <p:cNvPr id="6" name="Table 5"/>
+          <p:cNvGraphicFramePr>
+            <a:graphicFrameLocks noGrp="1"/>
+          </p:cNvGraphicFramePr>
+          <p:nvPr>
+            <p:extLst>
+              <p:ext uri="{D42A27DB-BD31-4B8C-83A1-F6EECF244321}">
+                <p14:modId xmlns:p14="http://schemas.microsoft.com/office/powerpoint/2010/main" val="3888729864"/>
+              </p:ext>
+            </p:extLst>
+          </p:nvPr>
+        </p:nvGraphicFramePr>
+        <p:xfrm>
+          <a:off x="588477" y="1487406"/>
+          <a:ext cx="8632033" cy="876442"/>
+        </p:xfrm>
+        <a:graphic>
+          <a:graphicData uri="http://schemas.openxmlformats.org/drawingml/2006/table">
+            <a:tbl>
+              <a:tblPr firstRow="1" bandRow="1">
+                <a:tableStyleId>{2D5ABB26-0587-4C30-8999-92F81FD0307C}</a:tableStyleId>
+              </a:tblPr>
+              <a:tblGrid>
+                <a:gridCol w="4412955">
+                  <a:extLst>
+                    <a:ext uri="{9D8B030D-6E8A-4147-A177-3AD203B41FA5}">
+                      <a16:colId xmlns:a16="http://schemas.microsoft.com/office/drawing/2014/main" val="1178349782"/>
+                    </a:ext>
+                  </a:extLst>
+                </a:gridCol>
+                <a:gridCol w="2109539">
+                  <a:extLst>
+                    <a:ext uri="{9D8B030D-6E8A-4147-A177-3AD203B41FA5}">
+                      <a16:colId xmlns:a16="http://schemas.microsoft.com/office/drawing/2014/main" val="1816200263"/>
+                    </a:ext>
+                  </a:extLst>
+                </a:gridCol>
+                <a:gridCol w="2109539">
+                  <a:extLst>
+                    <a:ext uri="{9D8B030D-6E8A-4147-A177-3AD203B41FA5}">
+                      <a16:colId xmlns:a16="http://schemas.microsoft.com/office/drawing/2014/main" val="3834981325"/>
+                    </a:ext>
+                  </a:extLst>
+                </a:gridCol>
+              </a:tblGrid>
+              <a:tr h="464962">
+                <a:tc>
+                  <a:txBody>
+                    <a:bodyPr/>
+                    <a:lstStyle/>
+                    <a:p>
+                      <a:pPr algn="ctr"/>
+                      <a:endParaRPr lang="en-US" sz="1800" dirty="0"/>
+                    </a:p>
+                  </a:txBody>
+                  <a:tcPr anchor="ctr">
+                    <a:lnL w="12700" cap="flat" cmpd="sng" algn="ctr">
+                      <a:solidFill>
+                        <a:schemeClr val="tx1"/>
+                      </a:solidFill>
+                      <a:prstDash val="solid"/>
+                      <a:round/>
+                      <a:headEnd type="none" w="med" len="med"/>
+                      <a:tailEnd type="none" w="med" len="med"/>
+                    </a:lnL>
+                    <a:lnR w="12700" cap="flat" cmpd="sng" algn="ctr">
+                      <a:solidFill>
+                        <a:schemeClr val="tx1"/>
+                      </a:solidFill>
+                      <a:prstDash val="solid"/>
+                      <a:round/>
+                      <a:headEnd type="none" w="med" len="med"/>
+                      <a:tailEnd type="none" w="med" len="med"/>
+                    </a:lnR>
+                    <a:lnT w="12700" cap="flat" cmpd="sng" algn="ctr">
+                      <a:solidFill>
+                        <a:schemeClr val="tx1"/>
+                      </a:solidFill>
+                      <a:prstDash val="solid"/>
+                      <a:round/>
+                      <a:headEnd type="none" w="med" len="med"/>
+                      <a:tailEnd type="none" w="med" len="med"/>
+                    </a:lnT>
+                    <a:lnB w="12700" cap="flat" cmpd="sng" algn="ctr">
+                      <a:solidFill>
+                        <a:schemeClr val="tx1"/>
+                      </a:solidFill>
+                      <a:prstDash val="solid"/>
+                      <a:round/>
+                      <a:headEnd type="none" w="med" len="med"/>
+                      <a:tailEnd type="none" w="med" len="med"/>
+                    </a:lnB>
+                  </a:tcPr>
+                </a:tc>
+                <a:tc>
+                  <a:txBody>
+                    <a:bodyPr/>
+                    <a:lstStyle/>
+                    <a:p>
+                      <a:pPr algn="ctr"/>
+                      <a:r>
+                        <a:rPr lang="en-US" sz="1800" dirty="0" smtClean="0"/>
+                        <a:t>Hippocampus</a:t>
+                      </a:r>
+                      <a:endParaRPr lang="en-US" sz="1800" dirty="0"/>
+                    </a:p>
+                  </a:txBody>
+                  <a:tcPr anchor="ctr">
+                    <a:lnL w="12700" cap="flat" cmpd="sng" algn="ctr">
+                      <a:solidFill>
+                        <a:schemeClr val="tx1"/>
+                      </a:solidFill>
+                      <a:prstDash val="solid"/>
+                      <a:round/>
+                      <a:headEnd type="none" w="med" len="med"/>
+                      <a:tailEnd type="none" w="med" len="med"/>
+                    </a:lnL>
+                    <a:lnR w="12700" cap="flat" cmpd="sng" algn="ctr">
+                      <a:solidFill>
+                        <a:schemeClr val="tx1"/>
+                      </a:solidFill>
+                      <a:prstDash val="solid"/>
+                      <a:round/>
+                      <a:headEnd type="none" w="med" len="med"/>
+                      <a:tailEnd type="none" w="med" len="med"/>
+                    </a:lnR>
+                    <a:lnT w="12700" cap="flat" cmpd="sng" algn="ctr">
+                      <a:solidFill>
+                        <a:schemeClr val="tx1"/>
+                      </a:solidFill>
+                      <a:prstDash val="solid"/>
+                      <a:round/>
+                      <a:headEnd type="none" w="med" len="med"/>
+                      <a:tailEnd type="none" w="med" len="med"/>
+                    </a:lnT>
+                    <a:lnB w="12700" cap="flat" cmpd="sng" algn="ctr">
+                      <a:solidFill>
+                        <a:schemeClr val="tx1"/>
+                      </a:solidFill>
+                      <a:prstDash val="solid"/>
+                      <a:round/>
+                      <a:headEnd type="none" w="med" len="med"/>
+                      <a:tailEnd type="none" w="med" len="med"/>
+                    </a:lnB>
+                  </a:tcPr>
+                </a:tc>
+                <a:tc>
+                  <a:txBody>
+                    <a:bodyPr/>
+                    <a:lstStyle/>
+                    <a:p>
+                      <a:pPr algn="ctr"/>
+                      <a:r>
+                        <a:rPr lang="en-US" sz="1800" dirty="0"/>
+                        <a:t>DLPFC</a:t>
+                      </a:r>
+                    </a:p>
+                  </a:txBody>
+                  <a:tcPr anchor="ctr">
+                    <a:lnL w="12700" cap="flat" cmpd="sng" algn="ctr">
+                      <a:solidFill>
+                        <a:schemeClr val="tx1"/>
+                      </a:solidFill>
+                      <a:prstDash val="solid"/>
+                      <a:round/>
+                      <a:headEnd type="none" w="med" len="med"/>
+                      <a:tailEnd type="none" w="med" len="med"/>
+                    </a:lnL>
+                    <a:lnR w="12700" cap="flat" cmpd="sng" algn="ctr">
+                      <a:solidFill>
+                        <a:schemeClr val="tx1"/>
+                      </a:solidFill>
+                      <a:prstDash val="solid"/>
+                      <a:round/>
+                      <a:headEnd type="none" w="med" len="med"/>
+                      <a:tailEnd type="none" w="med" len="med"/>
+                    </a:lnR>
+                    <a:lnT w="12700" cap="flat" cmpd="sng" algn="ctr">
+                      <a:solidFill>
+                        <a:schemeClr val="tx1"/>
+                      </a:solidFill>
+                      <a:prstDash val="solid"/>
+                      <a:round/>
+                      <a:headEnd type="none" w="med" len="med"/>
+                      <a:tailEnd type="none" w="med" len="med"/>
+                    </a:lnT>
+                    <a:lnB w="12700" cap="flat" cmpd="sng" algn="ctr">
+                      <a:solidFill>
+                        <a:schemeClr val="tx1"/>
+                      </a:solidFill>
+                      <a:prstDash val="solid"/>
+                      <a:round/>
+                      <a:headEnd type="none" w="med" len="med"/>
+                      <a:tailEnd type="none" w="med" len="med"/>
+                    </a:lnB>
+                  </a:tcPr>
+                </a:tc>
+                <a:extLst>
+                  <a:ext uri="{0D108BD9-81ED-4DB2-BD59-A6C34878D82A}">
+                    <a16:rowId xmlns:a16="http://schemas.microsoft.com/office/drawing/2014/main" val="2128684183"/>
+                  </a:ext>
+                </a:extLst>
+              </a:tr>
+              <a:tr h="411480">
+                <a:tc>
+                  <a:txBody>
+                    <a:bodyPr/>
+                    <a:lstStyle/>
+                    <a:p>
+                      <a:pPr algn="l"/>
+                      <a:r>
+                        <a:rPr lang="en-US" sz="1800" dirty="0"/>
+                        <a:t># </a:t>
+                      </a:r>
+                      <a:r>
+                        <a:rPr lang="en-US" sz="1800" dirty="0" smtClean="0"/>
+                        <a:t>unique SNPs (unique index SNPs)</a:t>
+                      </a:r>
+                      <a:endParaRPr lang="en-US" sz="1800" dirty="0"/>
+                    </a:p>
+                  </a:txBody>
+                  <a:tcPr anchor="ctr">
+                    <a:lnL w="12700" cap="flat" cmpd="sng" algn="ctr">
+                      <a:solidFill>
+                        <a:schemeClr val="tx1"/>
+                      </a:solidFill>
+                      <a:prstDash val="solid"/>
+                      <a:round/>
+                      <a:headEnd type="none" w="med" len="med"/>
+                      <a:tailEnd type="none" w="med" len="med"/>
+                    </a:lnL>
+                    <a:lnR w="12700" cap="flat" cmpd="sng" algn="ctr">
+                      <a:solidFill>
+                        <a:schemeClr val="tx1"/>
+                      </a:solidFill>
+                      <a:prstDash val="solid"/>
+                      <a:round/>
+                      <a:headEnd type="none" w="med" len="med"/>
+                      <a:tailEnd type="none" w="med" len="med"/>
+                    </a:lnR>
+                    <a:lnT w="12700" cap="flat" cmpd="sng" algn="ctr">
+                      <a:solidFill>
+                        <a:schemeClr val="tx1"/>
+                      </a:solidFill>
+                      <a:prstDash val="solid"/>
+                      <a:round/>
+                      <a:headEnd type="none" w="med" len="med"/>
+                      <a:tailEnd type="none" w="med" len="med"/>
+                    </a:lnT>
+                    <a:lnB w="12700" cap="flat" cmpd="sng" algn="ctr">
+                      <a:solidFill>
+                        <a:schemeClr val="tx1"/>
+                      </a:solidFill>
+                      <a:prstDash val="solid"/>
+                      <a:round/>
+                      <a:headEnd type="none" w="med" len="med"/>
+                      <a:tailEnd type="none" w="med" len="med"/>
+                    </a:lnB>
+                  </a:tcPr>
+                </a:tc>
+                <a:tc>
+                  <a:txBody>
+                    <a:bodyPr/>
+                    <a:lstStyle/>
+                    <a:p>
+                      <a:pPr algn="ctr"/>
+                      <a:r>
+                        <a:rPr lang="en-US" sz="1600" dirty="0" smtClean="0"/>
+                        <a:t>5510 </a:t>
+                      </a:r>
+                      <a:r>
+                        <a:rPr lang="en-US" sz="1600" dirty="0" smtClean="0"/>
+                        <a:t>(103)</a:t>
+                      </a:r>
+                      <a:endParaRPr lang="en-US" sz="1600" dirty="0"/>
+                    </a:p>
+                  </a:txBody>
+                  <a:tcPr anchor="ctr">
+                    <a:lnL w="12700" cap="flat" cmpd="sng" algn="ctr">
+                      <a:solidFill>
+                        <a:schemeClr val="tx1"/>
+                      </a:solidFill>
+                      <a:prstDash val="solid"/>
+                      <a:round/>
+                      <a:headEnd type="none" w="med" len="med"/>
+                      <a:tailEnd type="none" w="med" len="med"/>
+                    </a:lnL>
+                    <a:lnR w="12700" cap="flat" cmpd="sng" algn="ctr">
+                      <a:solidFill>
+                        <a:schemeClr val="tx1"/>
+                      </a:solidFill>
+                      <a:prstDash val="solid"/>
+                      <a:round/>
+                      <a:headEnd type="none" w="med" len="med"/>
+                      <a:tailEnd type="none" w="med" len="med"/>
+                    </a:lnR>
+                    <a:lnT w="12700" cap="flat" cmpd="sng" algn="ctr">
+                      <a:solidFill>
+                        <a:schemeClr val="tx1"/>
+                      </a:solidFill>
+                      <a:prstDash val="solid"/>
+                      <a:round/>
+                      <a:headEnd type="none" w="med" len="med"/>
+                      <a:tailEnd type="none" w="med" len="med"/>
+                    </a:lnT>
+                    <a:lnB w="12700" cap="flat" cmpd="sng" algn="ctr">
+                      <a:solidFill>
+                        <a:schemeClr val="tx1"/>
+                      </a:solidFill>
+                      <a:prstDash val="solid"/>
+                      <a:round/>
+                      <a:headEnd type="none" w="med" len="med"/>
+                      <a:tailEnd type="none" w="med" len="med"/>
+                    </a:lnB>
+                  </a:tcPr>
+                </a:tc>
+                <a:tc>
+                  <a:txBody>
+                    <a:bodyPr/>
+                    <a:lstStyle/>
+                    <a:p>
+                      <a:pPr algn="ctr"/>
+                      <a:r>
+                        <a:rPr lang="en-US" sz="1600" dirty="0" smtClean="0"/>
+                        <a:t>6780 </a:t>
+                      </a:r>
+                      <a:r>
+                        <a:rPr lang="en-US" sz="1600" dirty="0" smtClean="0"/>
+                        <a:t>(116)</a:t>
+                      </a:r>
+                      <a:endParaRPr lang="en-US" sz="1600" dirty="0"/>
+                    </a:p>
+                  </a:txBody>
+                  <a:tcPr anchor="ctr">
+                    <a:lnL w="12700" cap="flat" cmpd="sng" algn="ctr">
+                      <a:solidFill>
+                        <a:schemeClr val="tx1"/>
+                      </a:solidFill>
+                      <a:prstDash val="solid"/>
+                      <a:round/>
+                      <a:headEnd type="none" w="med" len="med"/>
+                      <a:tailEnd type="none" w="med" len="med"/>
+                    </a:lnL>
+                    <a:lnR w="12700" cap="flat" cmpd="sng" algn="ctr">
+                      <a:solidFill>
+                        <a:schemeClr val="tx1"/>
+                      </a:solidFill>
+                      <a:prstDash val="solid"/>
+                      <a:round/>
+                      <a:headEnd type="none" w="med" len="med"/>
+                      <a:tailEnd type="none" w="med" len="med"/>
+                    </a:lnR>
+                    <a:lnT w="12700" cap="flat" cmpd="sng" algn="ctr">
+                      <a:solidFill>
+                        <a:schemeClr val="tx1"/>
+                      </a:solidFill>
+                      <a:prstDash val="solid"/>
+                      <a:round/>
+                      <a:headEnd type="none" w="med" len="med"/>
+                      <a:tailEnd type="none" w="med" len="med"/>
+                    </a:lnT>
+                    <a:lnB w="12700" cap="flat" cmpd="sng" algn="ctr">
+                      <a:solidFill>
+                        <a:schemeClr val="tx1"/>
+                      </a:solidFill>
+                      <a:prstDash val="solid"/>
+                      <a:round/>
+                      <a:headEnd type="none" w="med" len="med"/>
+                      <a:tailEnd type="none" w="med" len="med"/>
+                    </a:lnB>
+                  </a:tcPr>
+                </a:tc>
+                <a:extLst>
+                  <a:ext uri="{0D108BD9-81ED-4DB2-BD59-A6C34878D82A}">
+                    <a16:rowId xmlns:a16="http://schemas.microsoft.com/office/drawing/2014/main" val="1681956944"/>
+                  </a:ext>
+                </a:extLst>
+              </a:tr>
+            </a:tbl>
+          </a:graphicData>
+        </a:graphic>
+      </p:graphicFrame>
+    </p:spTree>
+    <p:extLst>
+      <p:ext uri="{BB962C8B-B14F-4D97-AF65-F5344CB8AC3E}">
+        <p14:creationId xmlns:p14="http://schemas.microsoft.com/office/powerpoint/2010/main" val="1248623542"/>
       </p:ext>
     </p:extLst>
   </p:cSld>

</xml_diff>